<commit_message>
Modified powers in Model 1, added modifications in my powerpoint (WIP).
</commit_message>
<xml_diff>
--- a/Aes_Project_2021_2022 Fire.pptx
+++ b/Aes_Project_2021_2022 Fire.pptx
@@ -5,10 +5,10 @@
     <p:sldMasterId id="2147483648" r:id="rId4"/>
   </p:sldMasterIdLst>
   <p:notesMasterIdLst>
-    <p:notesMasterId r:id="rId23"/>
+    <p:notesMasterId r:id="rId24"/>
   </p:notesMasterIdLst>
   <p:handoutMasterIdLst>
-    <p:handoutMasterId r:id="rId24"/>
+    <p:handoutMasterId r:id="rId25"/>
   </p:handoutMasterIdLst>
   <p:sldIdLst>
     <p:sldId id="256" r:id="rId5"/>
@@ -16,19 +16,20 @@
     <p:sldId id="273" r:id="rId7"/>
     <p:sldId id="272" r:id="rId8"/>
     <p:sldId id="271" r:id="rId9"/>
-    <p:sldId id="274" r:id="rId10"/>
-    <p:sldId id="270" r:id="rId11"/>
-    <p:sldId id="283" r:id="rId12"/>
-    <p:sldId id="275" r:id="rId13"/>
-    <p:sldId id="284" r:id="rId14"/>
-    <p:sldId id="285" r:id="rId15"/>
-    <p:sldId id="276" r:id="rId16"/>
-    <p:sldId id="280" r:id="rId17"/>
-    <p:sldId id="279" r:id="rId18"/>
-    <p:sldId id="281" r:id="rId19"/>
-    <p:sldId id="278" r:id="rId20"/>
-    <p:sldId id="277" r:id="rId21"/>
-    <p:sldId id="282" r:id="rId22"/>
+    <p:sldId id="286" r:id="rId10"/>
+    <p:sldId id="274" r:id="rId11"/>
+    <p:sldId id="270" r:id="rId12"/>
+    <p:sldId id="283" r:id="rId13"/>
+    <p:sldId id="275" r:id="rId14"/>
+    <p:sldId id="284" r:id="rId15"/>
+    <p:sldId id="285" r:id="rId16"/>
+    <p:sldId id="276" r:id="rId17"/>
+    <p:sldId id="280" r:id="rId18"/>
+    <p:sldId id="279" r:id="rId19"/>
+    <p:sldId id="281" r:id="rId20"/>
+    <p:sldId id="278" r:id="rId21"/>
+    <p:sldId id="277" r:id="rId22"/>
+    <p:sldId id="282" r:id="rId23"/>
   </p:sldIdLst>
   <p:sldSz cx="12192000" cy="6858000"/>
   <p:notesSz cx="6858000" cy="9144000"/>
@@ -250,7 +251,7 @@
             <a:pPr rtl="0"/>
             <a:fld id="{14E13FA4-5A6A-4920-8854-843EBE8DDFDE}" type="datetime1">
               <a:rPr lang="it-IT" smtClean="0"/>
-              <a:t>09/06/2022</a:t>
+              <a:t>11/06/2022</a:t>
             </a:fld>
             <a:endParaRPr lang="it-IT" dirty="0"/>
           </a:p>
@@ -432,7 +433,7 @@
             <a:fld id="{3952339E-5782-4E34-93C0-C2AC43169E1F}" type="datetime1">
               <a:rPr lang="it-IT" smtClean="0"/>
               <a:pPr/>
-              <a:t>09/06/2022</a:t>
+              <a:t>11/06/2022</a:t>
             </a:fld>
             <a:endParaRPr lang="it-IT" dirty="0"/>
           </a:p>
@@ -856,7 +857,7 @@
             <a:pPr rtl="0"/>
             <a:fld id="{79230CFA-805A-4FD3-B3A0-DAAA5993DA17}" type="slidenum">
               <a:rPr lang="it-IT" smtClean="0"/>
-              <a:t>12</a:t>
+              <a:t>13</a:t>
             </a:fld>
             <a:endParaRPr lang="it-IT" dirty="0"/>
           </a:p>
@@ -942,7 +943,7 @@
             <a:pPr rtl="0"/>
             <a:fld id="{79230CFA-805A-4FD3-B3A0-DAAA5993DA17}" type="slidenum">
               <a:rPr lang="it-IT" smtClean="0"/>
-              <a:t>13</a:t>
+              <a:t>14</a:t>
             </a:fld>
             <a:endParaRPr lang="it-IT" dirty="0"/>
           </a:p>
@@ -1028,7 +1029,7 @@
             <a:pPr rtl="0"/>
             <a:fld id="{79230CFA-805A-4FD3-B3A0-DAAA5993DA17}" type="slidenum">
               <a:rPr lang="it-IT" smtClean="0"/>
-              <a:t>14</a:t>
+              <a:t>15</a:t>
             </a:fld>
             <a:endParaRPr lang="it-IT" dirty="0"/>
           </a:p>
@@ -1114,7 +1115,7 @@
             <a:pPr rtl="0"/>
             <a:fld id="{79230CFA-805A-4FD3-B3A0-DAAA5993DA17}" type="slidenum">
               <a:rPr lang="it-IT" smtClean="0"/>
-              <a:t>15</a:t>
+              <a:t>16</a:t>
             </a:fld>
             <a:endParaRPr lang="it-IT" dirty="0"/>
           </a:p>
@@ -1200,7 +1201,7 @@
             <a:pPr rtl="0"/>
             <a:fld id="{79230CFA-805A-4FD3-B3A0-DAAA5993DA17}" type="slidenum">
               <a:rPr lang="it-IT" smtClean="0"/>
-              <a:t>16</a:t>
+              <a:t>17</a:t>
             </a:fld>
             <a:endParaRPr lang="it-IT" dirty="0"/>
           </a:p>
@@ -1286,7 +1287,7 @@
             <a:pPr rtl="0"/>
             <a:fld id="{79230CFA-805A-4FD3-B3A0-DAAA5993DA17}" type="slidenum">
               <a:rPr lang="it-IT" smtClean="0"/>
-              <a:t>17</a:t>
+              <a:t>18</a:t>
             </a:fld>
             <a:endParaRPr lang="it-IT" dirty="0"/>
           </a:p>
@@ -1372,7 +1373,7 @@
             <a:pPr rtl="0"/>
             <a:fld id="{79230CFA-805A-4FD3-B3A0-DAAA5993DA17}" type="slidenum">
               <a:rPr lang="it-IT" smtClean="0"/>
-              <a:t>18</a:t>
+              <a:t>19</a:t>
             </a:fld>
             <a:endParaRPr lang="it-IT" dirty="0"/>
           </a:p>
@@ -1802,7 +1803,7 @@
             <a:pPr rtl="0"/>
             <a:fld id="{79230CFA-805A-4FD3-B3A0-DAAA5993DA17}" type="slidenum">
               <a:rPr lang="it-IT" smtClean="0"/>
-              <a:t>6</a:t>
+              <a:t>7</a:t>
             </a:fld>
             <a:endParaRPr lang="it-IT" dirty="0"/>
           </a:p>
@@ -1888,7 +1889,7 @@
             <a:pPr rtl="0"/>
             <a:fld id="{79230CFA-805A-4FD3-B3A0-DAAA5993DA17}" type="slidenum">
               <a:rPr lang="it-IT" smtClean="0"/>
-              <a:t>7</a:t>
+              <a:t>8</a:t>
             </a:fld>
             <a:endParaRPr lang="it-IT" dirty="0"/>
           </a:p>
@@ -1974,7 +1975,7 @@
             <a:pPr rtl="0"/>
             <a:fld id="{79230CFA-805A-4FD3-B3A0-DAAA5993DA17}" type="slidenum">
               <a:rPr lang="it-IT" smtClean="0"/>
-              <a:t>8</a:t>
+              <a:t>9</a:t>
             </a:fld>
             <a:endParaRPr lang="it-IT" dirty="0"/>
           </a:p>
@@ -2060,7 +2061,7 @@
             <a:pPr rtl="0"/>
             <a:fld id="{79230CFA-805A-4FD3-B3A0-DAAA5993DA17}" type="slidenum">
               <a:rPr lang="it-IT" smtClean="0"/>
-              <a:t>9</a:t>
+              <a:t>10</a:t>
             </a:fld>
             <a:endParaRPr lang="it-IT" dirty="0"/>
           </a:p>
@@ -2524,13 +2525,13 @@
   <p:clrMapOvr>
     <a:masterClrMapping/>
   </p:clrMapOvr>
-  <mc:AlternateContent xmlns:mc="http://schemas.openxmlformats.org/markup-compatibility/2006">
-    <mc:Choice xmlns:p14="http://schemas.microsoft.com/office/powerpoint/2010/main" Requires="p14">
+  <mc:AlternateContent xmlns:mc="http://schemas.openxmlformats.org/markup-compatibility/2006" xmlns:p14="http://schemas.microsoft.com/office/powerpoint/2010/main">
+    <mc:Choice Requires="p14">
       <p:transition spd="med" p14:dur="700">
         <p:fade/>
       </p:transition>
     </mc:Choice>
-    <mc:Fallback>
+    <mc:Fallback xmlns="">
       <p:transition spd="med">
         <p:fade/>
       </p:transition>
@@ -2917,13 +2918,13 @@
   <p:clrMapOvr>
     <a:masterClrMapping/>
   </p:clrMapOvr>
-  <mc:AlternateContent xmlns:mc="http://schemas.openxmlformats.org/markup-compatibility/2006">
-    <mc:Choice xmlns:p14="http://schemas.microsoft.com/office/powerpoint/2010/main" Requires="p14">
+  <mc:AlternateContent xmlns:mc="http://schemas.openxmlformats.org/markup-compatibility/2006" xmlns:p14="http://schemas.microsoft.com/office/powerpoint/2010/main">
+    <mc:Choice Requires="p14">
       <p:transition spd="med" p14:dur="700">
         <p:fade/>
       </p:transition>
     </mc:Choice>
-    <mc:Fallback>
+    <mc:Fallback xmlns="">
       <p:transition spd="med">
         <p:fade/>
       </p:transition>
@@ -3574,13 +3575,13 @@
   <p:clrMapOvr>
     <a:masterClrMapping/>
   </p:clrMapOvr>
-  <mc:AlternateContent xmlns:mc="http://schemas.openxmlformats.org/markup-compatibility/2006">
-    <mc:Choice xmlns:p14="http://schemas.microsoft.com/office/powerpoint/2010/main" Requires="p14">
+  <mc:AlternateContent xmlns:mc="http://schemas.openxmlformats.org/markup-compatibility/2006" xmlns:p14="http://schemas.microsoft.com/office/powerpoint/2010/main">
+    <mc:Choice Requires="p14">
       <p:transition spd="med" p14:dur="700">
         <p:fade/>
       </p:transition>
     </mc:Choice>
-    <mc:Fallback>
+    <mc:Fallback xmlns="">
       <p:transition spd="med">
         <p:fade/>
       </p:transition>
@@ -4159,13 +4160,13 @@
   <p:clrMapOvr>
     <a:masterClrMapping/>
   </p:clrMapOvr>
-  <mc:AlternateContent xmlns:mc="http://schemas.openxmlformats.org/markup-compatibility/2006">
-    <mc:Choice xmlns:p14="http://schemas.microsoft.com/office/powerpoint/2010/main" Requires="p14">
+  <mc:AlternateContent xmlns:mc="http://schemas.openxmlformats.org/markup-compatibility/2006" xmlns:p14="http://schemas.microsoft.com/office/powerpoint/2010/main">
+    <mc:Choice Requires="p14">
       <p:transition spd="med" p14:dur="700">
         <p:fade/>
       </p:transition>
     </mc:Choice>
-    <mc:Fallback>
+    <mc:Fallback xmlns="">
       <p:transition spd="med">
         <p:fade/>
       </p:transition>
@@ -4856,13 +4857,13 @@
   <p:clrMapOvr>
     <a:masterClrMapping/>
   </p:clrMapOvr>
-  <mc:AlternateContent xmlns:mc="http://schemas.openxmlformats.org/markup-compatibility/2006">
-    <mc:Choice xmlns:p14="http://schemas.microsoft.com/office/powerpoint/2010/main" Requires="p14">
+  <mc:AlternateContent xmlns:mc="http://schemas.openxmlformats.org/markup-compatibility/2006" xmlns:p14="http://schemas.microsoft.com/office/powerpoint/2010/main">
+    <mc:Choice Requires="p14">
       <p:transition spd="med" p14:dur="700">
         <p:fade/>
       </p:transition>
     </mc:Choice>
-    <mc:Fallback>
+    <mc:Fallback xmlns="">
       <p:transition spd="med">
         <p:fade/>
       </p:transition>
@@ -5677,13 +5678,13 @@
   <p:clrMapOvr>
     <a:masterClrMapping/>
   </p:clrMapOvr>
-  <mc:AlternateContent xmlns:mc="http://schemas.openxmlformats.org/markup-compatibility/2006">
-    <mc:Choice xmlns:p14="http://schemas.microsoft.com/office/powerpoint/2010/main" Requires="p14">
+  <mc:AlternateContent xmlns:mc="http://schemas.openxmlformats.org/markup-compatibility/2006" xmlns:p14="http://schemas.microsoft.com/office/powerpoint/2010/main">
+    <mc:Choice Requires="p14">
       <p:transition spd="med" p14:dur="700">
         <p:fade/>
       </p:transition>
     </mc:Choice>
-    <mc:Fallback>
+    <mc:Fallback xmlns="">
       <p:transition spd="med">
         <p:fade/>
       </p:transition>
@@ -6170,13 +6171,13 @@
   <p:clrMapOvr>
     <a:masterClrMapping/>
   </p:clrMapOvr>
-  <mc:AlternateContent xmlns:mc="http://schemas.openxmlformats.org/markup-compatibility/2006">
-    <mc:Choice xmlns:p14="http://schemas.microsoft.com/office/powerpoint/2010/main" Requires="p14">
+  <mc:AlternateContent xmlns:mc="http://schemas.openxmlformats.org/markup-compatibility/2006" xmlns:p14="http://schemas.microsoft.com/office/powerpoint/2010/main">
+    <mc:Choice Requires="p14">
       <p:transition spd="med" p14:dur="700">
         <p:fade/>
       </p:transition>
     </mc:Choice>
-    <mc:Fallback>
+    <mc:Fallback xmlns="">
       <p:transition spd="med">
         <p:fade/>
       </p:transition>
@@ -6639,13 +6640,13 @@
   <p:clrMapOvr>
     <a:masterClrMapping/>
   </p:clrMapOvr>
-  <mc:AlternateContent xmlns:mc="http://schemas.openxmlformats.org/markup-compatibility/2006">
-    <mc:Choice xmlns:p14="http://schemas.microsoft.com/office/powerpoint/2010/main" Requires="p14">
+  <mc:AlternateContent xmlns:mc="http://schemas.openxmlformats.org/markup-compatibility/2006" xmlns:p14="http://schemas.microsoft.com/office/powerpoint/2010/main">
+    <mc:Choice Requires="p14">
       <p:transition spd="med" p14:dur="700">
         <p:fade/>
       </p:transition>
     </mc:Choice>
-    <mc:Fallback>
+    <mc:Fallback xmlns="">
       <p:transition spd="med">
         <p:fade/>
       </p:transition>
@@ -7018,13 +7019,13 @@
   <p:clrMapOvr>
     <a:masterClrMapping/>
   </p:clrMapOvr>
-  <mc:AlternateContent xmlns:mc="http://schemas.openxmlformats.org/markup-compatibility/2006">
-    <mc:Choice xmlns:p14="http://schemas.microsoft.com/office/powerpoint/2010/main" Requires="p14">
+  <mc:AlternateContent xmlns:mc="http://schemas.openxmlformats.org/markup-compatibility/2006" xmlns:p14="http://schemas.microsoft.com/office/powerpoint/2010/main">
+    <mc:Choice Requires="p14">
       <p:transition spd="med" p14:dur="700">
         <p:fade/>
       </p:transition>
     </mc:Choice>
-    <mc:Fallback>
+    <mc:Fallback xmlns="">
       <p:transition spd="med">
         <p:fade/>
       </p:transition>
@@ -7424,13 +7425,13 @@
   <p:clrMapOvr>
     <a:masterClrMapping/>
   </p:clrMapOvr>
-  <mc:AlternateContent xmlns:mc="http://schemas.openxmlformats.org/markup-compatibility/2006">
-    <mc:Choice xmlns:p14="http://schemas.microsoft.com/office/powerpoint/2010/main" Requires="p14">
+  <mc:AlternateContent xmlns:mc="http://schemas.openxmlformats.org/markup-compatibility/2006" xmlns:p14="http://schemas.microsoft.com/office/powerpoint/2010/main">
+    <mc:Choice Requires="p14">
       <p:transition spd="med" p14:dur="700">
         <p:fade/>
       </p:transition>
     </mc:Choice>
-    <mc:Fallback>
+    <mc:Fallback xmlns="">
       <p:transition spd="med">
         <p:fade/>
       </p:transition>
@@ -7517,13 +7518,13 @@
   <p:clrMapOvr>
     <a:masterClrMapping/>
   </p:clrMapOvr>
-  <mc:AlternateContent xmlns:mc="http://schemas.openxmlformats.org/markup-compatibility/2006">
-    <mc:Choice xmlns:p14="http://schemas.microsoft.com/office/powerpoint/2010/main" Requires="p14">
+  <mc:AlternateContent xmlns:mc="http://schemas.openxmlformats.org/markup-compatibility/2006" xmlns:p14="http://schemas.microsoft.com/office/powerpoint/2010/main">
+    <mc:Choice Requires="p14">
       <p:transition spd="med" p14:dur="700">
         <p:fade/>
       </p:transition>
     </mc:Choice>
-    <mc:Fallback>
+    <mc:Fallback xmlns="">
       <p:transition spd="med">
         <p:fade/>
       </p:transition>
@@ -8243,13 +8244,13 @@
   <p:clrMapOvr>
     <a:masterClrMapping/>
   </p:clrMapOvr>
-  <mc:AlternateContent xmlns:mc="http://schemas.openxmlformats.org/markup-compatibility/2006">
-    <mc:Choice xmlns:p14="http://schemas.microsoft.com/office/powerpoint/2010/main" Requires="p14">
+  <mc:AlternateContent xmlns:mc="http://schemas.openxmlformats.org/markup-compatibility/2006" xmlns:p14="http://schemas.microsoft.com/office/powerpoint/2010/main">
+    <mc:Choice Requires="p14">
       <p:transition spd="med" p14:dur="700">
         <p:fade/>
       </p:transition>
     </mc:Choice>
-    <mc:Fallback>
+    <mc:Fallback xmlns="">
       <p:transition spd="med">
         <p:fade/>
       </p:transition>
@@ -8953,13 +8954,13 @@
   <p:clrMapOvr>
     <a:masterClrMapping/>
   </p:clrMapOvr>
-  <mc:AlternateContent xmlns:mc="http://schemas.openxmlformats.org/markup-compatibility/2006">
-    <mc:Choice xmlns:p14="http://schemas.microsoft.com/office/powerpoint/2010/main" Requires="p14">
+  <mc:AlternateContent xmlns:mc="http://schemas.openxmlformats.org/markup-compatibility/2006" xmlns:p14="http://schemas.microsoft.com/office/powerpoint/2010/main">
+    <mc:Choice Requires="p14">
       <p:transition spd="med" p14:dur="700">
         <p:fade/>
       </p:transition>
     </mc:Choice>
-    <mc:Fallback>
+    <mc:Fallback xmlns="">
       <p:transition spd="med">
         <p:fade/>
       </p:transition>
@@ -9582,13 +9583,13 @@
   <p:clrMapOvr>
     <a:masterClrMapping/>
   </p:clrMapOvr>
-  <mc:AlternateContent xmlns:mc="http://schemas.openxmlformats.org/markup-compatibility/2006">
-    <mc:Choice xmlns:p14="http://schemas.microsoft.com/office/powerpoint/2010/main" Requires="p14">
+  <mc:AlternateContent xmlns:mc="http://schemas.openxmlformats.org/markup-compatibility/2006" xmlns:p14="http://schemas.microsoft.com/office/powerpoint/2010/main">
+    <mc:Choice Requires="p14">
       <p:transition spd="med" p14:dur="700">
         <p:fade/>
       </p:transition>
     </mc:Choice>
-    <mc:Fallback>
+    <mc:Fallback xmlns="">
       <p:transition spd="med">
         <p:fade/>
       </p:transition>
@@ -10503,13 +10504,13 @@
   <p:clrMapOvr>
     <a:masterClrMapping/>
   </p:clrMapOvr>
-  <mc:AlternateContent xmlns:mc="http://schemas.openxmlformats.org/markup-compatibility/2006">
-    <mc:Choice xmlns:p14="http://schemas.microsoft.com/office/powerpoint/2010/main" Requires="p14">
+  <mc:AlternateContent xmlns:mc="http://schemas.openxmlformats.org/markup-compatibility/2006" xmlns:p14="http://schemas.microsoft.com/office/powerpoint/2010/main">
+    <mc:Choice Requires="p14">
       <p:transition spd="med" p14:dur="700">
         <p:fade/>
       </p:transition>
     </mc:Choice>
-    <mc:Fallback>
+    <mc:Fallback xmlns="">
       <p:transition spd="med">
         <p:fade/>
       </p:transition>
@@ -11098,13 +11099,13 @@
   <p:clrMapOvr>
     <a:masterClrMapping/>
   </p:clrMapOvr>
-  <mc:AlternateContent xmlns:mc="http://schemas.openxmlformats.org/markup-compatibility/2006">
-    <mc:Choice xmlns:p14="http://schemas.microsoft.com/office/powerpoint/2010/main" Requires="p14">
+  <mc:AlternateContent xmlns:mc="http://schemas.openxmlformats.org/markup-compatibility/2006" xmlns:p14="http://schemas.microsoft.com/office/powerpoint/2010/main">
+    <mc:Choice Requires="p14">
       <p:transition spd="med" p14:dur="700">
         <p:fade/>
       </p:transition>
     </mc:Choice>
-    <mc:Fallback>
+    <mc:Fallback xmlns="">
       <p:transition spd="med">
         <p:fade/>
       </p:transition>
@@ -11604,13 +11605,13 @@
   <p:clrMapOvr>
     <a:masterClrMapping/>
   </p:clrMapOvr>
-  <mc:AlternateContent xmlns:mc="http://schemas.openxmlformats.org/markup-compatibility/2006">
-    <mc:Choice xmlns:p14="http://schemas.microsoft.com/office/powerpoint/2010/main" Requires="p14">
+  <mc:AlternateContent xmlns:mc="http://schemas.openxmlformats.org/markup-compatibility/2006" xmlns:p14="http://schemas.microsoft.com/office/powerpoint/2010/main">
+    <mc:Choice Requires="p14">
       <p:transition spd="med" p14:dur="700">
         <p:fade/>
       </p:transition>
     </mc:Choice>
-    <mc:Fallback>
+    <mc:Fallback xmlns="">
       <p:transition spd="med">
         <p:fade/>
       </p:transition>
@@ -11866,13 +11867,13 @@
   <p:clrMapOvr>
     <a:masterClrMapping/>
   </p:clrMapOvr>
-  <mc:AlternateContent xmlns:mc="http://schemas.openxmlformats.org/markup-compatibility/2006">
-    <mc:Choice xmlns:p14="http://schemas.microsoft.com/office/powerpoint/2010/main" Requires="p14">
+  <mc:AlternateContent xmlns:mc="http://schemas.openxmlformats.org/markup-compatibility/2006" xmlns:p14="http://schemas.microsoft.com/office/powerpoint/2010/main">
+    <mc:Choice Requires="p14">
       <p:transition spd="med" p14:dur="700">
         <p:fade/>
       </p:transition>
     </mc:Choice>
-    <mc:Fallback>
+    <mc:Fallback xmlns="">
       <p:transition spd="med">
         <p:fade/>
       </p:transition>
@@ -13772,13 +13773,13 @@
   <p:clrMapOvr>
     <a:masterClrMapping/>
   </p:clrMapOvr>
-  <mc:AlternateContent xmlns:mc="http://schemas.openxmlformats.org/markup-compatibility/2006">
-    <mc:Choice xmlns:p14="http://schemas.microsoft.com/office/powerpoint/2010/main" Requires="p14">
+  <mc:AlternateContent xmlns:mc="http://schemas.openxmlformats.org/markup-compatibility/2006" xmlns:p14="http://schemas.microsoft.com/office/powerpoint/2010/main">
+    <mc:Choice Requires="p14">
       <p:transition spd="med" p14:dur="700">
         <p:fade/>
       </p:transition>
     </mc:Choice>
-    <mc:Fallback>
+    <mc:Fallback xmlns="">
       <p:transition spd="med">
         <p:fade/>
       </p:transition>
@@ -14010,13 +14011,13 @@
     <p:sldLayoutId id="2147483697" r:id="rId18"/>
     <p:sldLayoutId id="2147483674" r:id="rId19"/>
   </p:sldLayoutIdLst>
-  <mc:AlternateContent xmlns:mc="http://schemas.openxmlformats.org/markup-compatibility/2006">
-    <mc:Choice xmlns:p14="http://schemas.microsoft.com/office/powerpoint/2010/main" Requires="p14">
+  <mc:AlternateContent xmlns:mc="http://schemas.openxmlformats.org/markup-compatibility/2006" xmlns:p14="http://schemas.microsoft.com/office/powerpoint/2010/main">
+    <mc:Choice Requires="p14">
       <p:transition spd="med" p14:dur="700">
         <p:fade/>
       </p:transition>
     </mc:Choice>
-    <mc:Fallback>
+    <mc:Fallback xmlns="">
       <p:transition spd="med">
         <p:fade/>
       </p:transition>
@@ -14706,13 +14707,13 @@
   <p:clrMapOvr>
     <a:masterClrMapping/>
   </p:clrMapOvr>
-  <mc:AlternateContent xmlns:mc="http://schemas.openxmlformats.org/markup-compatibility/2006">
-    <mc:Choice xmlns:p14="http://schemas.microsoft.com/office/powerpoint/2010/main" Requires="p14">
+  <mc:AlternateContent xmlns:mc="http://schemas.openxmlformats.org/markup-compatibility/2006" xmlns:p14="http://schemas.microsoft.com/office/powerpoint/2010/main">
+    <mc:Choice Requires="p14">
       <p:transition spd="med" p14:dur="700">
         <p:fade/>
       </p:transition>
     </mc:Choice>
-    <mc:Fallback>
+    <mc:Fallback xmlns="">
       <p:transition spd="med">
         <p:fade/>
       </p:transition>
@@ -14740,10 +14741,10 @@
       </p:grpSpPr>
       <p:sp>
         <p:nvSpPr>
-          <p:cNvPr id="2" name="Footer Placeholder 1">
-            <a:extLst>
-              <a:ext uri="{FF2B5EF4-FFF2-40B4-BE49-F238E27FC236}">
-                <a16:creationId xmlns:a16="http://schemas.microsoft.com/office/drawing/2014/main" id="{9D9AD0DD-1112-FD88-8C7E-1DF28D01FFA8}"/>
+          <p:cNvPr id="3" name="Segnaposto piè di pagina 2">
+            <a:extLst>
+              <a:ext uri="{FF2B5EF4-FFF2-40B4-BE49-F238E27FC236}">
+                <a16:creationId xmlns:a16="http://schemas.microsoft.com/office/drawing/2014/main" id="{B04C11C9-3DF6-471E-87C0-4DCED41031D4}"/>
               </a:ext>
             </a:extLst>
           </p:cNvPr>
@@ -14761,7 +14762,7 @@
           </a:xfrm>
         </p:spPr>
         <p:txBody>
-          <a:bodyPr anchor="ctr">
+          <a:bodyPr rtlCol="0" anchor="ctr">
             <a:normAutofit/>
           </a:bodyPr>
           <a:lstStyle/>
@@ -14772,7 +14773,7 @@
               </a:spcAft>
             </a:pPr>
             <a:r>
-              <a:rPr lang="it-IT" noProof="0"/>
+              <a:rPr lang="it-IT"/>
               <a:t>Aggiungere un piè di pagina</a:t>
             </a:r>
           </a:p>
@@ -14780,10 +14781,10 @@
       </p:sp>
       <p:sp>
         <p:nvSpPr>
-          <p:cNvPr id="3" name="Slide Number Placeholder 2">
-            <a:extLst>
-              <a:ext uri="{FF2B5EF4-FFF2-40B4-BE49-F238E27FC236}">
-                <a16:creationId xmlns:a16="http://schemas.microsoft.com/office/drawing/2014/main" id="{6BB7A6F8-28FD-49F0-978A-281155BE4273}"/>
+          <p:cNvPr id="4" name="Segnaposto numero diapositiva 3">
+            <a:extLst>
+              <a:ext uri="{FF2B5EF4-FFF2-40B4-BE49-F238E27FC236}">
+                <a16:creationId xmlns:a16="http://schemas.microsoft.com/office/drawing/2014/main" id="{B2228214-87DB-4B3A-BD81-9A709A69BAAC}"/>
               </a:ext>
             </a:extLst>
           </p:cNvPr>
@@ -14801,7 +14802,7 @@
           </a:xfrm>
         </p:spPr>
         <p:txBody>
-          <a:bodyPr anchor="ctr">
+          <a:bodyPr rtlCol="0" anchor="ctr">
             <a:normAutofit/>
           </a:bodyPr>
           <a:lstStyle/>
@@ -14812,7 +14813,7 @@
               </a:spcAft>
             </a:pPr>
             <a:fld id="{8699F50C-BE38-4BD0-BA84-9B090E1F2B9B}" type="slidenum">
-              <a:rPr lang="it-IT" noProof="0" smtClean="0"/>
+              <a:rPr lang="it-IT" smtClean="0"/>
               <a:pPr rtl="0">
                 <a:spcAft>
                   <a:spcPts val="600"/>
@@ -14820,16 +14821,16 @@
               </a:pPr>
               <a:t>10</a:t>
             </a:fld>
-            <a:endParaRPr lang="it-IT" noProof="0"/>
-          </a:p>
-        </p:txBody>
-      </p:sp>
-      <p:sp>
-        <p:nvSpPr>
-          <p:cNvPr id="11" name="Title 3">
-            <a:extLst>
-              <a:ext uri="{FF2B5EF4-FFF2-40B4-BE49-F238E27FC236}">
-                <a16:creationId xmlns:a16="http://schemas.microsoft.com/office/drawing/2014/main" id="{FF766A4B-0274-2485-D0F9-6582F421AB18}"/>
+            <a:endParaRPr lang="it-IT"/>
+          </a:p>
+        </p:txBody>
+      </p:sp>
+      <p:sp>
+        <p:nvSpPr>
+          <p:cNvPr id="9" name="Title 3">
+            <a:extLst>
+              <a:ext uri="{FF2B5EF4-FFF2-40B4-BE49-F238E27FC236}">
+                <a16:creationId xmlns:a16="http://schemas.microsoft.com/office/drawing/2014/main" id="{3BC6C6B7-BB91-7C9A-8402-71709F926E70}"/>
               </a:ext>
             </a:extLst>
           </p:cNvPr>
@@ -14852,17 +14853,17 @@
           <a:p>
             <a:r>
               <a:rPr lang="en-US" dirty="0"/>
-              <a:t>Power consumption</a:t>
+              <a:t>Control signals of each actuator</a:t>
             </a:r>
           </a:p>
         </p:txBody>
       </p:sp>
       <p:pic>
         <p:nvPicPr>
-          <p:cNvPr id="8" name="Content Placeholder 7" descr="Chart, histogram&#10;&#10;Description automatically generated">
-            <a:extLst>
-              <a:ext uri="{FF2B5EF4-FFF2-40B4-BE49-F238E27FC236}">
-                <a16:creationId xmlns:a16="http://schemas.microsoft.com/office/drawing/2014/main" id="{338681AF-8894-1CFC-C2E3-9F98CCB2AC37}"/>
+          <p:cNvPr id="10" name="Content Placeholder 9" descr="Chart, histogram&#10;&#10;Description automatically generated">
+            <a:extLst>
+              <a:ext uri="{FF2B5EF4-FFF2-40B4-BE49-F238E27FC236}">
+                <a16:creationId xmlns:a16="http://schemas.microsoft.com/office/drawing/2014/main" id="{41E11D2C-690D-3C49-FBE8-55C511485124}"/>
               </a:ext>
             </a:extLst>
           </p:cNvPr>
@@ -14870,49 +14871,77 @@
             <a:picLocks noGrp="1" noChangeAspect="1"/>
           </p:cNvPicPr>
           <p:nvPr>
-            <p:ph idx="1"/>
+            <p:ph sz="half" idx="1"/>
           </p:nvPr>
         </p:nvPicPr>
         <p:blipFill>
-          <a:blip r:embed="rId3"/>
+          <a:blip r:embed="rId4"/>
           <a:stretch>
             <a:fillRect/>
           </a:stretch>
         </p:blipFill>
         <p:spPr>
           <a:xfrm>
-            <a:off x="807227" y="1604011"/>
-            <a:ext cx="8597439" cy="4505325"/>
+            <a:off x="518678" y="2189018"/>
+            <a:ext cx="5375003" cy="3276609"/>
           </a:xfrm>
         </p:spPr>
       </p:pic>
       <p:pic>
         <p:nvPicPr>
-          <p:cNvPr id="22" name="Picture 21" descr="\documentclass{article}&#10;\usepackage{amsmath}&#10;\pagestyle{empty}&#10;\begin{document}&#10;&#10;&#10;\begin{equation}&#10;P_{loss} = P_{pump}+P_{heaters}+P_{ambient}&#10;\end{equation}&#10;\\&#10;\begin{equation}&#10;P_{average} \to 3657.26 \, W&#10;\end{equation}&#10;&#10;&#10;&#10;\end{document}" title="IguanaTex Bitmap Display">
-            <a:extLst>
-              <a:ext uri="{FF2B5EF4-FFF2-40B4-BE49-F238E27FC236}">
-                <a16:creationId xmlns:a16="http://schemas.microsoft.com/office/drawing/2014/main" id="{076D2DAE-2EAC-3DA6-C999-83A4B151D471}"/>
+          <p:cNvPr id="28" name="Content Placeholder 27" descr="Chart, histogram&#10;&#10;Description automatically generated">
+            <a:extLst>
+              <a:ext uri="{FF2B5EF4-FFF2-40B4-BE49-F238E27FC236}">
+                <a16:creationId xmlns:a16="http://schemas.microsoft.com/office/drawing/2014/main" id="{22C803CC-7957-1953-F3A9-5FD20962D957}"/>
               </a:ext>
             </a:extLst>
           </p:cNvPr>
           <p:cNvPicPr>
-            <a:picLocks noChangeAspect="1"/>
+            <a:picLocks noGrp="1" noChangeAspect="1"/>
           </p:cNvPicPr>
           <p:nvPr>
-            <p:custDataLst>
-              <p:tags r:id="rId1"/>
-            </p:custDataLst>
+            <p:ph sz="half" idx="2"/>
           </p:nvPr>
         </p:nvPicPr>
         <p:blipFill rotWithShape="1">
-          <a:blip r:embed="rId4"/>
-          <a:srcRect r="36686"/>
+          <a:blip r:embed="rId5"/>
+          <a:srcRect t="2537"/>
           <a:stretch/>
         </p:blipFill>
         <p:spPr>
           <a:xfrm>
-            <a:off x="7892988" y="2338509"/>
-            <a:ext cx="3994210" cy="1327238"/>
+            <a:off x="6199741" y="2272145"/>
+            <a:ext cx="5339660" cy="3193482"/>
+          </a:xfrm>
+        </p:spPr>
+      </p:pic>
+      <p:pic>
+        <p:nvPicPr>
+          <p:cNvPr id="7" name="Picture 6" descr="\documentclass{article}&#10;\usepackage{amsmath}&#10;\pagestyle{empty}&#10;\begin{document}&#10;&#10;\begin{equation}&#10;\begin{cases}&#10;\alpha \in [0,1] \\&#10;\beta \in [0,1]&#10;\end{cases}&#10;\end{equation}&#10;&#10;&#10;\end{document}" title="IguanaTex Bitmap Display">
+            <a:extLst>
+              <a:ext uri="{FF2B5EF4-FFF2-40B4-BE49-F238E27FC236}">
+                <a16:creationId xmlns:a16="http://schemas.microsoft.com/office/drawing/2014/main" id="{9E56AFFE-FBC2-F061-E75B-8B0C8BF8CC70}"/>
+              </a:ext>
+            </a:extLst>
+          </p:cNvPr>
+          <p:cNvPicPr>
+            <a:picLocks noChangeAspect="1"/>
+          </p:cNvPicPr>
+          <p:nvPr>
+            <p:custDataLst>
+              <p:tags r:id="rId1"/>
+            </p:custDataLst>
+          </p:nvPr>
+        </p:nvPicPr>
+        <p:blipFill rotWithShape="1">
+          <a:blip r:embed="rId6"/>
+          <a:srcRect r="75972"/>
+          <a:stretch/>
+        </p:blipFill>
+        <p:spPr>
+          <a:xfrm>
+            <a:off x="9225242" y="1125249"/>
+            <a:ext cx="1210068" cy="758857"/>
           </a:xfrm>
           <a:prstGeom prst="rect">
             <a:avLst/>
@@ -14922,20 +14951,20 @@
     </p:spTree>
     <p:extLst>
       <p:ext uri="{BB962C8B-B14F-4D97-AF65-F5344CB8AC3E}">
-        <p14:creationId xmlns:p14="http://schemas.microsoft.com/office/powerpoint/2010/main" val="2948321686"/>
+        <p14:creationId xmlns:p14="http://schemas.microsoft.com/office/powerpoint/2010/main" val="4063690498"/>
       </p:ext>
     </p:extLst>
   </p:cSld>
   <p:clrMapOvr>
     <a:masterClrMapping/>
   </p:clrMapOvr>
-  <mc:AlternateContent xmlns:mc="http://schemas.openxmlformats.org/markup-compatibility/2006">
-    <mc:Choice xmlns:p14="http://schemas.microsoft.com/office/powerpoint/2010/main" Requires="p14">
+  <mc:AlternateContent xmlns:mc="http://schemas.openxmlformats.org/markup-compatibility/2006" xmlns:p14="http://schemas.microsoft.com/office/powerpoint/2010/main">
+    <mc:Choice Requires="p14">
       <p:transition spd="med" p14:dur="700">
         <p:fade/>
       </p:transition>
     </mc:Choice>
-    <mc:Fallback>
+    <mc:Fallback xmlns="">
       <p:transition spd="med">
         <p:fade/>
       </p:transition>
@@ -14966,6 +14995,230 @@
           <p:cNvPr id="2" name="Footer Placeholder 1">
             <a:extLst>
               <a:ext uri="{FF2B5EF4-FFF2-40B4-BE49-F238E27FC236}">
+                <a16:creationId xmlns:a16="http://schemas.microsoft.com/office/drawing/2014/main" id="{9D9AD0DD-1112-FD88-8C7E-1DF28D01FFA8}"/>
+              </a:ext>
+            </a:extLst>
+          </p:cNvPr>
+          <p:cNvSpPr>
+            <a:spLocks noGrp="1"/>
+          </p:cNvSpPr>
+          <p:nvPr>
+            <p:ph type="ftr" sz="quarter" idx="17"/>
+          </p:nvPr>
+        </p:nvSpPr>
+        <p:spPr>
+          <a:xfrm>
+            <a:off x="338530" y="6356350"/>
+            <a:ext cx="4114800" cy="365125"/>
+          </a:xfrm>
+        </p:spPr>
+        <p:txBody>
+          <a:bodyPr anchor="ctr">
+            <a:normAutofit/>
+          </a:bodyPr>
+          <a:lstStyle/>
+          <a:p>
+            <a:pPr rtl="0">
+              <a:spcAft>
+                <a:spcPts val="600"/>
+              </a:spcAft>
+            </a:pPr>
+            <a:r>
+              <a:rPr lang="it-IT" noProof="0"/>
+              <a:t>Aggiungere un piè di pagina</a:t>
+            </a:r>
+          </a:p>
+        </p:txBody>
+      </p:sp>
+      <p:sp>
+        <p:nvSpPr>
+          <p:cNvPr id="3" name="Slide Number Placeholder 2">
+            <a:extLst>
+              <a:ext uri="{FF2B5EF4-FFF2-40B4-BE49-F238E27FC236}">
+                <a16:creationId xmlns:a16="http://schemas.microsoft.com/office/drawing/2014/main" id="{6BB7A6F8-28FD-49F0-978A-281155BE4273}"/>
+              </a:ext>
+            </a:extLst>
+          </p:cNvPr>
+          <p:cNvSpPr>
+            <a:spLocks noGrp="1"/>
+          </p:cNvSpPr>
+          <p:nvPr>
+            <p:ph type="sldNum" sz="quarter" idx="18"/>
+          </p:nvPr>
+        </p:nvSpPr>
+        <p:spPr>
+          <a:xfrm>
+            <a:off x="11146971" y="6356350"/>
+            <a:ext cx="740227" cy="365125"/>
+          </a:xfrm>
+        </p:spPr>
+        <p:txBody>
+          <a:bodyPr anchor="ctr">
+            <a:normAutofit/>
+          </a:bodyPr>
+          <a:lstStyle/>
+          <a:p>
+            <a:pPr rtl="0">
+              <a:spcAft>
+                <a:spcPts val="600"/>
+              </a:spcAft>
+            </a:pPr>
+            <a:fld id="{8699F50C-BE38-4BD0-BA84-9B090E1F2B9B}" type="slidenum">
+              <a:rPr lang="it-IT" noProof="0" smtClean="0"/>
+              <a:pPr rtl="0">
+                <a:spcAft>
+                  <a:spcPts val="600"/>
+                </a:spcAft>
+              </a:pPr>
+              <a:t>11</a:t>
+            </a:fld>
+            <a:endParaRPr lang="it-IT" noProof="0"/>
+          </a:p>
+        </p:txBody>
+      </p:sp>
+      <p:sp>
+        <p:nvSpPr>
+          <p:cNvPr id="11" name="Title 3">
+            <a:extLst>
+              <a:ext uri="{FF2B5EF4-FFF2-40B4-BE49-F238E27FC236}">
+                <a16:creationId xmlns:a16="http://schemas.microsoft.com/office/drawing/2014/main" id="{FF766A4B-0274-2485-D0F9-6582F421AB18}"/>
+              </a:ext>
+            </a:extLst>
+          </p:cNvPr>
+          <p:cNvSpPr>
+            <a:spLocks noGrp="1"/>
+          </p:cNvSpPr>
+          <p:nvPr>
+            <p:ph type="title"/>
+          </p:nvPr>
+        </p:nvSpPr>
+        <p:spPr>
+          <a:xfrm>
+            <a:off x="518678" y="209028"/>
+            <a:ext cx="8333222" cy="1147969"/>
+          </a:xfrm>
+        </p:spPr>
+        <p:txBody>
+          <a:bodyPr/>
+          <a:lstStyle/>
+          <a:p>
+            <a:r>
+              <a:rPr lang="en-US" dirty="0"/>
+              <a:t>Power consumption</a:t>
+            </a:r>
+          </a:p>
+        </p:txBody>
+      </p:sp>
+      <p:pic>
+        <p:nvPicPr>
+          <p:cNvPr id="8" name="Content Placeholder 7" descr="Chart, histogram&#10;&#10;Description automatically generated">
+            <a:extLst>
+              <a:ext uri="{FF2B5EF4-FFF2-40B4-BE49-F238E27FC236}">
+                <a16:creationId xmlns:a16="http://schemas.microsoft.com/office/drawing/2014/main" id="{338681AF-8894-1CFC-C2E3-9F98CCB2AC37}"/>
+              </a:ext>
+            </a:extLst>
+          </p:cNvPr>
+          <p:cNvPicPr>
+            <a:picLocks noGrp="1" noChangeAspect="1"/>
+          </p:cNvPicPr>
+          <p:nvPr>
+            <p:ph idx="1"/>
+          </p:nvPr>
+        </p:nvPicPr>
+        <p:blipFill>
+          <a:blip r:embed="rId3"/>
+          <a:stretch>
+            <a:fillRect/>
+          </a:stretch>
+        </p:blipFill>
+        <p:spPr>
+          <a:xfrm>
+            <a:off x="807227" y="1604011"/>
+            <a:ext cx="8597439" cy="4505325"/>
+          </a:xfrm>
+        </p:spPr>
+      </p:pic>
+      <p:pic>
+        <p:nvPicPr>
+          <p:cNvPr id="5" name="Picture 4" descr="\documentclass{article}&#10;\usepackage{amsmath}&#10;\pagestyle{empty}&#10;\begin{document}&#10;&#10;\begin{equation*}&#10;    \begin{aligned}&#10;        P_{tot}=&amp; P_{pump }+P_{heaters }+P_{ambient} \\&#10;        &amp; P_{average} \rightarrow 3657.26 \mathrm{~W}&#10;        \end{aligned}&#10;\end{equation*}&#10;&#10;&#10;\end{document}" title="IguanaTex Bitmap Display">
+            <a:extLst>
+              <a:ext uri="{FF2B5EF4-FFF2-40B4-BE49-F238E27FC236}">
+                <a16:creationId xmlns:a16="http://schemas.microsoft.com/office/drawing/2014/main" id="{29604C91-5439-3874-A47F-30F463BFEE17}"/>
+              </a:ext>
+            </a:extLst>
+          </p:cNvPr>
+          <p:cNvPicPr>
+            <a:picLocks noChangeAspect="1"/>
+          </p:cNvPicPr>
+          <p:nvPr>
+            <p:custDataLst>
+              <p:tags r:id="rId1"/>
+            </p:custDataLst>
+          </p:nvPr>
+        </p:nvPicPr>
+        <p:blipFill>
+          <a:blip r:embed="rId4"/>
+          <a:stretch>
+            <a:fillRect/>
+          </a:stretch>
+        </p:blipFill>
+        <p:spPr>
+          <a:xfrm>
+            <a:off x="8132532" y="2414165"/>
+            <a:ext cx="3754666" cy="626286"/>
+          </a:xfrm>
+          <a:prstGeom prst="rect">
+            <a:avLst/>
+          </a:prstGeom>
+        </p:spPr>
+      </p:pic>
+    </p:spTree>
+    <p:extLst>
+      <p:ext uri="{BB962C8B-B14F-4D97-AF65-F5344CB8AC3E}">
+        <p14:creationId xmlns:p14="http://schemas.microsoft.com/office/powerpoint/2010/main" val="2948321686"/>
+      </p:ext>
+    </p:extLst>
+  </p:cSld>
+  <p:clrMapOvr>
+    <a:masterClrMapping/>
+  </p:clrMapOvr>
+  <mc:AlternateContent xmlns:mc="http://schemas.openxmlformats.org/markup-compatibility/2006" xmlns:p14="http://schemas.microsoft.com/office/powerpoint/2010/main">
+    <mc:Choice Requires="p14">
+      <p:transition spd="med" p14:dur="700">
+        <p:fade/>
+      </p:transition>
+    </mc:Choice>
+    <mc:Fallback xmlns="">
+      <p:transition spd="med">
+        <p:fade/>
+      </p:transition>
+    </mc:Fallback>
+  </mc:AlternateContent>
+</p:sld>
+</file>
+
+<file path=ppt/slides/slide12.xml><?xml version="1.0" encoding="utf-8"?>
+<p:sld xmlns:a="http://schemas.openxmlformats.org/drawingml/2006/main" xmlns:r="http://schemas.openxmlformats.org/officeDocument/2006/relationships" xmlns:p="http://schemas.openxmlformats.org/presentationml/2006/main">
+  <p:cSld>
+    <p:spTree>
+      <p:nvGrpSpPr>
+        <p:cNvPr id="1" name=""/>
+        <p:cNvGrpSpPr/>
+        <p:nvPr/>
+      </p:nvGrpSpPr>
+      <p:grpSpPr>
+        <a:xfrm>
+          <a:off x="0" y="0"/>
+          <a:ext cx="0" cy="0"/>
+          <a:chOff x="0" y="0"/>
+          <a:chExt cx="0" cy="0"/>
+        </a:xfrm>
+      </p:grpSpPr>
+      <p:sp>
+        <p:nvSpPr>
+          <p:cNvPr id="2" name="Footer Placeholder 1">
+            <a:extLst>
+              <a:ext uri="{FF2B5EF4-FFF2-40B4-BE49-F238E27FC236}">
                 <a16:creationId xmlns:a16="http://schemas.microsoft.com/office/drawing/2014/main" id="{91EFEE42-AA19-5930-333D-369A707272EB}"/>
               </a:ext>
             </a:extLst>
@@ -15015,7 +15268,7 @@
             <a:pPr rtl="0"/>
             <a:fld id="{8699F50C-BE38-4BD0-BA84-9B090E1F2B9B}" type="slidenum">
               <a:rPr lang="it-IT" noProof="0" smtClean="0"/>
-              <a:t>11</a:t>
+              <a:t>12</a:t>
             </a:fld>
             <a:endParaRPr lang="it-IT" noProof="0" dirty="0"/>
           </a:p>
@@ -15122,13 +15375,13 @@
   <p:clrMapOvr>
     <a:masterClrMapping/>
   </p:clrMapOvr>
-  <mc:AlternateContent xmlns:mc="http://schemas.openxmlformats.org/markup-compatibility/2006">
-    <mc:Choice xmlns:p159="http://schemas.microsoft.com/office/powerpoint/2015/09/main" Requires="p159">
+  <mc:AlternateContent xmlns:mc="http://schemas.openxmlformats.org/markup-compatibility/2006" xmlns:p159="http://schemas.microsoft.com/office/powerpoint/2015/09/main">
+    <mc:Choice Requires="p159">
       <p:transition xmlns:p14="http://schemas.microsoft.com/office/powerpoint/2010/main" spd="slow" p14:dur="2000">
         <p159:morph option="byObject"/>
       </p:transition>
     </mc:Choice>
-    <mc:Fallback>
+    <mc:Fallback xmlns="">
       <p:transition spd="slow">
         <p:fade/>
       </p:transition>
@@ -15137,7 +15390,7 @@
 </p:sld>
 </file>
 
-<file path=ppt/slides/slide12.xml><?xml version="1.0" encoding="utf-8"?>
+<file path=ppt/slides/slide13.xml><?xml version="1.0" encoding="utf-8"?>
 <p:sld xmlns:a="http://schemas.openxmlformats.org/drawingml/2006/main" xmlns:r="http://schemas.openxmlformats.org/officeDocument/2006/relationships" xmlns:p="http://schemas.openxmlformats.org/presentationml/2006/main">
   <p:cSld>
     <p:spTree>
@@ -15208,7 +15461,7 @@
             <a:fld id="{8699F50C-BE38-4BD0-BA84-9B090E1F2B9B}" type="slidenum">
               <a:rPr lang="it-IT" smtClean="0"/>
               <a:pPr rtl="0"/>
-              <a:t>12</a:t>
+              <a:t>13</a:t>
             </a:fld>
             <a:endParaRPr lang="it-IT" dirty="0"/>
           </a:p>
@@ -15254,115 +15507,13 @@
   <p:clrMapOvr>
     <a:masterClrMapping/>
   </p:clrMapOvr>
-  <mc:AlternateContent xmlns:mc="http://schemas.openxmlformats.org/markup-compatibility/2006">
-    <mc:Choice xmlns:p14="http://schemas.microsoft.com/office/powerpoint/2010/main" Requires="p14">
+  <mc:AlternateContent xmlns:mc="http://schemas.openxmlformats.org/markup-compatibility/2006" xmlns:p14="http://schemas.microsoft.com/office/powerpoint/2010/main">
+    <mc:Choice Requires="p14">
       <p:transition spd="med" p14:dur="700">
         <p:fade/>
       </p:transition>
     </mc:Choice>
-    <mc:Fallback>
-      <p:transition spd="med">
-        <p:fade/>
-      </p:transition>
-    </mc:Fallback>
-  </mc:AlternateContent>
-</p:sld>
-</file>
-
-<file path=ppt/slides/slide13.xml><?xml version="1.0" encoding="utf-8"?>
-<p:sld xmlns:a="http://schemas.openxmlformats.org/drawingml/2006/main" xmlns:r="http://schemas.openxmlformats.org/officeDocument/2006/relationships" xmlns:p="http://schemas.openxmlformats.org/presentationml/2006/main">
-  <p:cSld>
-    <p:spTree>
-      <p:nvGrpSpPr>
-        <p:cNvPr id="1" name=""/>
-        <p:cNvGrpSpPr/>
-        <p:nvPr/>
-      </p:nvGrpSpPr>
-      <p:grpSpPr>
-        <a:xfrm>
-          <a:off x="0" y="0"/>
-          <a:ext cx="0" cy="0"/>
-          <a:chOff x="0" y="0"/>
-          <a:chExt cx="0" cy="0"/>
-        </a:xfrm>
-      </p:grpSpPr>
-      <p:sp>
-        <p:nvSpPr>
-          <p:cNvPr id="3" name="Segnaposto piè di pagina 2">
-            <a:extLst>
-              <a:ext uri="{FF2B5EF4-FFF2-40B4-BE49-F238E27FC236}">
-                <a16:creationId xmlns:a16="http://schemas.microsoft.com/office/drawing/2014/main" id="{B04C11C9-3DF6-471E-87C0-4DCED41031D4}"/>
-              </a:ext>
-            </a:extLst>
-          </p:cNvPr>
-          <p:cNvSpPr>
-            <a:spLocks noGrp="1"/>
-          </p:cNvSpPr>
-          <p:nvPr>
-            <p:ph type="ftr" sz="quarter" idx="17"/>
-          </p:nvPr>
-        </p:nvSpPr>
-        <p:spPr/>
-        <p:txBody>
-          <a:bodyPr rtlCol="0"/>
-          <a:lstStyle/>
-          <a:p>
-            <a:pPr rtl="0"/>
-            <a:r>
-              <a:rPr lang="it-IT" dirty="0"/>
-              <a:t>Aggiungere un piè di pagina</a:t>
-            </a:r>
-          </a:p>
-        </p:txBody>
-      </p:sp>
-      <p:sp>
-        <p:nvSpPr>
-          <p:cNvPr id="4" name="Segnaposto numero diapositiva 3">
-            <a:extLst>
-              <a:ext uri="{FF2B5EF4-FFF2-40B4-BE49-F238E27FC236}">
-                <a16:creationId xmlns:a16="http://schemas.microsoft.com/office/drawing/2014/main" id="{B2228214-87DB-4B3A-BD81-9A709A69BAAC}"/>
-              </a:ext>
-            </a:extLst>
-          </p:cNvPr>
-          <p:cNvSpPr>
-            <a:spLocks noGrp="1"/>
-          </p:cNvSpPr>
-          <p:nvPr>
-            <p:ph type="sldNum" sz="quarter" idx="18"/>
-          </p:nvPr>
-        </p:nvSpPr>
-        <p:spPr/>
-        <p:txBody>
-          <a:bodyPr rtlCol="0"/>
-          <a:lstStyle/>
-          <a:p>
-            <a:pPr rtl="0"/>
-            <a:fld id="{8699F50C-BE38-4BD0-BA84-9B090E1F2B9B}" type="slidenum">
-              <a:rPr lang="it-IT" smtClean="0"/>
-              <a:pPr rtl="0"/>
-              <a:t>13</a:t>
-            </a:fld>
-            <a:endParaRPr lang="it-IT" dirty="0"/>
-          </a:p>
-        </p:txBody>
-      </p:sp>
-    </p:spTree>
-    <p:extLst>
-      <p:ext uri="{BB962C8B-B14F-4D97-AF65-F5344CB8AC3E}">
-        <p14:creationId xmlns:p14="http://schemas.microsoft.com/office/powerpoint/2010/main" val="370069540"/>
-      </p:ext>
-    </p:extLst>
-  </p:cSld>
-  <p:clrMapOvr>
-    <a:masterClrMapping/>
-  </p:clrMapOvr>
-  <mc:AlternateContent xmlns:mc="http://schemas.openxmlformats.org/markup-compatibility/2006">
-    <mc:Choice xmlns:p14="http://schemas.microsoft.com/office/powerpoint/2010/main" Requires="p14">
-      <p:transition spd="med" p14:dur="700">
-        <p:fade/>
-      </p:transition>
-    </mc:Choice>
-    <mc:Fallback>
+    <mc:Fallback xmlns="">
       <p:transition spd="med">
         <p:fade/>
       </p:transition>
@@ -15451,20 +15602,20 @@
     </p:spTree>
     <p:extLst>
       <p:ext uri="{BB962C8B-B14F-4D97-AF65-F5344CB8AC3E}">
-        <p14:creationId xmlns:p14="http://schemas.microsoft.com/office/powerpoint/2010/main" val="2968895261"/>
+        <p14:creationId xmlns:p14="http://schemas.microsoft.com/office/powerpoint/2010/main" val="370069540"/>
       </p:ext>
     </p:extLst>
   </p:cSld>
   <p:clrMapOvr>
     <a:masterClrMapping/>
   </p:clrMapOvr>
-  <mc:AlternateContent xmlns:mc="http://schemas.openxmlformats.org/markup-compatibility/2006">
-    <mc:Choice xmlns:p14="http://schemas.microsoft.com/office/powerpoint/2010/main" Requires="p14">
+  <mc:AlternateContent xmlns:mc="http://schemas.openxmlformats.org/markup-compatibility/2006" xmlns:p14="http://schemas.microsoft.com/office/powerpoint/2010/main">
+    <mc:Choice Requires="p14">
       <p:transition spd="med" p14:dur="700">
         <p:fade/>
       </p:transition>
     </mc:Choice>
-    <mc:Fallback>
+    <mc:Fallback xmlns="">
       <p:transition spd="med">
         <p:fade/>
       </p:transition>
@@ -15553,20 +15704,20 @@
     </p:spTree>
     <p:extLst>
       <p:ext uri="{BB962C8B-B14F-4D97-AF65-F5344CB8AC3E}">
-        <p14:creationId xmlns:p14="http://schemas.microsoft.com/office/powerpoint/2010/main" val="65386675"/>
+        <p14:creationId xmlns:p14="http://schemas.microsoft.com/office/powerpoint/2010/main" val="2968895261"/>
       </p:ext>
     </p:extLst>
   </p:cSld>
   <p:clrMapOvr>
     <a:masterClrMapping/>
   </p:clrMapOvr>
-  <mc:AlternateContent xmlns:mc="http://schemas.openxmlformats.org/markup-compatibility/2006">
-    <mc:Choice xmlns:p14="http://schemas.microsoft.com/office/powerpoint/2010/main" Requires="p14">
+  <mc:AlternateContent xmlns:mc="http://schemas.openxmlformats.org/markup-compatibility/2006" xmlns:p14="http://schemas.microsoft.com/office/powerpoint/2010/main">
+    <mc:Choice Requires="p14">
       <p:transition spd="med" p14:dur="700">
         <p:fade/>
       </p:transition>
     </mc:Choice>
-    <mc:Fallback>
+    <mc:Fallback xmlns="">
       <p:transition spd="med">
         <p:fade/>
       </p:transition>
@@ -15655,20 +15806,20 @@
     </p:spTree>
     <p:extLst>
       <p:ext uri="{BB962C8B-B14F-4D97-AF65-F5344CB8AC3E}">
-        <p14:creationId xmlns:p14="http://schemas.microsoft.com/office/powerpoint/2010/main" val="870181371"/>
+        <p14:creationId xmlns:p14="http://schemas.microsoft.com/office/powerpoint/2010/main" val="65386675"/>
       </p:ext>
     </p:extLst>
   </p:cSld>
   <p:clrMapOvr>
     <a:masterClrMapping/>
   </p:clrMapOvr>
-  <mc:AlternateContent xmlns:mc="http://schemas.openxmlformats.org/markup-compatibility/2006">
-    <mc:Choice xmlns:p14="http://schemas.microsoft.com/office/powerpoint/2010/main" Requires="p14">
+  <mc:AlternateContent xmlns:mc="http://schemas.openxmlformats.org/markup-compatibility/2006" xmlns:p14="http://schemas.microsoft.com/office/powerpoint/2010/main">
+    <mc:Choice Requires="p14">
       <p:transition spd="med" p14:dur="700">
         <p:fade/>
       </p:transition>
     </mc:Choice>
-    <mc:Fallback>
+    <mc:Fallback xmlns="">
       <p:transition spd="med">
         <p:fade/>
       </p:transition>
@@ -15757,20 +15908,20 @@
     </p:spTree>
     <p:extLst>
       <p:ext uri="{BB962C8B-B14F-4D97-AF65-F5344CB8AC3E}">
-        <p14:creationId xmlns:p14="http://schemas.microsoft.com/office/powerpoint/2010/main" val="1945657091"/>
+        <p14:creationId xmlns:p14="http://schemas.microsoft.com/office/powerpoint/2010/main" val="870181371"/>
       </p:ext>
     </p:extLst>
   </p:cSld>
   <p:clrMapOvr>
     <a:masterClrMapping/>
   </p:clrMapOvr>
-  <mc:AlternateContent xmlns:mc="http://schemas.openxmlformats.org/markup-compatibility/2006">
-    <mc:Choice xmlns:p14="http://schemas.microsoft.com/office/powerpoint/2010/main" Requires="p14">
+  <mc:AlternateContent xmlns:mc="http://schemas.openxmlformats.org/markup-compatibility/2006" xmlns:p14="http://schemas.microsoft.com/office/powerpoint/2010/main">
+    <mc:Choice Requires="p14">
       <p:transition spd="med" p14:dur="700">
         <p:fade/>
       </p:transition>
     </mc:Choice>
-    <mc:Fallback>
+    <mc:Fallback xmlns="">
       <p:transition spd="med">
         <p:fade/>
       </p:transition>
@@ -15780,6 +15931,108 @@
 </file>
 
 <file path=ppt/slides/slide18.xml><?xml version="1.0" encoding="utf-8"?>
+<p:sld xmlns:a="http://schemas.openxmlformats.org/drawingml/2006/main" xmlns:r="http://schemas.openxmlformats.org/officeDocument/2006/relationships" xmlns:p="http://schemas.openxmlformats.org/presentationml/2006/main">
+  <p:cSld>
+    <p:spTree>
+      <p:nvGrpSpPr>
+        <p:cNvPr id="1" name=""/>
+        <p:cNvGrpSpPr/>
+        <p:nvPr/>
+      </p:nvGrpSpPr>
+      <p:grpSpPr>
+        <a:xfrm>
+          <a:off x="0" y="0"/>
+          <a:ext cx="0" cy="0"/>
+          <a:chOff x="0" y="0"/>
+          <a:chExt cx="0" cy="0"/>
+        </a:xfrm>
+      </p:grpSpPr>
+      <p:sp>
+        <p:nvSpPr>
+          <p:cNvPr id="3" name="Segnaposto piè di pagina 2">
+            <a:extLst>
+              <a:ext uri="{FF2B5EF4-FFF2-40B4-BE49-F238E27FC236}">
+                <a16:creationId xmlns:a16="http://schemas.microsoft.com/office/drawing/2014/main" id="{B04C11C9-3DF6-471E-87C0-4DCED41031D4}"/>
+              </a:ext>
+            </a:extLst>
+          </p:cNvPr>
+          <p:cNvSpPr>
+            <a:spLocks noGrp="1"/>
+          </p:cNvSpPr>
+          <p:nvPr>
+            <p:ph type="ftr" sz="quarter" idx="17"/>
+          </p:nvPr>
+        </p:nvSpPr>
+        <p:spPr/>
+        <p:txBody>
+          <a:bodyPr rtlCol="0"/>
+          <a:lstStyle/>
+          <a:p>
+            <a:pPr rtl="0"/>
+            <a:r>
+              <a:rPr lang="it-IT" dirty="0"/>
+              <a:t>Aggiungere un piè di pagina</a:t>
+            </a:r>
+          </a:p>
+        </p:txBody>
+      </p:sp>
+      <p:sp>
+        <p:nvSpPr>
+          <p:cNvPr id="4" name="Segnaposto numero diapositiva 3">
+            <a:extLst>
+              <a:ext uri="{FF2B5EF4-FFF2-40B4-BE49-F238E27FC236}">
+                <a16:creationId xmlns:a16="http://schemas.microsoft.com/office/drawing/2014/main" id="{B2228214-87DB-4B3A-BD81-9A709A69BAAC}"/>
+              </a:ext>
+            </a:extLst>
+          </p:cNvPr>
+          <p:cNvSpPr>
+            <a:spLocks noGrp="1"/>
+          </p:cNvSpPr>
+          <p:nvPr>
+            <p:ph type="sldNum" sz="quarter" idx="18"/>
+          </p:nvPr>
+        </p:nvSpPr>
+        <p:spPr/>
+        <p:txBody>
+          <a:bodyPr rtlCol="0"/>
+          <a:lstStyle/>
+          <a:p>
+            <a:pPr rtl="0"/>
+            <a:fld id="{8699F50C-BE38-4BD0-BA84-9B090E1F2B9B}" type="slidenum">
+              <a:rPr lang="it-IT" smtClean="0"/>
+              <a:pPr rtl="0"/>
+              <a:t>18</a:t>
+            </a:fld>
+            <a:endParaRPr lang="it-IT" dirty="0"/>
+          </a:p>
+        </p:txBody>
+      </p:sp>
+    </p:spTree>
+    <p:extLst>
+      <p:ext uri="{BB962C8B-B14F-4D97-AF65-F5344CB8AC3E}">
+        <p14:creationId xmlns:p14="http://schemas.microsoft.com/office/powerpoint/2010/main" val="1945657091"/>
+      </p:ext>
+    </p:extLst>
+  </p:cSld>
+  <p:clrMapOvr>
+    <a:masterClrMapping/>
+  </p:clrMapOvr>
+  <mc:AlternateContent xmlns:mc="http://schemas.openxmlformats.org/markup-compatibility/2006" xmlns:p14="http://schemas.microsoft.com/office/powerpoint/2010/main">
+    <mc:Choice Requires="p14">
+      <p:transition spd="med" p14:dur="700">
+        <p:fade/>
+      </p:transition>
+    </mc:Choice>
+    <mc:Fallback xmlns="">
+      <p:transition spd="med">
+        <p:fade/>
+      </p:transition>
+    </mc:Fallback>
+  </mc:AlternateContent>
+</p:sld>
+</file>
+
+<file path=ppt/slides/slide19.xml><?xml version="1.0" encoding="utf-8"?>
 <p:sld xmlns:a="http://schemas.openxmlformats.org/drawingml/2006/main" xmlns:r="http://schemas.openxmlformats.org/officeDocument/2006/relationships" xmlns:p="http://schemas.openxmlformats.org/presentationml/2006/main">
   <p:cSld>
     <p:spTree>
@@ -15806,13 +16059,13 @@
   <p:clrMapOvr>
     <a:masterClrMapping/>
   </p:clrMapOvr>
-  <mc:AlternateContent xmlns:mc="http://schemas.openxmlformats.org/markup-compatibility/2006">
-    <mc:Choice xmlns:p14="http://schemas.microsoft.com/office/powerpoint/2010/main" Requires="p14">
+  <mc:AlternateContent xmlns:mc="http://schemas.openxmlformats.org/markup-compatibility/2006" xmlns:p14="http://schemas.microsoft.com/office/powerpoint/2010/main">
+    <mc:Choice Requires="p14">
       <p:transition spd="med" p14:dur="700">
         <p:fade/>
       </p:transition>
     </mc:Choice>
-    <mc:Fallback>
+    <mc:Fallback xmlns="">
       <p:transition spd="med">
         <p:fade/>
       </p:transition>
@@ -15968,13 +16221,13 @@
   <p:clrMapOvr>
     <a:masterClrMapping/>
   </p:clrMapOvr>
-  <mc:AlternateContent xmlns:mc="http://schemas.openxmlformats.org/markup-compatibility/2006">
-    <mc:Choice xmlns:p14="http://schemas.microsoft.com/office/powerpoint/2010/main" Requires="p14">
+  <mc:AlternateContent xmlns:mc="http://schemas.openxmlformats.org/markup-compatibility/2006" xmlns:p14="http://schemas.microsoft.com/office/powerpoint/2010/main">
+    <mc:Choice Requires="p14">
       <p:transition spd="med" p14:dur="700">
         <p:fade/>
       </p:transition>
     </mc:Choice>
-    <mc:Fallback>
+    <mc:Fallback xmlns="">
       <p:transition spd="med">
         <p:fade/>
       </p:transition>
@@ -16129,13 +16382,13 @@
   <p:clrMapOvr>
     <a:masterClrMapping/>
   </p:clrMapOvr>
-  <mc:AlternateContent xmlns:mc="http://schemas.openxmlformats.org/markup-compatibility/2006">
-    <mc:Choice xmlns:p14="http://schemas.microsoft.com/office/powerpoint/2010/main" Requires="p14">
+  <mc:AlternateContent xmlns:mc="http://schemas.openxmlformats.org/markup-compatibility/2006" xmlns:p14="http://schemas.microsoft.com/office/powerpoint/2010/main">
+    <mc:Choice Requires="p14">
       <p:transition spd="med" p14:dur="700">
         <p:fade/>
       </p:transition>
     </mc:Choice>
-    <mc:Fallback>
+    <mc:Fallback xmlns="">
       <p:transition spd="med">
         <p:fade/>
       </p:transition>
@@ -16281,13 +16534,13 @@
   <p:clrMapOvr>
     <a:masterClrMapping/>
   </p:clrMapOvr>
-  <mc:AlternateContent xmlns:mc="http://schemas.openxmlformats.org/markup-compatibility/2006">
-    <mc:Choice xmlns:p14="http://schemas.microsoft.com/office/powerpoint/2010/main" Requires="p14">
+  <mc:AlternateContent xmlns:mc="http://schemas.openxmlformats.org/markup-compatibility/2006" xmlns:p14="http://schemas.microsoft.com/office/powerpoint/2010/main">
+    <mc:Choice Requires="p14">
       <p:transition spd="med" p14:dur="700">
         <p:fade/>
       </p:transition>
     </mc:Choice>
-    <mc:Fallback>
+    <mc:Fallback xmlns="">
       <p:transition spd="med">
         <p:fade/>
       </p:transition>
@@ -16429,13 +16682,13 @@
   <p:clrMapOvr>
     <a:masterClrMapping/>
   </p:clrMapOvr>
-  <mc:AlternateContent xmlns:mc="http://schemas.openxmlformats.org/markup-compatibility/2006">
-    <mc:Choice xmlns:p14="http://schemas.microsoft.com/office/powerpoint/2010/main" Requires="p14">
+  <mc:AlternateContent xmlns:mc="http://schemas.openxmlformats.org/markup-compatibility/2006" xmlns:p14="http://schemas.microsoft.com/office/powerpoint/2010/main">
+    <mc:Choice Requires="p14">
       <p:transition spd="med" p14:dur="700">
         <p:fade/>
       </p:transition>
     </mc:Choice>
-    <mc:Fallback>
+    <mc:Fallback xmlns="">
       <p:transition spd="med">
         <p:fade/>
       </p:transition>
@@ -16463,6 +16716,304 @@
       </p:grpSpPr>
       <p:sp>
         <p:nvSpPr>
+          <p:cNvPr id="2" name="Footer Placeholder 1">
+            <a:extLst>
+              <a:ext uri="{FF2B5EF4-FFF2-40B4-BE49-F238E27FC236}">
+                <a16:creationId xmlns:a16="http://schemas.microsoft.com/office/drawing/2014/main" id="{F80DE34E-72F6-EA85-47BE-E78FF0A21945}"/>
+              </a:ext>
+            </a:extLst>
+          </p:cNvPr>
+          <p:cNvSpPr>
+            <a:spLocks noGrp="1"/>
+          </p:cNvSpPr>
+          <p:nvPr>
+            <p:ph type="ftr" sz="quarter" idx="17"/>
+          </p:nvPr>
+        </p:nvSpPr>
+        <p:spPr/>
+        <p:txBody>
+          <a:bodyPr/>
+          <a:lstStyle/>
+          <a:p>
+            <a:pPr rtl="0"/>
+            <a:r>
+              <a:rPr lang="it-IT" noProof="0"/>
+              <a:t>Aggiungere un piè di pagina</a:t>
+            </a:r>
+            <a:endParaRPr lang="it-IT" noProof="0" dirty="0"/>
+          </a:p>
+        </p:txBody>
+      </p:sp>
+      <p:sp>
+        <p:nvSpPr>
+          <p:cNvPr id="3" name="Slide Number Placeholder 2">
+            <a:extLst>
+              <a:ext uri="{FF2B5EF4-FFF2-40B4-BE49-F238E27FC236}">
+                <a16:creationId xmlns:a16="http://schemas.microsoft.com/office/drawing/2014/main" id="{2A9C04E3-4CF9-6773-20A4-B9D83ED8DF5F}"/>
+              </a:ext>
+            </a:extLst>
+          </p:cNvPr>
+          <p:cNvSpPr>
+            <a:spLocks noGrp="1"/>
+          </p:cNvSpPr>
+          <p:nvPr>
+            <p:ph type="sldNum" sz="quarter" idx="18"/>
+          </p:nvPr>
+        </p:nvSpPr>
+        <p:spPr/>
+        <p:txBody>
+          <a:bodyPr/>
+          <a:lstStyle/>
+          <a:p>
+            <a:pPr rtl="0"/>
+            <a:fld id="{8699F50C-BE38-4BD0-BA84-9B090E1F2B9B}" type="slidenum">
+              <a:rPr lang="it-IT" noProof="0" smtClean="0"/>
+              <a:t>6</a:t>
+            </a:fld>
+            <a:endParaRPr lang="it-IT" noProof="0" dirty="0"/>
+          </a:p>
+        </p:txBody>
+      </p:sp>
+      <p:sp>
+        <p:nvSpPr>
+          <p:cNvPr id="4" name="Title 3">
+            <a:extLst>
+              <a:ext uri="{FF2B5EF4-FFF2-40B4-BE49-F238E27FC236}">
+                <a16:creationId xmlns:a16="http://schemas.microsoft.com/office/drawing/2014/main" id="{34276A60-287B-01F7-EA86-86E4BB4282E2}"/>
+              </a:ext>
+            </a:extLst>
+          </p:cNvPr>
+          <p:cNvSpPr>
+            <a:spLocks noGrp="1"/>
+          </p:cNvSpPr>
+          <p:nvPr>
+            <p:ph type="title"/>
+          </p:nvPr>
+        </p:nvSpPr>
+        <p:spPr/>
+        <p:txBody>
+          <a:bodyPr/>
+          <a:lstStyle/>
+          <a:p>
+            <a:r>
+              <a:rPr lang="it-IT" dirty="0"/>
+              <a:t>Zones model</a:t>
+            </a:r>
+            <a:endParaRPr lang="en-GB" dirty="0"/>
+          </a:p>
+        </p:txBody>
+      </p:sp>
+      <p:pic>
+        <p:nvPicPr>
+          <p:cNvPr id="7" name="Immagine 12" descr="\documentclass{article}&#10;\usepackage{amsmath}&#10;\pagestyle{empty}&#10;\begin{document}&#10;\begin{equation}&#10;c_z\dot T_z=\beta K_{he}+\alpha G(T_{Grid}-T_z)-G_{Loss}(T_z-T_{Amb}) &#10;\end{equation}&#10;&#10;\end{document}" title="IguanaTex Bitmap Display">
+            <a:extLst>
+              <a:ext uri="{FF2B5EF4-FFF2-40B4-BE49-F238E27FC236}">
+                <a16:creationId xmlns:a16="http://schemas.microsoft.com/office/drawing/2014/main" id="{A962193A-533F-4D63-3A1A-91085B7B7D8E}"/>
+              </a:ext>
+            </a:extLst>
+          </p:cNvPr>
+          <p:cNvPicPr>
+            <a:picLocks noChangeAspect="1"/>
+          </p:cNvPicPr>
+          <p:nvPr>
+            <p:custDataLst>
+              <p:tags r:id="rId1"/>
+            </p:custDataLst>
+          </p:nvPr>
+        </p:nvPicPr>
+        <p:blipFill rotWithShape="1">
+          <a:blip r:embed="rId6">
+            <a:extLst>
+              <a:ext uri="{28A0092B-C50C-407E-A947-70E740481C1C}">
+                <a14:useLocalDpi xmlns:a14="http://schemas.microsoft.com/office/drawing/2010/main" val="0"/>
+              </a:ext>
+            </a:extLst>
+          </a:blip>
+          <a:srcRect t="1" r="18924" b="-9807"/>
+          <a:stretch/>
+        </p:blipFill>
+        <p:spPr>
+          <a:xfrm>
+            <a:off x="1193855" y="3429000"/>
+            <a:ext cx="5947626" cy="326284"/>
+          </a:xfrm>
+          <a:prstGeom prst="rect">
+            <a:avLst/>
+          </a:prstGeom>
+        </p:spPr>
+      </p:pic>
+      <p:pic>
+        <p:nvPicPr>
+          <p:cNvPr id="8" name="Picture 7" descr="\documentclass{article}&#10;\usepackage{amsmath}&#10;\pagestyle{empty}&#10;\begin{document}&#10;&#10;\begin{equation}&#10;\delta \bar{T}_{z}=\left[-\frac{\bar{\alpha} G}{c_{z}}-\frac{G_{\text {Loss }}}{c_{z}}\right] \delta T_{s}+\left[\frac{G}{c_{z}}\left(T_{\mathrm{Grid}}-\bar{T}_{z}\right) \frac{K_{\mathrm{he}}}{c_{z}}\right]\left[\begin{array}{l}&#10;\delta \alpha \\&#10;\delta \beta&#10;\end{array}\right]&#10;\end{equation}&#10;&#10;&#10;\end{document}" title="IguanaTex Bitmap Display">
+            <a:extLst>
+              <a:ext uri="{FF2B5EF4-FFF2-40B4-BE49-F238E27FC236}">
+                <a16:creationId xmlns:a16="http://schemas.microsoft.com/office/drawing/2014/main" id="{9F9C7C88-9188-F4DF-2A53-4D15F31EAA6F}"/>
+              </a:ext>
+            </a:extLst>
+          </p:cNvPr>
+          <p:cNvPicPr>
+            <a:picLocks noChangeAspect="1"/>
+          </p:cNvPicPr>
+          <p:nvPr>
+            <p:custDataLst>
+              <p:tags r:id="rId2"/>
+            </p:custDataLst>
+          </p:nvPr>
+        </p:nvPicPr>
+        <p:blipFill rotWithShape="1">
+          <a:blip r:embed="rId7"/>
+          <a:srcRect r="12787"/>
+          <a:stretch/>
+        </p:blipFill>
+        <p:spPr>
+          <a:xfrm>
+            <a:off x="2643507" y="5414357"/>
+            <a:ext cx="6705920" cy="608000"/>
+          </a:xfrm>
+          <a:prstGeom prst="rect">
+            <a:avLst/>
+          </a:prstGeom>
+        </p:spPr>
+      </p:pic>
+      <p:pic>
+        <p:nvPicPr>
+          <p:cNvPr id="10" name="Picture 9" descr="\documentclass{article}&#10;\usepackage{amsmath}&#10;\pagestyle{empty}&#10;\begin{document}&#10;&#10;\begin{equation}&#10;\begin{cases}&#10;\alpha \in [0,1] \\&#10;\beta \in [0,1]&#10;\end{cases}&#10;\end{equation}&#10;&#10;&#10;\end{document}" title="IguanaTex Bitmap Display">
+            <a:extLst>
+              <a:ext uri="{FF2B5EF4-FFF2-40B4-BE49-F238E27FC236}">
+                <a16:creationId xmlns:a16="http://schemas.microsoft.com/office/drawing/2014/main" id="{7CB3CE9A-AB3D-13E2-7028-B89D5C3BCE89}"/>
+              </a:ext>
+            </a:extLst>
+          </p:cNvPr>
+          <p:cNvPicPr>
+            <a:picLocks noChangeAspect="1"/>
+          </p:cNvPicPr>
+          <p:nvPr>
+            <p:custDataLst>
+              <p:tags r:id="rId3"/>
+            </p:custDataLst>
+          </p:nvPr>
+        </p:nvPicPr>
+        <p:blipFill rotWithShape="1">
+          <a:blip r:embed="rId8"/>
+          <a:srcRect r="75972"/>
+          <a:stretch/>
+        </p:blipFill>
+        <p:spPr>
+          <a:xfrm>
+            <a:off x="7627015" y="1905816"/>
+            <a:ext cx="1210068" cy="758857"/>
+          </a:xfrm>
+          <a:prstGeom prst="rect">
+            <a:avLst/>
+          </a:prstGeom>
+        </p:spPr>
+      </p:pic>
+      <p:pic>
+        <p:nvPicPr>
+          <p:cNvPr id="12" name="Picture 11" descr="\documentclass{article}&#10;\usepackage{amsmath}&#10;\pagestyle{empty}&#10;\begin{document}&#10;&#10;\begin{equation}&#10;\begin{cases}&#10;\bar \alpha = 0.5 \\&#10;\bar \beta = 0 \\&#10;&#10;&#10;    \bar{T}_{z}=\frac{\bar{\beta} K_{h e}+\bar{\alpha} G T_{G r i d}+G_{L o s s} T_{A m b}}{\bar{\alpha} G+G_{l o s s}}=T_{A m b}&#10;&#10;\end{cases}&#10;\end{equation}&#10;&#10;&#10;\end{document}" title="IguanaTex Bitmap Display">
+            <a:extLst>
+              <a:ext uri="{FF2B5EF4-FFF2-40B4-BE49-F238E27FC236}">
+                <a16:creationId xmlns:a16="http://schemas.microsoft.com/office/drawing/2014/main" id="{97306FD3-6623-4242-7F43-F225EDD77A08}"/>
+              </a:ext>
+            </a:extLst>
+          </p:cNvPr>
+          <p:cNvPicPr>
+            <a:picLocks noChangeAspect="1"/>
+          </p:cNvPicPr>
+          <p:nvPr>
+            <p:custDataLst>
+              <p:tags r:id="rId4"/>
+            </p:custDataLst>
+          </p:nvPr>
+        </p:nvPicPr>
+        <p:blipFill rotWithShape="1">
+          <a:blip r:embed="rId9"/>
+          <a:srcRect r="33038"/>
+          <a:stretch/>
+        </p:blipFill>
+        <p:spPr>
+          <a:xfrm>
+            <a:off x="3159808" y="3969341"/>
+            <a:ext cx="4467207" cy="1086476"/>
+          </a:xfrm>
+          <a:prstGeom prst="rect">
+            <a:avLst/>
+          </a:prstGeom>
+        </p:spPr>
+      </p:pic>
+      <p:pic>
+        <p:nvPicPr>
+          <p:cNvPr id="14" name="Picture 13" descr="Text, letter&#10;&#10;Description automatically generated">
+            <a:extLst>
+              <a:ext uri="{FF2B5EF4-FFF2-40B4-BE49-F238E27FC236}">
+                <a16:creationId xmlns:a16="http://schemas.microsoft.com/office/drawing/2014/main" id="{59F3BDD9-0D4C-FF5D-BE97-E4DF7EAD0509}"/>
+              </a:ext>
+            </a:extLst>
+          </p:cNvPr>
+          <p:cNvPicPr>
+            <a:picLocks noChangeAspect="1"/>
+          </p:cNvPicPr>
+          <p:nvPr/>
+        </p:nvPicPr>
+        <p:blipFill rotWithShape="1">
+          <a:blip r:embed="rId10"/>
+          <a:srcRect l="15270" t="16148" r="2208" b="42507"/>
+          <a:stretch/>
+        </p:blipFill>
+        <p:spPr>
+          <a:xfrm>
+            <a:off x="624041" y="1452419"/>
+            <a:ext cx="5833705" cy="1826748"/>
+          </a:xfrm>
+          <a:prstGeom prst="rect">
+            <a:avLst/>
+          </a:prstGeom>
+        </p:spPr>
+      </p:pic>
+    </p:spTree>
+    <p:extLst>
+      <p:ext uri="{BB962C8B-B14F-4D97-AF65-F5344CB8AC3E}">
+        <p14:creationId xmlns:p14="http://schemas.microsoft.com/office/powerpoint/2010/main" val="2639696868"/>
+      </p:ext>
+    </p:extLst>
+  </p:cSld>
+  <p:clrMapOvr>
+    <a:masterClrMapping/>
+  </p:clrMapOvr>
+  <mc:AlternateContent xmlns:mc="http://schemas.openxmlformats.org/markup-compatibility/2006" xmlns:p14="http://schemas.microsoft.com/office/powerpoint/2010/main">
+    <mc:Choice Requires="p14">
+      <p:transition spd="med" p14:dur="700">
+        <p:fade/>
+      </p:transition>
+    </mc:Choice>
+    <mc:Fallback xmlns="">
+      <p:transition spd="med">
+        <p:fade/>
+      </p:transition>
+    </mc:Fallback>
+  </mc:AlternateContent>
+</p:sld>
+</file>
+
+<file path=ppt/slides/slide7.xml><?xml version="1.0" encoding="utf-8"?>
+<p:sld xmlns:a="http://schemas.openxmlformats.org/drawingml/2006/main" xmlns:r="http://schemas.openxmlformats.org/officeDocument/2006/relationships" xmlns:p="http://schemas.openxmlformats.org/presentationml/2006/main">
+  <p:cSld>
+    <p:spTree>
+      <p:nvGrpSpPr>
+        <p:cNvPr id="1" name=""/>
+        <p:cNvGrpSpPr/>
+        <p:nvPr/>
+      </p:nvGrpSpPr>
+      <p:grpSpPr>
+        <a:xfrm>
+          <a:off x="0" y="0"/>
+          <a:ext cx="0" cy="0"/>
+          <a:chOff x="0" y="0"/>
+          <a:chExt cx="0" cy="0"/>
+        </a:xfrm>
+      </p:grpSpPr>
+      <p:sp>
+        <p:nvSpPr>
           <p:cNvPr id="3" name="Segnaposto piè di pagina 2">
             <a:extLst>
               <a:ext uri="{FF2B5EF4-FFF2-40B4-BE49-F238E27FC236}">
@@ -16515,7 +17066,7 @@
             <a:fld id="{8699F50C-BE38-4BD0-BA84-9B090E1F2B9B}" type="slidenum">
               <a:rPr lang="it-IT" smtClean="0"/>
               <a:pPr rtl="0"/>
-              <a:t>6</a:t>
+              <a:t>7</a:t>
             </a:fld>
             <a:endParaRPr lang="it-IT" dirty="0"/>
           </a:p>
@@ -16534,37 +17085,13 @@
         <p:spPr/>
         <p:txBody>
           <a:bodyPr>
-            <a:normAutofit fontScale="90000"/>
+            <a:normAutofit/>
           </a:bodyPr>
           <a:lstStyle/>
           <a:p>
             <a:r>
-              <a:rPr lang="it-IT" dirty="0" err="1"/>
-              <a:t>Zones</a:t>
-            </a:r>
-            <a:r>
               <a:rPr lang="it-IT" dirty="0"/>
-              <a:t> </a:t>
-            </a:r>
-            <a:r>
-              <a:rPr lang="it-IT" dirty="0" err="1"/>
-              <a:t>models</a:t>
-            </a:r>
-            <a:r>
-              <a:rPr lang="it-IT" dirty="0"/>
-              <a:t> and set </a:t>
-            </a:r>
-            <a:r>
-              <a:rPr lang="it-IT" dirty="0" err="1"/>
-              <a:t>point</a:t>
-            </a:r>
-            <a:r>
-              <a:rPr lang="it-IT" dirty="0"/>
-              <a:t> </a:t>
-            </a:r>
-            <a:r>
-              <a:rPr lang="it-IT" dirty="0" err="1"/>
-              <a:t>tracking</a:t>
+              <a:t>Zones set point tracking</a:t>
             </a:r>
             <a:endParaRPr lang="en-GB" dirty="0"/>
           </a:p>
@@ -16581,7 +17108,7 @@
           </p:nvPr>
         </p:nvPicPr>
         <p:blipFill rotWithShape="1">
-          <a:blip r:embed="rId4">
+          <a:blip r:embed="rId3">
             <a:extLst>
               <a:ext uri="{28A0092B-C50C-407E-A947-70E740481C1C}">
                 <a14:useLocalDpi xmlns:a14="http://schemas.microsoft.com/office/drawing/2010/main" val="0"/>
@@ -16593,42 +17120,9 @@
         </p:blipFill>
         <p:spPr>
           <a:xfrm>
-            <a:off x="851188" y="2107553"/>
-            <a:ext cx="9918412" cy="4154147"/>
+            <a:off x="518678" y="1655816"/>
+            <a:ext cx="10509504" cy="4401715"/>
           </a:xfrm>
-        </p:spPr>
-      </p:pic>
-      <p:pic>
-        <p:nvPicPr>
-          <p:cNvPr id="13" name="Immagine 12" descr="\documentclass{article}&#10;\usepackage{amsmath}&#10;\pagestyle{empty}&#10;\begin{document}&#10;\begin{equation}&#10;c_z\dot T_z=\beta K_{he}+\alpha G(T_{Grid}-T_z)-G_{Loss}(T_z-T_{Amb}) &#10;\end{equation}&#10;&#10;\end{document}" title="IguanaTex Bitmap Display"/>
-          <p:cNvPicPr>
-            <a:picLocks noChangeAspect="1"/>
-          </p:cNvPicPr>
-          <p:nvPr>
-            <p:custDataLst>
-              <p:tags r:id="rId1"/>
-            </p:custDataLst>
-          </p:nvPr>
-        </p:nvPicPr>
-        <p:blipFill rotWithShape="1">
-          <a:blip r:embed="rId5">
-            <a:extLst>
-              <a:ext uri="{28A0092B-C50C-407E-A947-70E740481C1C}">
-                <a14:useLocalDpi xmlns:a14="http://schemas.microsoft.com/office/drawing/2010/main" val="0"/>
-              </a:ext>
-            </a:extLst>
-          </a:blip>
-          <a:srcRect t="1" r="18924" b="-9807"/>
-          <a:stretch/>
-        </p:blipFill>
-        <p:spPr>
-          <a:xfrm>
-            <a:off x="2753028" y="1569133"/>
-            <a:ext cx="5947626" cy="326284"/>
-          </a:xfrm>
-          <a:prstGeom prst="rect">
-            <a:avLst/>
-          </a:prstGeom>
         </p:spPr>
       </p:pic>
       <mc:AlternateContent xmlns:mc="http://schemas.openxmlformats.org/markup-compatibility/2006">
@@ -16648,13 +17142,13 @@
               <p:nvPr>
                 <p:extLst>
                   <p:ext uri="{D42A27DB-BD31-4B8C-83A1-F6EECF244321}">
-                    <p14:modId xmlns:p14="http://schemas.microsoft.com/office/powerpoint/2010/main" val="3677816309"/>
+                    <p14:modId xmlns:p14="http://schemas.microsoft.com/office/powerpoint/2010/main" val="541412719"/>
                   </p:ext>
                 </p:extLst>
               </p:nvPr>
             </p:nvGraphicFramePr>
             <p:xfrm>
-              <a:off x="7503778" y="4351365"/>
+              <a:off x="7589183" y="4108084"/>
               <a:ext cx="1262717" cy="1262717"/>
             </p:xfrm>
             <a:graphic>
@@ -16663,10 +17157,10 @@
                   <pslz:sldZmObj sldId="270" cId="311471150">
                     <pslz:zmPr id="{24D3D1B8-4BCA-4C53-80B4-EA171D201170}" imageType="cover" transitionDur="1000">
                       <p166:blipFill xmlns:p166="http://schemas.microsoft.com/office/powerpoint/2016/6/main">
-                        <a:blip r:embed="rId6">
+                        <a:blip r:embed="rId4">
                           <a:extLst>
                             <a:ext uri="{96DAC541-7B7A-43D3-8B79-37D633B846F1}">
-                              <asvg:svgBlip xmlns:asvg="http://schemas.microsoft.com/office/drawing/2016/SVG/main" r:embed="rId7"/>
+                              <asvg:svgBlip xmlns:asvg="http://schemas.microsoft.com/office/drawing/2016/SVG/main" r:embed="rId5"/>
                             </a:ext>
                           </a:extLst>
                         </a:blip>
@@ -16697,7 +17191,7 @@
           <p:pic>
             <p:nvPicPr>
               <p:cNvPr id="8" name="Slide Zoom 7">
-                <a:hlinkClick r:id="rId8" action="ppaction://hlinksldjump"/>
+                <a:hlinkClick r:id="rId6" action="ppaction://hlinksldjump"/>
                 <a:extLst>
                   <a:ext uri="{FF2B5EF4-FFF2-40B4-BE49-F238E27FC236}">
                     <a16:creationId xmlns:a16="http://schemas.microsoft.com/office/drawing/2014/main" id="{058F528E-52D5-0AB6-9C98-AB31DE8DAAB1}"/>
@@ -16710,10 +17204,10 @@
               <p:nvPr/>
             </p:nvPicPr>
             <p:blipFill>
-              <a:blip r:embed="rId6">
+              <a:blip r:embed="rId4">
                 <a:extLst>
                   <a:ext uri="{96DAC541-7B7A-43D3-8B79-37D633B846F1}">
-                    <asvg:svgBlip xmlns:asvg="http://schemas.microsoft.com/office/drawing/2016/SVG/main" r:embed="rId7"/>
+                    <asvg:svgBlip xmlns:asvg="http://schemas.microsoft.com/office/drawing/2016/SVG/main" r:embed="rId5"/>
                   </a:ext>
                 </a:extLst>
               </a:blip>
@@ -16723,7 +17217,7 @@
             </p:blipFill>
             <p:spPr>
               <a:xfrm>
-                <a:off x="7503778" y="4351365"/>
+                <a:off x="7589183" y="4108084"/>
                 <a:ext cx="1262717" cy="1262717"/>
               </a:xfrm>
               <a:prstGeom prst="rect">
@@ -16753,13 +17247,13 @@
               <p:nvPr>
                 <p:extLst>
                   <p:ext uri="{D42A27DB-BD31-4B8C-83A1-F6EECF244321}">
-                    <p14:modId xmlns:p14="http://schemas.microsoft.com/office/powerpoint/2010/main" val="1430003964"/>
+                    <p14:modId xmlns:p14="http://schemas.microsoft.com/office/powerpoint/2010/main" val="421607842"/>
                   </p:ext>
                 </p:extLst>
               </p:nvPr>
             </p:nvGraphicFramePr>
             <p:xfrm flipH="1">
-              <a:off x="4874003" y="2362026"/>
+              <a:off x="4874003" y="2018078"/>
               <a:ext cx="966656" cy="966656"/>
             </p:xfrm>
             <a:graphic>
@@ -16768,10 +17262,10 @@
                   <pslz:sldZmObj sldId="283" cId="2700837890">
                     <pslz:zmPr id="{EB590B66-7C4A-481E-8359-A14F527EE35E}" imageType="cover" transitionDur="1000">
                       <p166:blipFill xmlns:p166="http://schemas.microsoft.com/office/powerpoint/2016/6/main">
-                        <a:blip r:embed="rId6">
+                        <a:blip r:embed="rId4">
                           <a:extLst>
                             <a:ext uri="{96DAC541-7B7A-43D3-8B79-37D633B846F1}">
-                              <asvg:svgBlip xmlns:asvg="http://schemas.microsoft.com/office/drawing/2016/SVG/main" r:embed="rId7"/>
+                              <asvg:svgBlip xmlns:asvg="http://schemas.microsoft.com/office/drawing/2016/SVG/main" r:embed="rId5"/>
                             </a:ext>
                           </a:extLst>
                         </a:blip>
@@ -16802,7 +17296,7 @@
           <p:pic>
             <p:nvPicPr>
               <p:cNvPr id="11" name="Slide Zoom 10">
-                <a:hlinkClick r:id="rId9" action="ppaction://hlinksldjump"/>
+                <a:hlinkClick r:id="rId7" action="ppaction://hlinksldjump"/>
                 <a:extLst>
                   <a:ext uri="{FF2B5EF4-FFF2-40B4-BE49-F238E27FC236}">
                     <a16:creationId xmlns:a16="http://schemas.microsoft.com/office/drawing/2014/main" id="{D8FD2C6C-3127-8A98-C208-D84B2894E912}"/>
@@ -16815,10 +17309,10 @@
               <p:nvPr/>
             </p:nvPicPr>
             <p:blipFill>
-              <a:blip r:embed="rId6">
+              <a:blip r:embed="rId4">
                 <a:extLst>
                   <a:ext uri="{96DAC541-7B7A-43D3-8B79-37D633B846F1}">
-                    <asvg:svgBlip xmlns:asvg="http://schemas.microsoft.com/office/drawing/2016/SVG/main" r:embed="rId7"/>
+                    <asvg:svgBlip xmlns:asvg="http://schemas.microsoft.com/office/drawing/2016/SVG/main" r:embed="rId5"/>
                   </a:ext>
                 </a:extLst>
               </a:blip>
@@ -16828,7 +17322,7 @@
             </p:blipFill>
             <p:spPr>
               <a:xfrm flipH="1">
-                <a:off x="4874003" y="2362026"/>
+                <a:off x="4874003" y="2018078"/>
                 <a:ext cx="966656" cy="966656"/>
               </a:xfrm>
               <a:prstGeom prst="rect">
@@ -16851,170 +17345,13 @@
   <p:clrMapOvr>
     <a:masterClrMapping/>
   </p:clrMapOvr>
-  <mc:AlternateContent xmlns:mc="http://schemas.openxmlformats.org/markup-compatibility/2006">
-    <mc:Choice xmlns:p14="http://schemas.microsoft.com/office/powerpoint/2010/main" Requires="p14">
+  <mc:AlternateContent xmlns:mc="http://schemas.openxmlformats.org/markup-compatibility/2006" xmlns:p14="http://schemas.microsoft.com/office/powerpoint/2010/main">
+    <mc:Choice Requires="p14">
       <p:transition spd="med" p14:dur="700">
         <p:fade/>
       </p:transition>
     </mc:Choice>
-    <mc:Fallback>
-      <p:transition spd="med">
-        <p:fade/>
-      </p:transition>
-    </mc:Fallback>
-  </mc:AlternateContent>
-</p:sld>
-</file>
-
-<file path=ppt/slides/slide7.xml><?xml version="1.0" encoding="utf-8"?>
-<p:sld xmlns:a="http://schemas.openxmlformats.org/drawingml/2006/main" xmlns:r="http://schemas.openxmlformats.org/officeDocument/2006/relationships" xmlns:p="http://schemas.openxmlformats.org/presentationml/2006/main">
-  <p:cSld>
-    <p:spTree>
-      <p:nvGrpSpPr>
-        <p:cNvPr id="1" name=""/>
-        <p:cNvGrpSpPr/>
-        <p:nvPr/>
-      </p:nvGrpSpPr>
-      <p:grpSpPr>
-        <a:xfrm>
-          <a:off x="0" y="0"/>
-          <a:ext cx="0" cy="0"/>
-          <a:chOff x="0" y="0"/>
-          <a:chExt cx="0" cy="0"/>
-        </a:xfrm>
-      </p:grpSpPr>
-      <p:sp>
-        <p:nvSpPr>
-          <p:cNvPr id="3" name="Segnaposto piè di pagina 2">
-            <a:extLst>
-              <a:ext uri="{FF2B5EF4-FFF2-40B4-BE49-F238E27FC236}">
-                <a16:creationId xmlns:a16="http://schemas.microsoft.com/office/drawing/2014/main" id="{B04C11C9-3DF6-471E-87C0-4DCED41031D4}"/>
-              </a:ext>
-            </a:extLst>
-          </p:cNvPr>
-          <p:cNvSpPr>
-            <a:spLocks noGrp="1"/>
-          </p:cNvSpPr>
-          <p:nvPr>
-            <p:ph type="ftr" sz="quarter" idx="17"/>
-          </p:nvPr>
-        </p:nvSpPr>
-        <p:spPr>
-          <a:xfrm>
-            <a:off x="338530" y="6356350"/>
-            <a:ext cx="4114800" cy="365125"/>
-          </a:xfrm>
-        </p:spPr>
-        <p:txBody>
-          <a:bodyPr rtlCol="0" anchor="ctr">
-            <a:normAutofit/>
-          </a:bodyPr>
-          <a:lstStyle/>
-          <a:p>
-            <a:pPr rtl="0">
-              <a:spcAft>
-                <a:spcPts val="600"/>
-              </a:spcAft>
-            </a:pPr>
-            <a:r>
-              <a:rPr lang="it-IT"/>
-              <a:t>Aggiungere un piè di pagina</a:t>
-            </a:r>
-          </a:p>
-        </p:txBody>
-      </p:sp>
-      <p:sp>
-        <p:nvSpPr>
-          <p:cNvPr id="4" name="Segnaposto numero diapositiva 3">
-            <a:extLst>
-              <a:ext uri="{FF2B5EF4-FFF2-40B4-BE49-F238E27FC236}">
-                <a16:creationId xmlns:a16="http://schemas.microsoft.com/office/drawing/2014/main" id="{B2228214-87DB-4B3A-BD81-9A709A69BAAC}"/>
-              </a:ext>
-            </a:extLst>
-          </p:cNvPr>
-          <p:cNvSpPr>
-            <a:spLocks noGrp="1"/>
-          </p:cNvSpPr>
-          <p:nvPr>
-            <p:ph type="sldNum" sz="quarter" idx="18"/>
-          </p:nvPr>
-        </p:nvSpPr>
-        <p:spPr>
-          <a:xfrm>
-            <a:off x="11146971" y="6356350"/>
-            <a:ext cx="740227" cy="365125"/>
-          </a:xfrm>
-        </p:spPr>
-        <p:txBody>
-          <a:bodyPr rtlCol="0" anchor="ctr">
-            <a:normAutofit/>
-          </a:bodyPr>
-          <a:lstStyle/>
-          <a:p>
-            <a:pPr rtl="0">
-              <a:spcAft>
-                <a:spcPts val="600"/>
-              </a:spcAft>
-            </a:pPr>
-            <a:fld id="{8699F50C-BE38-4BD0-BA84-9B090E1F2B9B}" type="slidenum">
-              <a:rPr lang="it-IT" smtClean="0"/>
-              <a:pPr rtl="0">
-                <a:spcAft>
-                  <a:spcPts val="600"/>
-                </a:spcAft>
-              </a:pPr>
-              <a:t>7</a:t>
-            </a:fld>
-            <a:endParaRPr lang="it-IT"/>
-          </a:p>
-        </p:txBody>
-      </p:sp>
-      <p:pic>
-        <p:nvPicPr>
-          <p:cNvPr id="13" name="Content Placeholder 12" descr="Chart, line chart&#10;&#10;Description automatically generated">
-            <a:extLst>
-              <a:ext uri="{FF2B5EF4-FFF2-40B4-BE49-F238E27FC236}">
-                <a16:creationId xmlns:a16="http://schemas.microsoft.com/office/drawing/2014/main" id="{F087F167-91C9-CC7A-5C5C-282208F83EF7}"/>
-              </a:ext>
-            </a:extLst>
-          </p:cNvPr>
-          <p:cNvPicPr>
-            <a:picLocks noGrp="1" noChangeAspect="1"/>
-          </p:cNvPicPr>
-          <p:nvPr>
-            <p:ph idx="1"/>
-          </p:nvPr>
-        </p:nvPicPr>
-        <p:blipFill>
-          <a:blip r:embed="rId3"/>
-          <a:stretch>
-            <a:fillRect/>
-          </a:stretch>
-        </p:blipFill>
-        <p:spPr>
-          <a:xfrm>
-            <a:off x="1216120" y="1080655"/>
-            <a:ext cx="9759759" cy="5114781"/>
-          </a:xfrm>
-        </p:spPr>
-      </p:pic>
-    </p:spTree>
-    <p:extLst>
-      <p:ext uri="{BB962C8B-B14F-4D97-AF65-F5344CB8AC3E}">
-        <p14:creationId xmlns:p14="http://schemas.microsoft.com/office/powerpoint/2010/main" val="311471150"/>
-      </p:ext>
-    </p:extLst>
-  </p:cSld>
-  <p:clrMapOvr>
-    <a:masterClrMapping/>
-  </p:clrMapOvr>
-  <mc:AlternateContent xmlns:mc="http://schemas.openxmlformats.org/markup-compatibility/2006">
-    <mc:Choice xmlns:p14="http://schemas.microsoft.com/office/powerpoint/2010/main" Requires="p14">
-      <p:transition spd="med" p14:dur="700">
-        <p:fade/>
-      </p:transition>
-    </mc:Choice>
-    <mc:Fallback>
+    <mc:Fallback xmlns="">
       <p:transition spd="med">
         <p:fade/>
       </p:transition>
@@ -17128,10 +17465,10 @@
       </p:sp>
       <p:pic>
         <p:nvPicPr>
-          <p:cNvPr id="16" name="Content Placeholder 15" descr="Chart, line chart&#10;&#10;Description automatically generated">
-            <a:extLst>
-              <a:ext uri="{FF2B5EF4-FFF2-40B4-BE49-F238E27FC236}">
-                <a16:creationId xmlns:a16="http://schemas.microsoft.com/office/drawing/2014/main" id="{E984D639-E8E8-1FCF-0369-C4F13048C6BC}"/>
+          <p:cNvPr id="13" name="Content Placeholder 12" descr="Chart, line chart&#10;&#10;Description automatically generated">
+            <a:extLst>
+              <a:ext uri="{FF2B5EF4-FFF2-40B4-BE49-F238E27FC236}">
+                <a16:creationId xmlns:a16="http://schemas.microsoft.com/office/drawing/2014/main" id="{F087F167-91C9-CC7A-5C5C-282208F83EF7}"/>
               </a:ext>
             </a:extLst>
           </p:cNvPr>
@@ -17143,35 +17480,299 @@
           </p:nvPr>
         </p:nvPicPr>
         <p:blipFill>
-          <a:blip r:embed="rId3"/>
+          <a:blip r:embed="rId6"/>
           <a:stretch>
             <a:fillRect/>
           </a:stretch>
         </p:blipFill>
         <p:spPr>
           <a:xfrm>
-            <a:off x="1184122" y="1108364"/>
-            <a:ext cx="9823755" cy="5068599"/>
+            <a:off x="1216120" y="1080655"/>
+            <a:ext cx="9759759" cy="5114781"/>
           </a:xfrm>
         </p:spPr>
       </p:pic>
+      <p:sp>
+        <p:nvSpPr>
+          <p:cNvPr id="2" name="Left Brace 1">
+            <a:extLst>
+              <a:ext uri="{FF2B5EF4-FFF2-40B4-BE49-F238E27FC236}">
+                <a16:creationId xmlns:a16="http://schemas.microsoft.com/office/drawing/2014/main" id="{E63F16A6-032D-EF99-EC35-F94798032DE9}"/>
+              </a:ext>
+            </a:extLst>
+          </p:cNvPr>
+          <p:cNvSpPr/>
+          <p:nvPr/>
+        </p:nvSpPr>
+        <p:spPr>
+          <a:xfrm>
+            <a:off x="4194495" y="4823670"/>
+            <a:ext cx="75501" cy="662730"/>
+          </a:xfrm>
+          <a:prstGeom prst="leftBrace">
+            <a:avLst/>
+          </a:prstGeom>
+        </p:spPr>
+        <p:style>
+          <a:lnRef idx="1">
+            <a:schemeClr val="accent1"/>
+          </a:lnRef>
+          <a:fillRef idx="0">
+            <a:schemeClr val="accent1"/>
+          </a:fillRef>
+          <a:effectRef idx="0">
+            <a:schemeClr val="accent1"/>
+          </a:effectRef>
+          <a:fontRef idx="minor">
+            <a:schemeClr val="tx1"/>
+          </a:fontRef>
+        </p:style>
+        <p:txBody>
+          <a:bodyPr rtlCol="0" anchor="ctr"/>
+          <a:lstStyle/>
+          <a:p>
+            <a:pPr algn="ctr"/>
+            <a:endParaRPr lang="en-GB"/>
+          </a:p>
+        </p:txBody>
+      </p:sp>
+      <p:sp>
+        <p:nvSpPr>
+          <p:cNvPr id="5" name="TextBox 4">
+            <a:extLst>
+              <a:ext uri="{FF2B5EF4-FFF2-40B4-BE49-F238E27FC236}">
+                <a16:creationId xmlns:a16="http://schemas.microsoft.com/office/drawing/2014/main" id="{84993BF0-C628-77B5-3004-5AB4A214A1A0}"/>
+              </a:ext>
+            </a:extLst>
+          </p:cNvPr>
+          <p:cNvSpPr txBox="1"/>
+          <p:nvPr/>
+        </p:nvSpPr>
+        <p:spPr>
+          <a:xfrm>
+            <a:off x="2877424" y="4764947"/>
+            <a:ext cx="1115736" cy="511728"/>
+          </a:xfrm>
+          <a:prstGeom prst="rect">
+            <a:avLst/>
+          </a:prstGeom>
+          <a:noFill/>
+        </p:spPr>
+        <p:txBody>
+          <a:bodyPr wrap="square" rtlCol="0">
+            <a:spAutoFit/>
+          </a:bodyPr>
+          <a:lstStyle/>
+          <a:p>
+            <a:endParaRPr lang="en-GB" dirty="0"/>
+          </a:p>
+        </p:txBody>
+      </p:sp>
+      <p:pic>
+        <p:nvPicPr>
+          <p:cNvPr id="11" name="Picture 10" descr="\documentclass{article}&#10;\usepackage{amsmath}&#10;\pagestyle{empty}&#10;\begin{document}&#10;&#10;\begin{equation}&#10;    \Delta T = 0.489 \, ^{\circ} C&#10;\end{equation}&#10;&#10;&#10;\end{document}" title="IguanaTex Bitmap Display">
+            <a:extLst>
+              <a:ext uri="{FF2B5EF4-FFF2-40B4-BE49-F238E27FC236}">
+                <a16:creationId xmlns:a16="http://schemas.microsoft.com/office/drawing/2014/main" id="{4D2B8BE7-8D76-0282-7F09-5F7A7FE86E44}"/>
+              </a:ext>
+            </a:extLst>
+          </p:cNvPr>
+          <p:cNvPicPr>
+            <a:picLocks noChangeAspect="1"/>
+          </p:cNvPicPr>
+          <p:nvPr>
+            <p:custDataLst>
+              <p:tags r:id="rId1"/>
+            </p:custDataLst>
+          </p:nvPr>
+        </p:nvPicPr>
+        <p:blipFill rotWithShape="1">
+          <a:blip r:embed="rId7"/>
+          <a:srcRect t="-1" r="66805" b="2200"/>
+          <a:stretch/>
+        </p:blipFill>
+        <p:spPr>
+          <a:xfrm>
+            <a:off x="2279941" y="5030596"/>
+            <a:ext cx="1713219" cy="248878"/>
+          </a:xfrm>
+          <a:prstGeom prst="rect">
+            <a:avLst/>
+          </a:prstGeom>
+        </p:spPr>
+      </p:pic>
+      <p:sp>
+        <p:nvSpPr>
+          <p:cNvPr id="12" name="Left Brace 11">
+            <a:extLst>
+              <a:ext uri="{FF2B5EF4-FFF2-40B4-BE49-F238E27FC236}">
+                <a16:creationId xmlns:a16="http://schemas.microsoft.com/office/drawing/2014/main" id="{A9D7F22D-D07F-63A5-4892-9B9B1432DEC6}"/>
+              </a:ext>
+            </a:extLst>
+          </p:cNvPr>
+          <p:cNvSpPr/>
+          <p:nvPr/>
+        </p:nvSpPr>
+        <p:spPr>
+          <a:xfrm rot="5400000">
+            <a:off x="4535946" y="4442140"/>
+            <a:ext cx="73976" cy="384029"/>
+          </a:xfrm>
+          <a:prstGeom prst="leftBrace">
+            <a:avLst/>
+          </a:prstGeom>
+        </p:spPr>
+        <p:style>
+          <a:lnRef idx="1">
+            <a:schemeClr val="accent1"/>
+          </a:lnRef>
+          <a:fillRef idx="0">
+            <a:schemeClr val="accent1"/>
+          </a:fillRef>
+          <a:effectRef idx="0">
+            <a:schemeClr val="accent1"/>
+          </a:effectRef>
+          <a:fontRef idx="minor">
+            <a:schemeClr val="tx1"/>
+          </a:fontRef>
+        </p:style>
+        <p:txBody>
+          <a:bodyPr rtlCol="0" anchor="ctr"/>
+          <a:lstStyle/>
+          <a:p>
+            <a:pPr algn="ctr"/>
+            <a:endParaRPr lang="en-GB"/>
+          </a:p>
+        </p:txBody>
+      </p:sp>
+      <p:pic>
+        <p:nvPicPr>
+          <p:cNvPr id="15" name="Picture 14" descr="\documentclass{article}&#10;\usepackage{amsmath}&#10;\pagestyle{empty}&#10;\begin{document}&#10;&#10;\begin{equation}&#10;    \Delta t \approx 39 \, min&#10;\end{equation}&#10;&#10;&#10;\end{document}" title="IguanaTex Bitmap Display">
+            <a:extLst>
+              <a:ext uri="{FF2B5EF4-FFF2-40B4-BE49-F238E27FC236}">
+                <a16:creationId xmlns:a16="http://schemas.microsoft.com/office/drawing/2014/main" id="{9A364F44-F6E4-6B92-D671-1483A52935FE}"/>
+              </a:ext>
+            </a:extLst>
+          </p:cNvPr>
+          <p:cNvPicPr>
+            <a:picLocks noChangeAspect="1"/>
+          </p:cNvPicPr>
+          <p:nvPr>
+            <p:custDataLst>
+              <p:tags r:id="rId2"/>
+            </p:custDataLst>
+          </p:nvPr>
+        </p:nvPicPr>
+        <p:blipFill rotWithShape="1">
+          <a:blip r:embed="rId8"/>
+          <a:srcRect t="-1" r="71116" b="2200"/>
+          <a:stretch/>
+        </p:blipFill>
+        <p:spPr>
+          <a:xfrm>
+            <a:off x="3922646" y="4323052"/>
+            <a:ext cx="1320474" cy="226400"/>
+          </a:xfrm>
+          <a:prstGeom prst="rect">
+            <a:avLst/>
+          </a:prstGeom>
+        </p:spPr>
+      </p:pic>
+      <p:pic>
+        <p:nvPicPr>
+          <p:cNvPr id="19" name="Picture 18" descr="\documentclass{article}&#10;\usepackage{amsmath}&#10;\pagestyle{empty}&#10;\begin{document}&#10;&#10;\begin{equation*}&#10;    \Delta T = 0.306 \, ^{\circ} C \\&#10;\end{equation*}&#10;&#10;&#10;\end{document}" title="IguanaTex Bitmap Display">
+            <a:extLst>
+              <a:ext uri="{FF2B5EF4-FFF2-40B4-BE49-F238E27FC236}">
+                <a16:creationId xmlns:a16="http://schemas.microsoft.com/office/drawing/2014/main" id="{A2287FC6-E867-60C5-9978-A549B9BD2D4B}"/>
+              </a:ext>
+            </a:extLst>
+          </p:cNvPr>
+          <p:cNvPicPr>
+            <a:picLocks noChangeAspect="1"/>
+          </p:cNvPicPr>
+          <p:nvPr>
+            <p:custDataLst>
+              <p:tags r:id="rId3"/>
+            </p:custDataLst>
+          </p:nvPr>
+        </p:nvPicPr>
+        <p:blipFill>
+          <a:blip r:embed="rId9"/>
+          <a:stretch>
+            <a:fillRect/>
+          </a:stretch>
+        </p:blipFill>
+        <p:spPr>
+          <a:xfrm>
+            <a:off x="9210391" y="4440630"/>
+            <a:ext cx="1648762" cy="193524"/>
+          </a:xfrm>
+          <a:prstGeom prst="rect">
+            <a:avLst/>
+          </a:prstGeom>
+        </p:spPr>
+      </p:pic>
+      <p:sp>
+        <p:nvSpPr>
+          <p:cNvPr id="20" name="Right Brace 19">
+            <a:extLst>
+              <a:ext uri="{FF2B5EF4-FFF2-40B4-BE49-F238E27FC236}">
+                <a16:creationId xmlns:a16="http://schemas.microsoft.com/office/drawing/2014/main" id="{7450EAA7-E140-8B0C-D5FF-DA4EBEAE5A1A}"/>
+              </a:ext>
+            </a:extLst>
+          </p:cNvPr>
+          <p:cNvSpPr/>
+          <p:nvPr/>
+        </p:nvSpPr>
+        <p:spPr>
+          <a:xfrm>
+            <a:off x="9018165" y="4349417"/>
+            <a:ext cx="75501" cy="441895"/>
+          </a:xfrm>
+          <a:prstGeom prst="rightBrace">
+            <a:avLst/>
+          </a:prstGeom>
+        </p:spPr>
+        <p:style>
+          <a:lnRef idx="1">
+            <a:schemeClr val="accent1"/>
+          </a:lnRef>
+          <a:fillRef idx="0">
+            <a:schemeClr val="accent1"/>
+          </a:fillRef>
+          <a:effectRef idx="0">
+            <a:schemeClr val="accent1"/>
+          </a:effectRef>
+          <a:fontRef idx="minor">
+            <a:schemeClr val="tx1"/>
+          </a:fontRef>
+        </p:style>
+        <p:txBody>
+          <a:bodyPr rtlCol="0" anchor="ctr"/>
+          <a:lstStyle/>
+          <a:p>
+            <a:pPr algn="ctr"/>
+            <a:endParaRPr lang="en-GB"/>
+          </a:p>
+        </p:txBody>
+      </p:sp>
     </p:spTree>
     <p:extLst>
       <p:ext uri="{BB962C8B-B14F-4D97-AF65-F5344CB8AC3E}">
-        <p14:creationId xmlns:p14="http://schemas.microsoft.com/office/powerpoint/2010/main" val="2700837890"/>
+        <p14:creationId xmlns:p14="http://schemas.microsoft.com/office/powerpoint/2010/main" val="311471150"/>
       </p:ext>
     </p:extLst>
   </p:cSld>
   <p:clrMapOvr>
     <a:masterClrMapping/>
   </p:clrMapOvr>
-  <mc:AlternateContent xmlns:mc="http://schemas.openxmlformats.org/markup-compatibility/2006">
-    <mc:Choice xmlns:p14="http://schemas.microsoft.com/office/powerpoint/2010/main" Requires="p14">
+  <mc:AlternateContent xmlns:mc="http://schemas.openxmlformats.org/markup-compatibility/2006" xmlns:p14="http://schemas.microsoft.com/office/powerpoint/2010/main">
+    <mc:Choice Requires="p14">
       <p:transition spd="med" p14:dur="700">
         <p:fade/>
       </p:transition>
     </mc:Choice>
-    <mc:Fallback>
+    <mc:Fallback xmlns="">
       <p:transition spd="med">
         <p:fade/>
       </p:transition>
@@ -17283,45 +17884,12 @@
           </a:p>
         </p:txBody>
       </p:sp>
-      <p:sp>
-        <p:nvSpPr>
-          <p:cNvPr id="9" name="Title 3">
-            <a:extLst>
-              <a:ext uri="{FF2B5EF4-FFF2-40B4-BE49-F238E27FC236}">
-                <a16:creationId xmlns:a16="http://schemas.microsoft.com/office/drawing/2014/main" id="{3BC6C6B7-BB91-7C9A-8402-71709F926E70}"/>
-              </a:ext>
-            </a:extLst>
-          </p:cNvPr>
-          <p:cNvSpPr>
-            <a:spLocks noGrp="1"/>
-          </p:cNvSpPr>
-          <p:nvPr>
-            <p:ph type="title"/>
-          </p:nvPr>
-        </p:nvSpPr>
-        <p:spPr>
-          <a:xfrm>
-            <a:off x="518678" y="209028"/>
-            <a:ext cx="8333222" cy="1147969"/>
-          </a:xfrm>
-        </p:spPr>
-        <p:txBody>
-          <a:bodyPr/>
-          <a:lstStyle/>
-          <a:p>
-            <a:r>
-              <a:rPr lang="en-US" dirty="0"/>
-              <a:t>Control signals of each actuator</a:t>
-            </a:r>
-          </a:p>
-        </p:txBody>
-      </p:sp>
       <p:pic>
         <p:nvPicPr>
-          <p:cNvPr id="10" name="Content Placeholder 9" descr="Chart, histogram&#10;&#10;Description automatically generated">
-            <a:extLst>
-              <a:ext uri="{FF2B5EF4-FFF2-40B4-BE49-F238E27FC236}">
-                <a16:creationId xmlns:a16="http://schemas.microsoft.com/office/drawing/2014/main" id="{41E11D2C-690D-3C49-FBE8-55C511485124}"/>
+          <p:cNvPr id="16" name="Content Placeholder 15" descr="Chart, line chart&#10;&#10;Description automatically generated">
+            <a:extLst>
+              <a:ext uri="{FF2B5EF4-FFF2-40B4-BE49-F238E27FC236}">
+                <a16:creationId xmlns:a16="http://schemas.microsoft.com/office/drawing/2014/main" id="{E984D639-E8E8-1FCF-0369-C4F13048C6BC}"/>
               </a:ext>
             </a:extLst>
           </p:cNvPr>
@@ -17329,67 +17897,351 @@
             <a:picLocks noGrp="1" noChangeAspect="1"/>
           </p:cNvPicPr>
           <p:nvPr>
-            <p:ph sz="half" idx="1"/>
+            <p:ph idx="1"/>
           </p:nvPr>
         </p:nvPicPr>
         <p:blipFill>
-          <a:blip r:embed="rId3"/>
+          <a:blip r:embed="rId7"/>
           <a:stretch>
             <a:fillRect/>
           </a:stretch>
         </p:blipFill>
         <p:spPr>
           <a:xfrm>
-            <a:off x="518678" y="2189018"/>
-            <a:ext cx="5375003" cy="3276609"/>
+            <a:off x="1184122" y="1108364"/>
+            <a:ext cx="9823755" cy="5068599"/>
           </a:xfrm>
+        </p:spPr>
+      </p:pic>
+      <p:sp>
+        <p:nvSpPr>
+          <p:cNvPr id="2" name="Left Brace 1">
+            <a:extLst>
+              <a:ext uri="{FF2B5EF4-FFF2-40B4-BE49-F238E27FC236}">
+                <a16:creationId xmlns:a16="http://schemas.microsoft.com/office/drawing/2014/main" id="{FE8C1C4F-00D9-AAF5-FCD9-E49988FFB6D7}"/>
+              </a:ext>
+            </a:extLst>
+          </p:cNvPr>
+          <p:cNvSpPr/>
+          <p:nvPr/>
+        </p:nvSpPr>
+        <p:spPr>
+          <a:xfrm>
+            <a:off x="1773851" y="1812022"/>
+            <a:ext cx="45719" cy="1694576"/>
+          </a:xfrm>
+          <a:prstGeom prst="leftBrace">
+            <a:avLst/>
+          </a:prstGeom>
+        </p:spPr>
+        <p:style>
+          <a:lnRef idx="1">
+            <a:schemeClr val="accent1"/>
+          </a:lnRef>
+          <a:fillRef idx="0">
+            <a:schemeClr val="accent1"/>
+          </a:fillRef>
+          <a:effectRef idx="0">
+            <a:schemeClr val="accent1"/>
+          </a:effectRef>
+          <a:fontRef idx="minor">
+            <a:schemeClr val="tx1"/>
+          </a:fontRef>
+        </p:style>
+        <p:txBody>
+          <a:bodyPr rtlCol="0" anchor="ctr"/>
+          <a:lstStyle/>
+          <a:p>
+            <a:pPr algn="ctr"/>
+            <a:endParaRPr lang="en-GB"/>
+          </a:p>
+        </p:txBody>
+      </p:sp>
+      <p:pic>
+        <p:nvPicPr>
+          <p:cNvPr id="6" name="Picture 5" descr="\documentclass{article}&#10;\usepackage{amsmath}&#10;\pagestyle{empty}&#10;\begin{document}&#10;&#10;\begin{equation*}&#10;    \Delta T = 0.152 \, ^{\circ} C \\&#10;\end{equation*}&#10;&#10;&#10;\end{document}" title="IguanaTex Bitmap Display">
+            <a:extLst>
+              <a:ext uri="{FF2B5EF4-FFF2-40B4-BE49-F238E27FC236}">
+                <a16:creationId xmlns:a16="http://schemas.microsoft.com/office/drawing/2014/main" id="{D79C1225-7389-D8A7-F459-5211F3F54789}"/>
+              </a:ext>
+            </a:extLst>
+          </p:cNvPr>
+          <p:cNvPicPr>
+            <a:picLocks noChangeAspect="1"/>
+          </p:cNvPicPr>
+          <p:nvPr>
+            <p:custDataLst>
+              <p:tags r:id="rId1"/>
+            </p:custDataLst>
+          </p:nvPr>
+        </p:nvPicPr>
+        <p:blipFill>
+          <a:blip r:embed="rId8"/>
+          <a:stretch>
+            <a:fillRect/>
+          </a:stretch>
+        </p:blipFill>
+        <p:spPr>
+          <a:xfrm>
+            <a:off x="241417" y="2581567"/>
+            <a:ext cx="1324682" cy="155485"/>
+          </a:xfrm>
+          <a:prstGeom prst="rect">
+            <a:avLst/>
+          </a:prstGeom>
+        </p:spPr>
+      </p:pic>
+      <p:sp>
+        <p:nvSpPr>
+          <p:cNvPr id="7" name="Right Brace 6">
+            <a:extLst>
+              <a:ext uri="{FF2B5EF4-FFF2-40B4-BE49-F238E27FC236}">
+                <a16:creationId xmlns:a16="http://schemas.microsoft.com/office/drawing/2014/main" id="{90A6F620-9CA5-A418-8E85-B99E826539D1}"/>
+              </a:ext>
+            </a:extLst>
+          </p:cNvPr>
+          <p:cNvSpPr/>
+          <p:nvPr/>
+        </p:nvSpPr>
+        <p:spPr>
+          <a:xfrm>
+            <a:off x="2021747" y="2206305"/>
+            <a:ext cx="134081" cy="1300293"/>
+          </a:xfrm>
+          <a:prstGeom prst="rightBrace">
+            <a:avLst/>
+          </a:prstGeom>
+        </p:spPr>
+        <p:style>
+          <a:lnRef idx="1">
+            <a:schemeClr val="accent1"/>
+          </a:lnRef>
+          <a:fillRef idx="0">
+            <a:schemeClr val="accent1"/>
+          </a:fillRef>
+          <a:effectRef idx="0">
+            <a:schemeClr val="accent1"/>
+          </a:effectRef>
+          <a:fontRef idx="minor">
+            <a:schemeClr val="tx1"/>
+          </a:fontRef>
+        </p:style>
+        <p:txBody>
+          <a:bodyPr rtlCol="0" anchor="ctr"/>
+          <a:lstStyle/>
+          <a:p>
+            <a:pPr algn="ctr"/>
+            <a:endParaRPr lang="en-GB"/>
+          </a:p>
+        </p:txBody>
+      </p:sp>
+      <p:pic>
+        <p:nvPicPr>
+          <p:cNvPr id="9" name="Picture 8" descr="\documentclass{article}&#10;\usepackage{amsmath}&#10;\pagestyle{empty}&#10;\begin{document}&#10;&#10;\begin{equation*}&#10;    \Delta T = 0.119 \, ^{\circ} C \\&#10;\end{equation*}&#10;&#10;&#10;\end{document}" title="IguanaTex Bitmap Display">
+            <a:extLst>
+              <a:ext uri="{FF2B5EF4-FFF2-40B4-BE49-F238E27FC236}">
+                <a16:creationId xmlns:a16="http://schemas.microsoft.com/office/drawing/2014/main" id="{16F22E8F-D455-6BBE-7271-127FA4932A89}"/>
+              </a:ext>
+            </a:extLst>
+          </p:cNvPr>
+          <p:cNvPicPr>
+            <a:picLocks noChangeAspect="1"/>
+          </p:cNvPicPr>
+          <p:nvPr>
+            <p:custDataLst>
+              <p:tags r:id="rId2"/>
+            </p:custDataLst>
+          </p:nvPr>
+        </p:nvPicPr>
+        <p:blipFill>
+          <a:blip r:embed="rId9"/>
+          <a:stretch>
+            <a:fillRect/>
+          </a:stretch>
+        </p:blipFill>
+        <p:spPr>
+          <a:xfrm>
+            <a:off x="2395930" y="2771661"/>
+            <a:ext cx="1444771" cy="169580"/>
+          </a:xfrm>
+          <a:prstGeom prst="rect">
+            <a:avLst/>
+          </a:prstGeom>
         </p:spPr>
       </p:pic>
       <p:pic>
         <p:nvPicPr>
-          <p:cNvPr id="28" name="Content Placeholder 27" descr="Chart, histogram&#10;&#10;Description automatically generated">
-            <a:extLst>
-              <a:ext uri="{FF2B5EF4-FFF2-40B4-BE49-F238E27FC236}">
-                <a16:creationId xmlns:a16="http://schemas.microsoft.com/office/drawing/2014/main" id="{22C803CC-7957-1953-F3A9-5FD20962D957}"/>
+          <p:cNvPr id="11" name="Picture 10" descr="\documentclass{article}&#10;\usepackage{amsmath}&#10;\pagestyle{empty}&#10;\begin{document}&#10;&#10;\begin{equation*}&#10;    \Delta T = 0.057 \, ^{\circ} C \\&#10;\end{equation*}&#10;&#10;&#10;\end{document}" title="IguanaTex Bitmap Display">
+            <a:extLst>
+              <a:ext uri="{FF2B5EF4-FFF2-40B4-BE49-F238E27FC236}">
+                <a16:creationId xmlns:a16="http://schemas.microsoft.com/office/drawing/2014/main" id="{932217E1-6C66-C851-1491-16854C130FB1}"/>
               </a:ext>
             </a:extLst>
           </p:cNvPr>
           <p:cNvPicPr>
-            <a:picLocks noGrp="1" noChangeAspect="1"/>
+            <a:picLocks noChangeAspect="1"/>
           </p:cNvPicPr>
           <p:nvPr>
-            <p:ph sz="half" idx="2"/>
+            <p:custDataLst>
+              <p:tags r:id="rId3"/>
+            </p:custDataLst>
           </p:nvPr>
         </p:nvPicPr>
-        <p:blipFill rotWithShape="1">
-          <a:blip r:embed="rId4"/>
-          <a:srcRect t="2537"/>
-          <a:stretch/>
+        <p:blipFill>
+          <a:blip r:embed="rId10"/>
+          <a:stretch>
+            <a:fillRect/>
+          </a:stretch>
         </p:blipFill>
         <p:spPr>
           <a:xfrm>
-            <a:off x="6199741" y="2272145"/>
-            <a:ext cx="5339660" cy="3193482"/>
+            <a:off x="10767127" y="3733100"/>
+            <a:ext cx="1343766" cy="157725"/>
           </a:xfrm>
+          <a:prstGeom prst="rect">
+            <a:avLst/>
+          </a:prstGeom>
+        </p:spPr>
+      </p:pic>
+      <p:sp>
+        <p:nvSpPr>
+          <p:cNvPr id="12" name="Right Brace 11">
+            <a:extLst>
+              <a:ext uri="{FF2B5EF4-FFF2-40B4-BE49-F238E27FC236}">
+                <a16:creationId xmlns:a16="http://schemas.microsoft.com/office/drawing/2014/main" id="{5D9F4988-F98E-B4C2-DD6E-6BDE5021CB6B}"/>
+              </a:ext>
+            </a:extLst>
+          </p:cNvPr>
+          <p:cNvSpPr/>
+          <p:nvPr/>
+        </p:nvSpPr>
+        <p:spPr>
+          <a:xfrm>
+            <a:off x="10586906" y="3506598"/>
+            <a:ext cx="134081" cy="671119"/>
+          </a:xfrm>
+          <a:prstGeom prst="rightBrace">
+            <a:avLst/>
+          </a:prstGeom>
+        </p:spPr>
+        <p:style>
+          <a:lnRef idx="1">
+            <a:schemeClr val="accent1"/>
+          </a:lnRef>
+          <a:fillRef idx="0">
+            <a:schemeClr val="accent1"/>
+          </a:fillRef>
+          <a:effectRef idx="0">
+            <a:schemeClr val="accent1"/>
+          </a:effectRef>
+          <a:fontRef idx="minor">
+            <a:schemeClr val="tx1"/>
+          </a:fontRef>
+        </p:style>
+        <p:txBody>
+          <a:bodyPr rtlCol="0" anchor="ctr"/>
+          <a:lstStyle/>
+          <a:p>
+            <a:pPr algn="ctr"/>
+            <a:endParaRPr lang="en-GB"/>
+          </a:p>
+        </p:txBody>
+      </p:sp>
+      <p:sp>
+        <p:nvSpPr>
+          <p:cNvPr id="13" name="Left Brace 12">
+            <a:extLst>
+              <a:ext uri="{FF2B5EF4-FFF2-40B4-BE49-F238E27FC236}">
+                <a16:creationId xmlns:a16="http://schemas.microsoft.com/office/drawing/2014/main" id="{61B8F573-78F2-B39C-19BD-D3F68C396F3E}"/>
+              </a:ext>
+            </a:extLst>
+          </p:cNvPr>
+          <p:cNvSpPr/>
+          <p:nvPr/>
+        </p:nvSpPr>
+        <p:spPr>
+          <a:xfrm rot="5400000">
+            <a:off x="9569113" y="2309420"/>
+            <a:ext cx="64171" cy="1971412"/>
+          </a:xfrm>
+          <a:prstGeom prst="leftBrace">
+            <a:avLst/>
+          </a:prstGeom>
+        </p:spPr>
+        <p:style>
+          <a:lnRef idx="1">
+            <a:schemeClr val="accent1"/>
+          </a:lnRef>
+          <a:fillRef idx="0">
+            <a:schemeClr val="accent1"/>
+          </a:fillRef>
+          <a:effectRef idx="0">
+            <a:schemeClr val="accent1"/>
+          </a:effectRef>
+          <a:fontRef idx="minor">
+            <a:schemeClr val="tx1"/>
+          </a:fontRef>
+        </p:style>
+        <p:txBody>
+          <a:bodyPr rtlCol="0" anchor="ctr"/>
+          <a:lstStyle/>
+          <a:p>
+            <a:pPr algn="ctr"/>
+            <a:endParaRPr lang="en-GB"/>
+          </a:p>
+        </p:txBody>
+      </p:sp>
+      <p:pic>
+        <p:nvPicPr>
+          <p:cNvPr id="15" name="Picture 14" descr="\documentclass{article}&#10;\usepackage{amsmath}&#10;\pagestyle{empty}&#10;\begin{document}&#10;&#10;\begin{equation*}&#10;    \Delta t \approx 1 \, h \, 57 \, min\\&#10;\end{equation*}&#10;&#10;&#10;\end{document}" title="IguanaTex Bitmap Display">
+            <a:extLst>
+              <a:ext uri="{FF2B5EF4-FFF2-40B4-BE49-F238E27FC236}">
+                <a16:creationId xmlns:a16="http://schemas.microsoft.com/office/drawing/2014/main" id="{C41F6C37-7675-C3E6-803D-9E832C3F1300}"/>
+              </a:ext>
+            </a:extLst>
+          </p:cNvPr>
+          <p:cNvPicPr>
+            <a:picLocks noChangeAspect="1"/>
+          </p:cNvPicPr>
+          <p:nvPr>
+            <p:custDataLst>
+              <p:tags r:id="rId4"/>
+            </p:custDataLst>
+          </p:nvPr>
+        </p:nvPicPr>
+        <p:blipFill>
+          <a:blip r:embed="rId11"/>
+          <a:stretch>
+            <a:fillRect/>
+          </a:stretch>
+        </p:blipFill>
+        <p:spPr>
+          <a:xfrm>
+            <a:off x="8684054" y="2847526"/>
+            <a:ext cx="1734095" cy="187429"/>
+          </a:xfrm>
+          <a:prstGeom prst="rect">
+            <a:avLst/>
+          </a:prstGeom>
         </p:spPr>
       </p:pic>
     </p:spTree>
     <p:extLst>
       <p:ext uri="{BB962C8B-B14F-4D97-AF65-F5344CB8AC3E}">
-        <p14:creationId xmlns:p14="http://schemas.microsoft.com/office/powerpoint/2010/main" val="4063690498"/>
+        <p14:creationId xmlns:p14="http://schemas.microsoft.com/office/powerpoint/2010/main" val="2700837890"/>
       </p:ext>
     </p:extLst>
   </p:cSld>
   <p:clrMapOvr>
     <a:masterClrMapping/>
   </p:clrMapOvr>
-  <mc:AlternateContent xmlns:mc="http://schemas.openxmlformats.org/markup-compatibility/2006">
-    <mc:Choice xmlns:p14="http://schemas.microsoft.com/office/powerpoint/2010/main" Requires="p14">
+  <mc:AlternateContent xmlns:mc="http://schemas.openxmlformats.org/markup-compatibility/2006" xmlns:p14="http://schemas.microsoft.com/office/powerpoint/2010/main">
+    <mc:Choice Requires="p14">
       <p:transition spd="med" p14:dur="700">
         <p:fade/>
       </p:transition>
     </mc:Choice>
-    <mc:Fallback>
+    <mc:Fallback xmlns="">
       <p:transition spd="med">
         <p:fade/>
       </p:transition>
@@ -17417,14 +18269,109 @@
 </p:tagLst>
 </file>
 
+<file path=ppt/tags/tag10.xml><?xml version="1.0" encoding="utf-8"?>
+<p:tagLst xmlns:a="http://schemas.openxmlformats.org/drawingml/2006/main" xmlns:r="http://schemas.openxmlformats.org/officeDocument/2006/relationships" xmlns:p="http://schemas.openxmlformats.org/presentationml/2006/main">
+  <p:tag name="OUTPUTDPI" val="1200"/>
+  <p:tag name="ORIGINALHEIGHT" val="95.23811"/>
+  <p:tag name="ORIGINALWIDTH" val="811.3986"/>
+  <p:tag name="LATEXADDIN" val="\documentclass{article}&#10;\usepackage{amsmath}&#10;\pagestyle{empty}&#10;\begin{document}&#10;&#10;\begin{equation*}&#10;    \Delta T = 0.057 \, ^{\circ} C \\&#10;\end{equation*}&#10;&#10;&#10;\end{document}"/>
+  <p:tag name="IGUANATEXSIZE" val="20"/>
+  <p:tag name="IGUANATEXCURSOR" val="119"/>
+  <p:tag name="TRANSPARENCY" val="True"/>
+  <p:tag name="FILENAME" val="D:\PoliMi\Magistrale\Primo anno\Secondo semestre\AUTOMATION OF ENERGY SYSTEMS (LEVA ALBERTO) {055511 - MODELLING AND CONTROL OF ENERGY SYSTEMS\Project theme\AES_project_2021_2022\Images\Assignment 1\Latex\equations.tex"/>
+  <p:tag name="LATEXENGINEID" val="0"/>
+  <p:tag name="TEMPFOLDER" val=".\"/>
+  <p:tag name="LATEXFORMHEIGHT" val="312"/>
+  <p:tag name="LATEXFORMWIDTH" val="384"/>
+  <p:tag name="LATEXFORMWRAP" val="True"/>
+  <p:tag name="BITMAPVECTOR" val="0"/>
+</p:tagLst>
+</file>
+
+<file path=ppt/tags/tag11.xml><?xml version="1.0" encoding="utf-8"?>
+<p:tagLst xmlns:a="http://schemas.openxmlformats.org/drawingml/2006/main" xmlns:r="http://schemas.openxmlformats.org/officeDocument/2006/relationships" xmlns:p="http://schemas.openxmlformats.org/presentationml/2006/main">
+  <p:tag name="OUTPUTDPI" val="1200"/>
+  <p:tag name="ORIGINALHEIGHT" val="92.2385"/>
+  <p:tag name="ORIGINALWIDTH" val="853.3933"/>
+  <p:tag name="LATEXADDIN" val="\documentclass{article}&#10;\usepackage{amsmath}&#10;\pagestyle{empty}&#10;\begin{document}&#10;&#10;\begin{equation*}&#10;    \Delta t \approx 1 \, h \, 57 \, min\\&#10;\end{equation*}&#10;&#10;&#10;\end{document}"/>
+  <p:tag name="IGUANATEXSIZE" val="20"/>
+  <p:tag name="IGUANATEXCURSOR" val="139"/>
+  <p:tag name="TRANSPARENCY" val="True"/>
+  <p:tag name="FILENAME" val="D:\PoliMi\Magistrale\Primo anno\Secondo semestre\AUTOMATION OF ENERGY SYSTEMS (LEVA ALBERTO) {055511 - MODELLING AND CONTROL OF ENERGY SYSTEMS\Project theme\AES_project_2021_2022\Images\Assignment 1\Latex\equations.tex"/>
+  <p:tag name="LATEXENGINEID" val="0"/>
+  <p:tag name="TEMPFOLDER" val=".\"/>
+  <p:tag name="LATEXFORMHEIGHT" val="312"/>
+  <p:tag name="LATEXFORMWIDTH" val="384"/>
+  <p:tag name="LATEXFORMWRAP" val="True"/>
+  <p:tag name="BITMAPVECTOR" val="0"/>
+</p:tagLst>
+</file>
+
+<file path=ppt/tags/tag12.xml><?xml version="1.0" encoding="utf-8"?>
+<p:tagLst xmlns:a="http://schemas.openxmlformats.org/drawingml/2006/main" xmlns:r="http://schemas.openxmlformats.org/officeDocument/2006/relationships" xmlns:p="http://schemas.openxmlformats.org/presentationml/2006/main">
+  <p:tag name="OUTPUTDPI" val="1200"/>
+  <p:tag name="ORIGINALHEIGHT" val="373.4533"/>
+  <p:tag name="ORIGINALWIDTH" val="2478.44"/>
+  <p:tag name="LATEXADDIN" val="\documentclass{article}&#10;\usepackage{amsmath}&#10;\pagestyle{empty}&#10;\begin{document}&#10;&#10;\begin{equation}&#10;\begin{cases}&#10;\alpha \in [0,1] \\&#10;\beta \in [0,1]&#10;\end{cases}&#10;\end{equation}&#10;&#10;&#10;\end{document}"/>
+  <p:tag name="IGUANATEXSIZE" val="20"/>
+  <p:tag name="IGUANATEXCURSOR" val="191"/>
+  <p:tag name="TRANSPARENCY" val="True"/>
+  <p:tag name="FILENAME" val="D:\PoliMi\Magistrale\Primo anno\Secondo semestre\AUTOMATION OF ENERGY SYSTEMS (LEVA ALBERTO) {055511 - MODELLING AND CONTROL OF ENERGY SYSTEMS\Project theme\AES_project_2021_2022\Images\Assignment 1\Latex\equations.tex"/>
+  <p:tag name="LATEXENGINEID" val="0"/>
+  <p:tag name="TEMPFOLDER" val=".\"/>
+  <p:tag name="LATEXFORMHEIGHT" val="312"/>
+  <p:tag name="LATEXFORMWIDTH" val="384"/>
+  <p:tag name="LATEXFORMWRAP" val="True"/>
+  <p:tag name="BITMAPVECTOR" val="0"/>
+</p:tagLst>
+</file>
+
+<file path=ppt/tags/tag13.xml><?xml version="1.0" encoding="utf-8"?>
+<p:tagLst xmlns:a="http://schemas.openxmlformats.org/drawingml/2006/main" xmlns:r="http://schemas.openxmlformats.org/officeDocument/2006/relationships" xmlns:p="http://schemas.openxmlformats.org/presentationml/2006/main">
+  <p:tag name="OUTPUTDPI" val="1200"/>
+  <p:tag name="ORIGINALHEIGHT" val="308.2115"/>
+  <p:tag name="ORIGINALWIDTH" val="1847.769"/>
+  <p:tag name="LATEXADDIN" val="\documentclass{article}&#10;\usepackage{amsmath}&#10;\pagestyle{empty}&#10;\begin{document}&#10;&#10;\begin{equation*}&#10;    \begin{aligned}&#10;        P_{tot}=&amp; P_{pump }+P_{heaters }+P_{ambient} \\&#10;        &amp; P_{average} \rightarrow 3657.26 \mathrm{~W}&#10;        \end{aligned}&#10;\end{equation*}&#10;&#10;&#10;\end{document}"/>
+  <p:tag name="IGUANATEXSIZE" val="20"/>
+  <p:tag name="IGUANATEXCURSOR" val="283"/>
+  <p:tag name="TRANSPARENCY" val="True"/>
+  <p:tag name="FILENAME" val="D:\PoliMi\Magistrale\Primo anno\Secondo semestre\AUTOMATION OF ENERGY SYSTEMS (LEVA ALBERTO) {055511 - MODELLING AND CONTROL OF ENERGY SYSTEMS\Project theme\AES_project_2021_2022\Images\Assignment 1\Latex\equations.tex"/>
+  <p:tag name="LATEXENGINEID" val="0"/>
+  <p:tag name="TEMPFOLDER" val=".\"/>
+  <p:tag name="LATEXFORMHEIGHT" val="312"/>
+  <p:tag name="LATEXFORMWIDTH" val="384"/>
+  <p:tag name="LATEXFORMWRAP" val="True"/>
+  <p:tag name="BITMAPVECTOR" val="0"/>
+</p:tagLst>
+</file>
+
+<file path=ppt/tags/tag14.xml><?xml version="1.0" encoding="utf-8"?>
+<p:tagLst xmlns:a="http://schemas.openxmlformats.org/drawingml/2006/main" xmlns:r="http://schemas.openxmlformats.org/officeDocument/2006/relationships" xmlns:p="http://schemas.openxmlformats.org/presentationml/2006/main">
+  <p:tag name="OUTPUTDPI" val="1200"/>
+  <p:tag name="ORIGINALHEIGHT" val="523.4346"/>
+  <p:tag name="ORIGINALWIDTH" val="3603.3"/>
+  <p:tag name="LATEXADDIN" val="\documentclass{article}&#10;\usepackage{amsmath}&#10;\pagestyle{empty}&#10;\begin{document}&#10;&#10;\begin{equation}&#10; \begin{cases}&#10;    P_{heaters}=Q_{hMain}+Q_{h1}+Q_{h2} \\&#10;    P_{pump}=w \frac{\Delta p}{\rho}\\&#10;    P_{ambient}=G_1(T_1-T_{ambient})+G_2(T_2-T_{ambient})&#10; \end{cases}&#10;\end{equation}&#10;&#10;&#10;\end{document}"/>
+  <p:tag name="IGUANATEXSIZE" val="20"/>
+  <p:tag name="IGUANATEXCURSOR" val="297"/>
+  <p:tag name="TRANSPARENCY" val="True"/>
+  <p:tag name="FILENAME" val="D:\PoliMi\Magistrale\Primo anno\Secondo semestre\AUTOMATION OF ENERGY SYSTEMS (LEVA ALBERTO) {055511 - MODELLING AND CONTROL OF ENERGY SYSTEMS\Project theme\AES_project_2021_2022\Images\Assignment 1\Power\test.tex"/>
+  <p:tag name="LATEXENGINEID" val="0"/>
+  <p:tag name="TEMPFOLDER" val=".\"/>
+  <p:tag name="LATEXFORMHEIGHT" val="312"/>
+  <p:tag name="LATEXFORMWIDTH" val="384"/>
+  <p:tag name="LATEXFORMWRAP" val="True"/>
+  <p:tag name="BITMAPVECTOR" val="0"/>
+</p:tagLst>
+</file>
+
 <file path=ppt/tags/tag2.xml><?xml version="1.0" encoding="utf-8"?>
 <p:tagLst xmlns:a="http://schemas.openxmlformats.org/drawingml/2006/main" xmlns:r="http://schemas.openxmlformats.org/officeDocument/2006/relationships" xmlns:p="http://schemas.openxmlformats.org/presentationml/2006/main">
   <p:tag name="OUTPUTDPI" val="1200"/>
-  <p:tag name="ORIGINALHEIGHT" val="653.1683"/>
-  <p:tag name="ORIGINALWIDTH" val="3104.612"/>
-  <p:tag name="LATEXADDIN" val="\documentclass{article}&#10;\usepackage{amsmath}&#10;\pagestyle{empty}&#10;\begin{document}&#10;&#10;&#10;\begin{equation}&#10;P_{loss} = P_{pump}+P_{heaters}+P_{ambient}&#10;\end{equation}&#10;\\&#10;\begin{equation}&#10;P_{average} \to 3657.26 \, W&#10;\end{equation}&#10;&#10;&#10;&#10;\end{document}"/>
+  <p:tag name="ORIGINALHEIGHT" val="299.2126"/>
+  <p:tag name="ORIGINALWIDTH" val="3784.027"/>
+  <p:tag name="LATEXADDIN" val="\documentclass{article}&#10;\usepackage{amsmath}&#10;\pagestyle{empty}&#10;\begin{document}&#10;&#10;\begin{equation}&#10;\delta \bar{T}_{z}=\left[-\frac{\bar{\alpha} G}{c_{z}}-\frac{G_{\text {Loss }}}{c_{z}}\right] \delta T_{s}+\left[\frac{G}{c_{z}}\left(T_{\mathrm{Grid}}-\bar{T}_{z}\right) \frac{K_{\mathrm{he}}}{c_{z}}\right]\left[\begin{array}{l}&#10;\delta \alpha \\&#10;\delta \beta&#10;\end{array}\right]&#10;\end{equation}&#10;&#10;&#10;\end{document}"/>
   <p:tag name="IGUANATEXSIZE" val="20"/>
-  <p:tag name="IGUANATEXCURSOR" val="81"/>
+  <p:tag name="IGUANATEXCURSOR" val="391"/>
   <p:tag name="TRANSPARENCY" val="True"/>
   <p:tag name="LATEXENGINEID" val="0"/>
   <p:tag name="TEMPFOLDER" val=".\"/>
@@ -17438,13 +18385,127 @@
 <file path=ppt/tags/tag3.xml><?xml version="1.0" encoding="utf-8"?>
 <p:tagLst xmlns:a="http://schemas.openxmlformats.org/drawingml/2006/main" xmlns:r="http://schemas.openxmlformats.org/officeDocument/2006/relationships" xmlns:p="http://schemas.openxmlformats.org/presentationml/2006/main">
   <p:tag name="OUTPUTDPI" val="1200"/>
-  <p:tag name="ORIGINALHEIGHT" val="523.4346"/>
-  <p:tag name="ORIGINALWIDTH" val="3603.3"/>
-  <p:tag name="LATEXADDIN" val="\documentclass{article}&#10;\usepackage{amsmath}&#10;\pagestyle{empty}&#10;\begin{document}&#10;&#10;\begin{equation}&#10; \begin{cases}&#10;    P_{heaters}=Q_{hMain}+Q_{h1}+Q_{h2} \\&#10;    P_{pump}=w \frac{\Delta p}{\rho}\\&#10;    P_{ambient}=G_1(T_1-T_{ambient})+G_2(T_2-T_{ambient})&#10; \end{cases}&#10;\end{equation}&#10;&#10;&#10;\end{document}"/>
+  <p:tag name="ORIGINALHEIGHT" val="373.4533"/>
+  <p:tag name="ORIGINALWIDTH" val="2478.44"/>
+  <p:tag name="LATEXADDIN" val="\documentclass{article}&#10;\usepackage{amsmath}&#10;\pagestyle{empty}&#10;\begin{document}&#10;&#10;\begin{equation}&#10;\begin{cases}&#10;\alpha \in [0,1] \\&#10;\beta \in [0,1]&#10;\end{cases}&#10;\end{equation}&#10;&#10;&#10;\end{document}"/>
   <p:tag name="IGUANATEXSIZE" val="20"/>
-  <p:tag name="IGUANATEXCURSOR" val="297"/>
+  <p:tag name="IGUANATEXCURSOR" val="191"/>
   <p:tag name="TRANSPARENCY" val="True"/>
-  <p:tag name="FILENAME" val="D:\PoliMi\Magistrale\Primo anno\Secondo semestre\AUTOMATION OF ENERGY SYSTEMS (LEVA ALBERTO) {055511 - MODELLING AND CONTROL OF ENERGY SYSTEMS\Project theme\AES_project_2021_2022\Images\Assignment 1\Power\test.tex"/>
+  <p:tag name="FILENAME" val="D:\PoliMi\Magistrale\Primo anno\Secondo semestre\AUTOMATION OF ENERGY SYSTEMS (LEVA ALBERTO) {055511 - MODELLING AND CONTROL OF ENERGY SYSTEMS\Project theme\AES_project_2021_2022\Images\Assignment 1\Latex\equations.tex"/>
+  <p:tag name="LATEXENGINEID" val="0"/>
+  <p:tag name="TEMPFOLDER" val=".\"/>
+  <p:tag name="LATEXFORMHEIGHT" val="312"/>
+  <p:tag name="LATEXFORMWIDTH" val="384"/>
+  <p:tag name="LATEXFORMWRAP" val="True"/>
+  <p:tag name="BITMAPVECTOR" val="0"/>
+</p:tagLst>
+</file>
+
+<file path=ppt/tags/tag4.xml><?xml version="1.0" encoding="utf-8"?>
+<p:tagLst xmlns:a="http://schemas.openxmlformats.org/drawingml/2006/main" xmlns:r="http://schemas.openxmlformats.org/officeDocument/2006/relationships" xmlns:p="http://schemas.openxmlformats.org/presentationml/2006/main">
+  <p:tag name="OUTPUTDPI" val="1200"/>
+  <p:tag name="ORIGINALHEIGHT" val="534.6832"/>
+  <p:tag name="ORIGINALWIDTH" val="3283.09"/>
+  <p:tag name="LATEXADDIN" val="\documentclass{article}&#10;\usepackage{amsmath}&#10;\pagestyle{empty}&#10;\begin{document}&#10;&#10;\begin{equation}&#10;\begin{cases}&#10;\bar \alpha = 0.5 \\&#10;\bar \beta = 0 \\&#10;&#10;&#10;    \bar{T}_{z}=\frac{\bar{\beta} K_{h e}+\bar{\alpha} G T_{G r i d}+G_{L o s s} T_{A m b}}{\bar{\alpha} G+G_{l o s s}}=T_{A m b}&#10;&#10;\end{cases}&#10;\end{equation}&#10;&#10;&#10;\end{document}"/>
+  <p:tag name="IGUANATEXSIZE" val="20"/>
+  <p:tag name="IGUANATEXCURSOR" val="327"/>
+  <p:tag name="TRANSPARENCY" val="True"/>
+  <p:tag name="FILENAME" val="D:\PoliMi\Magistrale\Primo anno\Secondo semestre\AUTOMATION OF ENERGY SYSTEMS (LEVA ALBERTO) {055511 - MODELLING AND CONTROL OF ENERGY SYSTEMS\Project theme\AES_project_2021_2022\Images\Assignment 1\Latex\equations.tex"/>
+  <p:tag name="LATEXENGINEID" val="0"/>
+  <p:tag name="TEMPFOLDER" val=".\"/>
+  <p:tag name="LATEXFORMHEIGHT" val="312"/>
+  <p:tag name="LATEXFORMWIDTH" val="384"/>
+  <p:tag name="LATEXFORMWRAP" val="True"/>
+  <p:tag name="BITMAPVECTOR" val="0"/>
+</p:tagLst>
+</file>
+
+<file path=ppt/tags/tag5.xml><?xml version="1.0" encoding="utf-8"?>
+<p:tagLst xmlns:a="http://schemas.openxmlformats.org/drawingml/2006/main" xmlns:r="http://schemas.openxmlformats.org/officeDocument/2006/relationships" xmlns:p="http://schemas.openxmlformats.org/presentationml/2006/main">
+  <p:tag name="OUTPUTDPI" val="1200"/>
+  <p:tag name="ORIGINALHEIGHT" val="125.2343"/>
+  <p:tag name="ORIGINALWIDTH" val="2539.933"/>
+  <p:tag name="LATEXADDIN" val="\documentclass{article}&#10;\usepackage{amsmath}&#10;\pagestyle{empty}&#10;\begin{document}&#10;&#10;\begin{equation}&#10;    \Delta T = 0.489 \, ^{\circ} C&#10;\end{equation}&#10;&#10;&#10;\end{document}"/>
+  <p:tag name="IGUANATEXSIZE" val="20"/>
+  <p:tag name="IGUANATEXCURSOR" val="164"/>
+  <p:tag name="TRANSPARENCY" val="True"/>
+  <p:tag name="FILENAME" val="D:\PoliMi\Magistrale\Primo anno\Secondo semestre\AUTOMATION OF ENERGY SYSTEMS (LEVA ALBERTO) {055511 - MODELLING AND CONTROL OF ENERGY SYSTEMS\Project theme\AES_project_2021_2022\Images\Assignment 1\Latex\equations.tex"/>
+  <p:tag name="LATEXENGINEID" val="0"/>
+  <p:tag name="TEMPFOLDER" val=".\"/>
+  <p:tag name="LATEXFORMHEIGHT" val="312"/>
+  <p:tag name="LATEXFORMWIDTH" val="384"/>
+  <p:tag name="LATEXFORMWRAP" val="True"/>
+  <p:tag name="BITMAPVECTOR" val="0"/>
+</p:tagLst>
+</file>
+
+<file path=ppt/tags/tag6.xml><?xml version="1.0" encoding="utf-8"?>
+<p:tagLst xmlns:a="http://schemas.openxmlformats.org/drawingml/2006/main" xmlns:r="http://schemas.openxmlformats.org/officeDocument/2006/relationships" xmlns:p="http://schemas.openxmlformats.org/presentationml/2006/main">
+  <p:tag name="OUTPUTDPI" val="1200"/>
+  <p:tag name="ORIGINALHEIGHT" val="125.2343"/>
+  <p:tag name="ORIGINALWIDTH" val="2473.191"/>
+  <p:tag name="LATEXADDIN" val="\documentclass{article}&#10;\usepackage{amsmath}&#10;\pagestyle{empty}&#10;\begin{document}&#10;&#10;\begin{equation}&#10;    \Delta t \approx 39 \, min&#10;\end{equation}&#10;&#10;&#10;\end{document}"/>
+  <p:tag name="IGUANATEXSIZE" val="20"/>
+  <p:tag name="IGUANATEXCURSOR" val="160"/>
+  <p:tag name="TRANSPARENCY" val="True"/>
+  <p:tag name="FILENAME" val="D:\PoliMi\Magistrale\Primo anno\Secondo semestre\AUTOMATION OF ENERGY SYSTEMS (LEVA ALBERTO) {055511 - MODELLING AND CONTROL OF ENERGY SYSTEMS\Project theme\AES_project_2021_2022\Images\Assignment 1\Latex\equations.tex"/>
+  <p:tag name="LATEXENGINEID" val="0"/>
+  <p:tag name="TEMPFOLDER" val=".\"/>
+  <p:tag name="LATEXFORMHEIGHT" val="312"/>
+  <p:tag name="LATEXFORMWIDTH" val="384"/>
+  <p:tag name="LATEXFORMWRAP" val="True"/>
+  <p:tag name="BITMAPVECTOR" val="0"/>
+</p:tagLst>
+</file>
+
+<file path=ppt/tags/tag7.xml><?xml version="1.0" encoding="utf-8"?>
+<p:tagLst xmlns:a="http://schemas.openxmlformats.org/drawingml/2006/main" xmlns:r="http://schemas.openxmlformats.org/officeDocument/2006/relationships" xmlns:p="http://schemas.openxmlformats.org/presentationml/2006/main">
+  <p:tag name="OUTPUTDPI" val="1200"/>
+  <p:tag name="ORIGINALHEIGHT" val="95.23811"/>
+  <p:tag name="ORIGINALWIDTH" val="811.3986"/>
+  <p:tag name="LATEXADDIN" val="\documentclass{article}&#10;\usepackage{amsmath}&#10;\pagestyle{empty}&#10;\begin{document}&#10;&#10;\begin{equation*}&#10;    \Delta T = 0.306 \, ^{\circ} C \\&#10;\end{equation*}&#10;&#10;&#10;\end{document}"/>
+  <p:tag name="IGUANATEXSIZE" val="20"/>
+  <p:tag name="IGUANATEXCURSOR" val="169"/>
+  <p:tag name="TRANSPARENCY" val="True"/>
+  <p:tag name="FILENAME" val="D:\PoliMi\Magistrale\Primo anno\Secondo semestre\AUTOMATION OF ENERGY SYSTEMS (LEVA ALBERTO) {055511 - MODELLING AND CONTROL OF ENERGY SYSTEMS\Project theme\AES_project_2021_2022\Images\Assignment 1\Latex\equations.tex"/>
+  <p:tag name="LATEXENGINEID" val="0"/>
+  <p:tag name="TEMPFOLDER" val=".\"/>
+  <p:tag name="LATEXFORMHEIGHT" val="312"/>
+  <p:tag name="LATEXFORMWIDTH" val="384"/>
+  <p:tag name="LATEXFORMWRAP" val="True"/>
+  <p:tag name="BITMAPVECTOR" val="0"/>
+</p:tagLst>
+</file>
+
+<file path=ppt/tags/tag8.xml><?xml version="1.0" encoding="utf-8"?>
+<p:tagLst xmlns:a="http://schemas.openxmlformats.org/drawingml/2006/main" xmlns:r="http://schemas.openxmlformats.org/officeDocument/2006/relationships" xmlns:p="http://schemas.openxmlformats.org/presentationml/2006/main">
+  <p:tag name="OUTPUTDPI" val="1200"/>
+  <p:tag name="ORIGINALHEIGHT" val="95.23811"/>
+  <p:tag name="ORIGINALWIDTH" val="811.3986"/>
+  <p:tag name="LATEXADDIN" val="\documentclass{article}&#10;\usepackage{amsmath}&#10;\pagestyle{empty}&#10;\begin{document}&#10;&#10;\begin{equation*}&#10;    \Delta T = 0.152 \, ^{\circ} C \\&#10;\end{equation*}&#10;&#10;&#10;\end{document}"/>
+  <p:tag name="IGUANATEXSIZE" val="20"/>
+  <p:tag name="IGUANATEXCURSOR" val="119"/>
+  <p:tag name="TRANSPARENCY" val="True"/>
+  <p:tag name="FILENAME" val="D:\PoliMi\Magistrale\Primo anno\Secondo semestre\AUTOMATION OF ENERGY SYSTEMS (LEVA ALBERTO) {055511 - MODELLING AND CONTROL OF ENERGY SYSTEMS\Project theme\AES_project_2021_2022\Images\Assignment 1\Latex\equations.tex"/>
+  <p:tag name="LATEXENGINEID" val="0"/>
+  <p:tag name="TEMPFOLDER" val=".\"/>
+  <p:tag name="LATEXFORMHEIGHT" val="312"/>
+  <p:tag name="LATEXFORMWIDTH" val="384"/>
+  <p:tag name="LATEXFORMWRAP" val="True"/>
+  <p:tag name="BITMAPVECTOR" val="0"/>
+</p:tagLst>
+</file>
+
+<file path=ppt/tags/tag9.xml><?xml version="1.0" encoding="utf-8"?>
+<p:tagLst xmlns:a="http://schemas.openxmlformats.org/drawingml/2006/main" xmlns:r="http://schemas.openxmlformats.org/officeDocument/2006/relationships" xmlns:p="http://schemas.openxmlformats.org/presentationml/2006/main">
+  <p:tag name="OUTPUTDPI" val="1200"/>
+  <p:tag name="ORIGINALHEIGHT" val="95.23811"/>
+  <p:tag name="ORIGINALWIDTH" val="811.3986"/>
+  <p:tag name="LATEXADDIN" val="\documentclass{article}&#10;\usepackage{amsmath}&#10;\pagestyle{empty}&#10;\begin{document}&#10;&#10;\begin{equation*}&#10;    \Delta T = 0.119 \, ^{\circ} C \\&#10;\end{equation*}&#10;&#10;&#10;\end{document}"/>
+  <p:tag name="IGUANATEXSIZE" val="20"/>
+  <p:tag name="IGUANATEXCURSOR" val="119"/>
+  <p:tag name="TRANSPARENCY" val="True"/>
+  <p:tag name="FILENAME" val="D:\PoliMi\Magistrale\Primo anno\Secondo semestre\AUTOMATION OF ENERGY SYSTEMS (LEVA ALBERTO) {055511 - MODELLING AND CONTROL OF ENERGY SYSTEMS\Project theme\AES_project_2021_2022\Images\Assignment 1\Latex\equations.tex"/>
   <p:tag name="LATEXENGINEID" val="0"/>
   <p:tag name="TEMPFOLDER" val=".\"/>
   <p:tag name="LATEXFORMHEIGHT" val="312"/>
@@ -18315,6 +19376,15 @@
 </file>
 
 <file path=customXml/item2.xml><?xml version="1.0" encoding="utf-8"?>
+<p:properties xmlns:p="http://schemas.microsoft.com/office/2006/metadata/properties" xmlns:xsi="http://www.w3.org/2001/XMLSchema-instance" xmlns:pc="http://schemas.microsoft.com/office/infopath/2007/PartnerControls">
+  <documentManagement>
+    <_ip_UnifiedCompliancePolicyUIAction xmlns="http://schemas.microsoft.com/sharepoint/v3" xsi:nil="true"/>
+    <_ip_UnifiedCompliancePolicyProperties xmlns="http://schemas.microsoft.com/sharepoint/v3" xsi:nil="true"/>
+  </documentManagement>
+</p:properties>
+</file>
+
+<file path=customXml/item3.xml><?xml version="1.0" encoding="utf-8"?>
 <ct:contentTypeSchema xmlns:ct="http://schemas.microsoft.com/office/2006/metadata/contentType" xmlns:ma="http://schemas.microsoft.com/office/2006/metadata/properties/metaAttributes" ct:_="" ma:_="" ma:contentTypeName="Document" ma:contentTypeID="0x010100DEEA25CC0A0AC24199CDC46C25B8B0BC" ma:contentTypeVersion="10" ma:contentTypeDescription="Create a new document." ma:contentTypeScope="" ma:versionID="e3b47856d4cf355c0dacb39e1084d14f">
   <xsd:schema xmlns:xsd="http://www.w3.org/2001/XMLSchema" xmlns:xs="http://www.w3.org/2001/XMLSchema" xmlns:p="http://schemas.microsoft.com/office/2006/metadata/properties" xmlns:ns1="http://schemas.microsoft.com/sharepoint/v3" xmlns:ns2="6dc4bcd6-49db-4c07-9060-8acfc67cef9f" xmlns:ns3="fb0879af-3eba-417a-a55a-ffe6dcd6ca77" targetNamespace="http://schemas.microsoft.com/office/2006/metadata/properties" ma:root="true" ma:fieldsID="a845a615265fdb1f7b12cc65ac20ecbd" ns1:_="" ns2:_="" ns3:_="">
     <xsd:import namespace="http://schemas.microsoft.com/sharepoint/v3"/>
@@ -18522,15 +19592,6 @@
 </ct:contentTypeSchema>
 </file>
 
-<file path=customXml/item3.xml><?xml version="1.0" encoding="utf-8"?>
-<p:properties xmlns:p="http://schemas.microsoft.com/office/2006/metadata/properties" xmlns:xsi="http://www.w3.org/2001/XMLSchema-instance" xmlns:pc="http://schemas.microsoft.com/office/infopath/2007/PartnerControls">
-  <documentManagement>
-    <_ip_UnifiedCompliancePolicyUIAction xmlns="http://schemas.microsoft.com/sharepoint/v3" xsi:nil="true"/>
-    <_ip_UnifiedCompliancePolicyProperties xmlns="http://schemas.microsoft.com/sharepoint/v3" xsi:nil="true"/>
-  </documentManagement>
-</p:properties>
-</file>
-
 <file path=customXml/itemProps1.xml><?xml version="1.0" encoding="utf-8"?>
 <ds:datastoreItem xmlns:ds="http://schemas.openxmlformats.org/officeDocument/2006/customXml" ds:itemID="{F79AA90D-A39D-4F83-B1BD-92099B1CAD0D}">
   <ds:schemaRefs>
@@ -18540,6 +19601,16 @@
 </file>
 
 <file path=customXml/itemProps2.xml><?xml version="1.0" encoding="utf-8"?>
+<ds:datastoreItem xmlns:ds="http://schemas.openxmlformats.org/officeDocument/2006/customXml" ds:itemID="{374D15D6-87BC-477C-8E91-9F90829C2FC8}">
+  <ds:schemaRefs>
+    <ds:schemaRef ds:uri="http://schemas.microsoft.com/office/2006/metadata/properties"/>
+    <ds:schemaRef ds:uri="http://schemas.microsoft.com/office/infopath/2007/PartnerControls"/>
+    <ds:schemaRef ds:uri="http://schemas.microsoft.com/sharepoint/v3"/>
+  </ds:schemaRefs>
+</ds:datastoreItem>
+</file>
+
+<file path=customXml/itemProps3.xml><?xml version="1.0" encoding="utf-8"?>
 <ds:datastoreItem xmlns:ds="http://schemas.openxmlformats.org/officeDocument/2006/customXml" ds:itemID="{D19A80A7-0DD1-4CF4-ABD5-362A6549C557}">
   <ds:schemaRefs>
     <ds:schemaRef ds:uri="http://schemas.microsoft.com/office/2006/metadata/contentType"/>
@@ -18557,14 +19628,4 @@
     <ds:schemaRef ds:uri="http://schemas.microsoft.com/internal/obd"/>
   </ds:schemaRefs>
 </ds:datastoreItem>
-</file>
-
-<file path=customXml/itemProps3.xml><?xml version="1.0" encoding="utf-8"?>
-<ds:datastoreItem xmlns:ds="http://schemas.openxmlformats.org/officeDocument/2006/customXml" ds:itemID="{374D15D6-87BC-477C-8E91-9F90829C2FC8}">
-  <ds:schemaRefs>
-    <ds:schemaRef ds:uri="http://schemas.microsoft.com/office/2006/metadata/properties"/>
-    <ds:schemaRef ds:uri="http://schemas.microsoft.com/office/infopath/2007/PartnerControls"/>
-    <ds:schemaRef ds:uri="http://schemas.microsoft.com/sharepoint/v3"/>
-  </ds:schemaRefs>
-</ds:datastoreItem>
 </file>
</xml_diff>

<commit_message>
Edited powers and added efficiency also in model 2. Tidied up my powerpoint.
</commit_message>
<xml_diff>
--- a/Aes_Project_2021_2022 Fire.pptx
+++ b/Aes_Project_2021_2022 Fire.pptx
@@ -14990,6 +14990,34 @@
           <a:chExt cx="0" cy="0"/>
         </a:xfrm>
       </p:grpSpPr>
+      <p:pic>
+        <p:nvPicPr>
+          <p:cNvPr id="14" name="Content Placeholder 13" descr="Chart&#10;&#10;Description automatically generated">
+            <a:extLst>
+              <a:ext uri="{FF2B5EF4-FFF2-40B4-BE49-F238E27FC236}">
+                <a16:creationId xmlns:a16="http://schemas.microsoft.com/office/drawing/2014/main" id="{E52B2EB6-703B-3E40-7458-8A3BC2A3D312}"/>
+              </a:ext>
+            </a:extLst>
+          </p:cNvPr>
+          <p:cNvPicPr>
+            <a:picLocks noGrp="1" noChangeAspect="1"/>
+          </p:cNvPicPr>
+          <p:nvPr>
+            <p:ph idx="1"/>
+          </p:nvPr>
+        </p:nvPicPr>
+        <p:blipFill rotWithShape="1">
+          <a:blip r:embed="rId3"/>
+          <a:srcRect r="14203"/>
+          <a:stretch/>
+        </p:blipFill>
+        <p:spPr>
+          <a:xfrm>
+            <a:off x="1465697" y="1604011"/>
+            <a:ext cx="7468578" cy="4505325"/>
+          </a:xfrm>
+        </p:spPr>
+      </p:pic>
       <p:sp>
         <p:nvSpPr>
           <p:cNvPr id="2" name="Footer Placeholder 1">
@@ -15111,39 +15139,10 @@
       </p:sp>
       <p:pic>
         <p:nvPicPr>
-          <p:cNvPr id="8" name="Content Placeholder 7" descr="Chart, histogram&#10;&#10;Description automatically generated">
-            <a:extLst>
-              <a:ext uri="{FF2B5EF4-FFF2-40B4-BE49-F238E27FC236}">
-                <a16:creationId xmlns:a16="http://schemas.microsoft.com/office/drawing/2014/main" id="{338681AF-8894-1CFC-C2E3-9F98CCB2AC37}"/>
-              </a:ext>
-            </a:extLst>
-          </p:cNvPr>
-          <p:cNvPicPr>
-            <a:picLocks noGrp="1" noChangeAspect="1"/>
-          </p:cNvPicPr>
-          <p:nvPr>
-            <p:ph idx="1"/>
-          </p:nvPr>
-        </p:nvPicPr>
-        <p:blipFill>
-          <a:blip r:embed="rId3"/>
-          <a:stretch>
-            <a:fillRect/>
-          </a:stretch>
-        </p:blipFill>
-        <p:spPr>
-          <a:xfrm>
-            <a:off x="807227" y="1604011"/>
-            <a:ext cx="8597439" cy="4505325"/>
-          </a:xfrm>
-        </p:spPr>
-      </p:pic>
-      <p:pic>
-        <p:nvPicPr>
-          <p:cNvPr id="5" name="Picture 4" descr="\documentclass{article}&#10;\usepackage{amsmath}&#10;\pagestyle{empty}&#10;\begin{document}&#10;&#10;\begin{equation*}&#10;    \begin{aligned}&#10;        P_{tot}=&amp; P_{pump }+P_{heaters }+P_{ambient} \\&#10;        &amp; P_{average} \rightarrow 3657.26 \mathrm{~W}&#10;        \end{aligned}&#10;\end{equation*}&#10;&#10;&#10;\end{document}" title="IguanaTex Bitmap Display">
-            <a:extLst>
-              <a:ext uri="{FF2B5EF4-FFF2-40B4-BE49-F238E27FC236}">
-                <a16:creationId xmlns:a16="http://schemas.microsoft.com/office/drawing/2014/main" id="{29604C91-5439-3874-A47F-30F463BFEE17}"/>
+          <p:cNvPr id="9" name="Picture 8" descr="\documentclass{article}&#10;\usepackage{amsmath}&#10;\pagestyle{empty}&#10;\begin{document}&#10;&#10;\begin{equation*}&#10;    \begin{aligned}&#10;        &amp;P_{tot} = P_{pump }+P_{heaters }\\&#10;        &amp;P_{average}  \rightarrow 2043.9 \mathrm{~W}&#10;        \end{aligned}&#10;\end{equation*}&#10;&#10;&#10;\end{document}" title="IguanaTex Bitmap Display">
+            <a:extLst>
+              <a:ext uri="{FF2B5EF4-FFF2-40B4-BE49-F238E27FC236}">
+                <a16:creationId xmlns:a16="http://schemas.microsoft.com/office/drawing/2014/main" id="{B194ECB2-B495-3842-8247-C74CF3708910}"/>
               </a:ext>
             </a:extLst>
           </p:cNvPr>
@@ -15164,8 +15163,8 @@
         </p:blipFill>
         <p:spPr>
           <a:xfrm>
-            <a:off x="8132532" y="2414165"/>
-            <a:ext cx="3754666" cy="626286"/>
+            <a:off x="8498655" y="1986327"/>
+            <a:ext cx="2588952" cy="626286"/>
           </a:xfrm>
           <a:prstGeom prst="rect">
             <a:avLst/>
@@ -15214,6 +15213,34 @@
           <a:chExt cx="0" cy="0"/>
         </a:xfrm>
       </p:grpSpPr>
+      <p:pic>
+        <p:nvPicPr>
+          <p:cNvPr id="16" name="Content Placeholder 15" descr="Chart&#10;&#10;Description automatically generated">
+            <a:extLst>
+              <a:ext uri="{FF2B5EF4-FFF2-40B4-BE49-F238E27FC236}">
+                <a16:creationId xmlns:a16="http://schemas.microsoft.com/office/drawing/2014/main" id="{64329439-E857-1933-3345-8A1ECBC17F3B}"/>
+              </a:ext>
+            </a:extLst>
+          </p:cNvPr>
+          <p:cNvPicPr>
+            <a:picLocks noGrp="1" noChangeAspect="1"/>
+          </p:cNvPicPr>
+          <p:nvPr>
+            <p:ph idx="1"/>
+          </p:nvPr>
+        </p:nvPicPr>
+        <p:blipFill rotWithShape="1">
+          <a:blip r:embed="rId3"/>
+          <a:srcRect r="14827"/>
+          <a:stretch/>
+        </p:blipFill>
+        <p:spPr>
+          <a:xfrm>
+            <a:off x="1706634" y="1626851"/>
+            <a:ext cx="8778731" cy="4505325"/>
+          </a:xfrm>
+        </p:spPr>
+      </p:pic>
       <p:sp>
         <p:nvSpPr>
           <p:cNvPr id="2" name="Footer Placeholder 1">
@@ -15305,60 +15332,32 @@
       </p:sp>
       <p:pic>
         <p:nvPicPr>
-          <p:cNvPr id="7" name="Content Placeholder 6" descr="Chart, histogram&#10;&#10;Description automatically generated">
-            <a:extLst>
-              <a:ext uri="{FF2B5EF4-FFF2-40B4-BE49-F238E27FC236}">
-                <a16:creationId xmlns:a16="http://schemas.microsoft.com/office/drawing/2014/main" id="{09B0148F-8EF1-8C08-6CA6-D71F75905E73}"/>
+          <p:cNvPr id="18" name="Picture 17" descr="\documentclass{article}&#10;\usepackage{amsmath}&#10;\pagestyle{empty}&#10;\begin{document}&#10;&#10;\begin{equation*}&#10;        \begin{cases}&#10;        P_{heater}=Q_{h M a i n} \\&#10;        P_{zones}=Q_{h 1}+Q_{h 2}\\&#10;        P_{pump }=w \frac{\Delta p}{\rho} \\&#10;        P_{env}=G_{1}(T_{1}-T_{env})+G_{2}(T_{2}-T_{env})&#10;        \end{cases}     &#10;\end{equation*}&#10;&#10;&#10;\end{document}" title="IguanaTex Bitmap Display">
+            <a:extLst>
+              <a:ext uri="{FF2B5EF4-FFF2-40B4-BE49-F238E27FC236}">
+                <a16:creationId xmlns:a16="http://schemas.microsoft.com/office/drawing/2014/main" id="{5E82BB31-9099-B91D-82C7-C6E0676C4B9B}"/>
               </a:ext>
             </a:extLst>
           </p:cNvPr>
           <p:cNvPicPr>
-            <a:picLocks noGrp="1" noChangeAspect="1"/>
+            <a:picLocks noChangeAspect="1"/>
           </p:cNvPicPr>
           <p:nvPr>
-            <p:ph idx="1"/>
+            <p:custDataLst>
+              <p:tags r:id="rId1"/>
+            </p:custDataLst>
           </p:nvPr>
         </p:nvPicPr>
         <p:blipFill>
-          <a:blip r:embed="rId3"/>
+          <a:blip r:embed="rId4"/>
           <a:stretch>
             <a:fillRect/>
           </a:stretch>
         </p:blipFill>
         <p:spPr>
           <a:xfrm>
-            <a:off x="1398008" y="1356997"/>
-            <a:ext cx="8333222" cy="5025569"/>
-          </a:xfrm>
-        </p:spPr>
-      </p:pic>
-      <p:pic>
-        <p:nvPicPr>
-          <p:cNvPr id="11" name="Picture 10" descr="\documentclass{article}&#10;\usepackage{amsmath}&#10;\pagestyle{empty}&#10;\begin{document}&#10;&#10;\begin{equation}&#10; \begin{cases}&#10;    P_{heaters}=Q_{hMain}+Q_{h1}+Q_{h2} \\&#10;    P_{pump}=w \frac{\Delta p}{\rho}\\&#10;    P_{ambient}=G_1(T_1-T_{ambient})+G_2(T_2-T_{ambient})&#10; \end{cases}&#10;\end{equation}&#10;&#10;&#10;\end{document}" title="IguanaTex Bitmap Display">
-            <a:extLst>
-              <a:ext uri="{FF2B5EF4-FFF2-40B4-BE49-F238E27FC236}">
-                <a16:creationId xmlns:a16="http://schemas.microsoft.com/office/drawing/2014/main" id="{77A951C1-61E7-5DA9-9185-62E4F8551070}"/>
-              </a:ext>
-            </a:extLst>
-          </p:cNvPr>
-          <p:cNvPicPr>
-            <a:picLocks noChangeAspect="1"/>
-          </p:cNvPicPr>
-          <p:nvPr>
-            <p:custDataLst>
-              <p:tags r:id="rId1"/>
-            </p:custDataLst>
-          </p:nvPr>
-        </p:nvPicPr>
-        <p:blipFill rotWithShape="1">
-          <a:blip r:embed="rId4"/>
-          <a:srcRect r="21721"/>
-          <a:stretch/>
-        </p:blipFill>
-        <p:spPr>
-          <a:xfrm>
-            <a:off x="6231156" y="1826936"/>
-            <a:ext cx="5731545" cy="1063619"/>
+            <a:off x="6629424" y="1503344"/>
+            <a:ext cx="4444952" cy="1374476"/>
           </a:xfrm>
           <a:prstGeom prst="rect">
             <a:avLst/>
@@ -16805,10 +16804,10 @@
       </p:sp>
       <p:pic>
         <p:nvPicPr>
-          <p:cNvPr id="7" name="Immagine 12" descr="\documentclass{article}&#10;\usepackage{amsmath}&#10;\pagestyle{empty}&#10;\begin{document}&#10;\begin{equation}&#10;c_z\dot T_z=\beta K_{he}+\alpha G(T_{Grid}-T_z)-G_{Loss}(T_z-T_{Amb}) &#10;\end{equation}&#10;&#10;\end{document}" title="IguanaTex Bitmap Display">
-            <a:extLst>
-              <a:ext uri="{FF2B5EF4-FFF2-40B4-BE49-F238E27FC236}">
-                <a16:creationId xmlns:a16="http://schemas.microsoft.com/office/drawing/2014/main" id="{A962193A-533F-4D63-3A1A-91085B7B7D8E}"/>
+          <p:cNvPr id="8" name="Picture 7" descr="\documentclass{article}&#10;\usepackage{amsmath}&#10;\pagestyle{empty}&#10;\begin{document}&#10;&#10;\begin{equation}&#10;\delta \bar{T}_{z}=\left[-\frac{\bar{\alpha} G}{c_{z}}-\frac{G_{\text {Loss }}}{c_{z}}\right] \delta T_{s}+\left[\frac{G}{c_{z}}\left(T_{\mathrm{Grid}}-\bar{T}_{z}\right) \frac{K_{\mathrm{he}}}{c_{z}}\right]\left[\begin{array}{l}&#10;\delta \alpha \\&#10;\delta \beta&#10;\end{array}\right]&#10;\end{equation}&#10;&#10;&#10;\end{document}" title="IguanaTex Bitmap Display">
+            <a:extLst>
+              <a:ext uri="{FF2B5EF4-FFF2-40B4-BE49-F238E27FC236}">
+                <a16:creationId xmlns:a16="http://schemas.microsoft.com/office/drawing/2014/main" id="{9F9C7C88-9188-F4DF-2A53-4D15F31EAA6F}"/>
               </a:ext>
             </a:extLst>
           </p:cNvPr>
@@ -16822,52 +16821,13 @@
           </p:nvPr>
         </p:nvPicPr>
         <p:blipFill rotWithShape="1">
-          <a:blip r:embed="rId6">
-            <a:extLst>
-              <a:ext uri="{28A0092B-C50C-407E-A947-70E740481C1C}">
-                <a14:useLocalDpi xmlns:a14="http://schemas.microsoft.com/office/drawing/2010/main" val="0"/>
-              </a:ext>
-            </a:extLst>
-          </a:blip>
-          <a:srcRect t="1" r="18924" b="-9807"/>
-          <a:stretch/>
-        </p:blipFill>
-        <p:spPr>
-          <a:xfrm>
-            <a:off x="1193855" y="3429000"/>
-            <a:ext cx="5947626" cy="326284"/>
-          </a:xfrm>
-          <a:prstGeom prst="rect">
-            <a:avLst/>
-          </a:prstGeom>
-        </p:spPr>
-      </p:pic>
-      <p:pic>
-        <p:nvPicPr>
-          <p:cNvPr id="8" name="Picture 7" descr="\documentclass{article}&#10;\usepackage{amsmath}&#10;\pagestyle{empty}&#10;\begin{document}&#10;&#10;\begin{equation}&#10;\delta \bar{T}_{z}=\left[-\frac{\bar{\alpha} G}{c_{z}}-\frac{G_{\text {Loss }}}{c_{z}}\right] \delta T_{s}+\left[\frac{G}{c_{z}}\left(T_{\mathrm{Grid}}-\bar{T}_{z}\right) \frac{K_{\mathrm{he}}}{c_{z}}\right]\left[\begin{array}{l}&#10;\delta \alpha \\&#10;\delta \beta&#10;\end{array}\right]&#10;\end{equation}&#10;&#10;&#10;\end{document}" title="IguanaTex Bitmap Display">
-            <a:extLst>
-              <a:ext uri="{FF2B5EF4-FFF2-40B4-BE49-F238E27FC236}">
-                <a16:creationId xmlns:a16="http://schemas.microsoft.com/office/drawing/2014/main" id="{9F9C7C88-9188-F4DF-2A53-4D15F31EAA6F}"/>
-              </a:ext>
-            </a:extLst>
-          </p:cNvPr>
-          <p:cNvPicPr>
-            <a:picLocks noChangeAspect="1"/>
-          </p:cNvPicPr>
-          <p:nvPr>
-            <p:custDataLst>
-              <p:tags r:id="rId2"/>
-            </p:custDataLst>
-          </p:nvPr>
-        </p:nvPicPr>
-        <p:blipFill rotWithShape="1">
-          <a:blip r:embed="rId7"/>
+          <a:blip r:embed="rId6"/>
           <a:srcRect r="12787"/>
           <a:stretch/>
         </p:blipFill>
         <p:spPr>
           <a:xfrm>
-            <a:off x="2643507" y="5414357"/>
+            <a:off x="2395930" y="5234818"/>
             <a:ext cx="6705920" cy="608000"/>
           </a:xfrm>
           <a:prstGeom prst="rect">
@@ -16889,18 +16849,18 @@
           </p:cNvPicPr>
           <p:nvPr>
             <p:custDataLst>
-              <p:tags r:id="rId3"/>
+              <p:tags r:id="rId2"/>
             </p:custDataLst>
           </p:nvPr>
         </p:nvPicPr>
         <p:blipFill rotWithShape="1">
-          <a:blip r:embed="rId8"/>
+          <a:blip r:embed="rId7"/>
           <a:srcRect r="75972"/>
           <a:stretch/>
         </p:blipFill>
         <p:spPr>
           <a:xfrm>
-            <a:off x="7627015" y="1905816"/>
+            <a:off x="7641832" y="2116475"/>
             <a:ext cx="1210068" cy="758857"/>
           </a:xfrm>
           <a:prstGeom prst="rect">
@@ -16910,10 +16870,10 @@
       </p:pic>
       <p:pic>
         <p:nvPicPr>
-          <p:cNvPr id="12" name="Picture 11" descr="\documentclass{article}&#10;\usepackage{amsmath}&#10;\pagestyle{empty}&#10;\begin{document}&#10;&#10;\begin{equation}&#10;\begin{cases}&#10;\bar \alpha = 0.5 \\&#10;\bar \beta = 0 \\&#10;&#10;&#10;    \bar{T}_{z}=\frac{\bar{\beta} K_{h e}+\bar{\alpha} G T_{G r i d}+G_{L o s s} T_{A m b}}{\bar{\alpha} G+G_{l o s s}}=T_{A m b}&#10;&#10;\end{cases}&#10;\end{equation}&#10;&#10;&#10;\end{document}" title="IguanaTex Bitmap Display">
-            <a:extLst>
-              <a:ext uri="{FF2B5EF4-FFF2-40B4-BE49-F238E27FC236}">
-                <a16:creationId xmlns:a16="http://schemas.microsoft.com/office/drawing/2014/main" id="{97306FD3-6623-4242-7F43-F225EDD77A08}"/>
+          <p:cNvPr id="11" name="Picture 10" descr="\documentclass{article}&#10;\usepackage{amsmath}&#10;\pagestyle{empty}&#10;\begin{document}&#10;&#10;\begin{equation*}&#10;        \begin{cases}&#10;        P_{heater}=Q_{h M a i n} \\&#10;        P_{zones}=Q_{h 1}+Q_{h 2}\\&#10;        P_{pump }=w \frac{\Delta p}{\rho} \\&#10;        P_{env}=G_{1}(T_{1}-T_{env})+G_{2}(T_{2}-T_{env})&#10;        \end{cases}     &#10;\end{equation*}&#10;\begin{equation*}&#10;    \begin{cases}&#10;        \bar \alpha = 0.5 \\&#10;        \bar \beta = 0 \\&#10;        \bar{T}_{z}=\frac{\bar{\beta} K_{h e}+\bar{\alpha} G T_{G r i d}+G_{L o s s} T_{env}}{\bar{\alpha} G+G_{l o s s}}=T_{env}&#10;    \end{cases}&#10;\end{equation*}&#10;&#10;\end{document}" title="IguanaTex Bitmap Display">
+            <a:extLst>
+              <a:ext uri="{FF2B5EF4-FFF2-40B4-BE49-F238E27FC236}">
+                <a16:creationId xmlns:a16="http://schemas.microsoft.com/office/drawing/2014/main" id="{1822E2EF-FA8A-FDE0-083B-E01EF65B518A}"/>
               </a:ext>
             </a:extLst>
           </p:cNvPr>
@@ -16922,19 +16882,19 @@
           </p:cNvPicPr>
           <p:nvPr>
             <p:custDataLst>
-              <p:tags r:id="rId4"/>
+              <p:tags r:id="rId3"/>
             </p:custDataLst>
           </p:nvPr>
         </p:nvPicPr>
         <p:blipFill rotWithShape="1">
-          <a:blip r:embed="rId9"/>
-          <a:srcRect r="33038"/>
+          <a:blip r:embed="rId8"/>
+          <a:srcRect t="57510"/>
           <a:stretch/>
         </p:blipFill>
         <p:spPr>
           <a:xfrm>
-            <a:off x="3159808" y="3969341"/>
-            <a:ext cx="4467207" cy="1086476"/>
+            <a:off x="7206211" y="3618633"/>
+            <a:ext cx="4444952" cy="1147970"/>
           </a:xfrm>
           <a:prstGeom prst="rect">
             <a:avLst/>
@@ -16943,10 +16903,44 @@
       </p:pic>
       <p:pic>
         <p:nvPicPr>
-          <p:cNvPr id="14" name="Picture 13" descr="Text, letter&#10;&#10;Description automatically generated">
-            <a:extLst>
-              <a:ext uri="{FF2B5EF4-FFF2-40B4-BE49-F238E27FC236}">
-                <a16:creationId xmlns:a16="http://schemas.microsoft.com/office/drawing/2014/main" id="{59F3BDD9-0D4C-FF5D-BE97-E4DF7EAD0509}"/>
+          <p:cNvPr id="15" name="Picture 14" descr="\documentclass{article}&#10;\usepackage{amsmath}&#10;\pagestyle{empty}&#10;\begin{document}&#10;\begin{equation*}&#10;c_z\dot T_z=\beta K_{he}+\alpha G(T_{Grid}-T_z)-G_{Loss}(T_z-T_{env}) &#10;\end{equation*}&#10;\end{document}" title="IguanaTex Bitmap Display">
+            <a:extLst>
+              <a:ext uri="{FF2B5EF4-FFF2-40B4-BE49-F238E27FC236}">
+                <a16:creationId xmlns:a16="http://schemas.microsoft.com/office/drawing/2014/main" id="{2AA264A3-53C7-7E64-68A8-65B79DD920E5}"/>
+              </a:ext>
+            </a:extLst>
+          </p:cNvPr>
+          <p:cNvPicPr>
+            <a:picLocks noChangeAspect="1"/>
+          </p:cNvPicPr>
+          <p:nvPr>
+            <p:custDataLst>
+              <p:tags r:id="rId4"/>
+            </p:custDataLst>
+          </p:nvPr>
+        </p:nvPicPr>
+        <p:blipFill>
+          <a:blip r:embed="rId9"/>
+          <a:stretch>
+            <a:fillRect/>
+          </a:stretch>
+        </p:blipFill>
+        <p:spPr>
+          <a:xfrm>
+            <a:off x="821175" y="4044047"/>
+            <a:ext cx="5636571" cy="297143"/>
+          </a:xfrm>
+          <a:prstGeom prst="rect">
+            <a:avLst/>
+          </a:prstGeom>
+        </p:spPr>
+      </p:pic>
+      <p:pic>
+        <p:nvPicPr>
+          <p:cNvPr id="17" name="Picture 16" descr="Text, letter&#10;&#10;Description automatically generated">
+            <a:extLst>
+              <a:ext uri="{FF2B5EF4-FFF2-40B4-BE49-F238E27FC236}">
+                <a16:creationId xmlns:a16="http://schemas.microsoft.com/office/drawing/2014/main" id="{EAD1067E-51D5-D92E-FC4A-9724F72AC809}"/>
               </a:ext>
             </a:extLst>
           </p:cNvPr>
@@ -16957,13 +16951,13 @@
         </p:nvPicPr>
         <p:blipFill rotWithShape="1">
           <a:blip r:embed="rId10"/>
-          <a:srcRect l="15270" t="16148" r="2208" b="42507"/>
+          <a:srcRect l="15316" t="14804" r="3262" b="45321"/>
           <a:stretch/>
         </p:blipFill>
         <p:spPr>
           <a:xfrm>
-            <a:off x="624041" y="1452419"/>
-            <a:ext cx="5833705" cy="1826748"/>
+            <a:off x="921537" y="1560347"/>
+            <a:ext cx="5536209" cy="1694581"/>
           </a:xfrm>
           <a:prstGeom prst="rect">
             <a:avLst/>
@@ -17125,8 +17119,8 @@
           </a:xfrm>
         </p:spPr>
       </p:pic>
-      <mc:AlternateContent xmlns:mc="http://schemas.openxmlformats.org/markup-compatibility/2006">
-        <mc:Choice xmlns:pslz="http://schemas.microsoft.com/office/powerpoint/2016/slidezoom" Requires="pslz">
+      <mc:AlternateContent xmlns:mc="http://schemas.openxmlformats.org/markup-compatibility/2006" xmlns:pslz="http://schemas.microsoft.com/office/powerpoint/2016/slidezoom">
+        <mc:Choice Requires="pslz">
           <p:graphicFrame>
             <p:nvGraphicFramePr>
               <p:cNvPr id="8" name="Slide Zoom 7">
@@ -17187,7 +17181,7 @@
             </a:graphic>
           </p:graphicFrame>
         </mc:Choice>
-        <mc:Fallback>
+        <mc:Fallback xmlns="">
           <p:pic>
             <p:nvPicPr>
               <p:cNvPr id="8" name="Slide Zoom 7">
@@ -17204,10 +17198,10 @@
               <p:nvPr/>
             </p:nvPicPr>
             <p:blipFill>
-              <a:blip r:embed="rId4">
+              <a:blip r:embed="rId7">
                 <a:extLst>
                   <a:ext uri="{96DAC541-7B7A-43D3-8B79-37D633B846F1}">
-                    <asvg:svgBlip xmlns:asvg="http://schemas.microsoft.com/office/drawing/2016/SVG/main" r:embed="rId5"/>
+                    <asvg:svgBlip xmlns:asvg="http://schemas.microsoft.com/office/drawing/2016/SVG/main" r:embed="rId8"/>
                   </a:ext>
                 </a:extLst>
               </a:blip>
@@ -17230,8 +17224,8 @@
           </p:pic>
         </mc:Fallback>
       </mc:AlternateContent>
-      <mc:AlternateContent xmlns:mc="http://schemas.openxmlformats.org/markup-compatibility/2006">
-        <mc:Choice xmlns:pslz="http://schemas.microsoft.com/office/powerpoint/2016/slidezoom" Requires="pslz">
+      <mc:AlternateContent xmlns:mc="http://schemas.openxmlformats.org/markup-compatibility/2006" xmlns:pslz="http://schemas.microsoft.com/office/powerpoint/2016/slidezoom">
+        <mc:Choice Requires="pslz">
           <p:graphicFrame>
             <p:nvGraphicFramePr>
               <p:cNvPr id="11" name="Slide Zoom 10">
@@ -17262,7 +17256,7 @@
                   <pslz:sldZmObj sldId="283" cId="2700837890">
                     <pslz:zmPr id="{EB590B66-7C4A-481E-8359-A14F527EE35E}" imageType="cover" transitionDur="1000">
                       <p166:blipFill xmlns:p166="http://schemas.microsoft.com/office/powerpoint/2016/6/main">
-                        <a:blip r:embed="rId4">
+                        <a:blip r:embed="rId7">
                           <a:extLst>
                             <a:ext uri="{96DAC541-7B7A-43D3-8B79-37D633B846F1}">
                               <asvg:svgBlip xmlns:asvg="http://schemas.microsoft.com/office/drawing/2016/SVG/main" r:embed="rId5"/>
@@ -17292,11 +17286,11 @@
             </a:graphic>
           </p:graphicFrame>
         </mc:Choice>
-        <mc:Fallback>
+        <mc:Fallback xmlns="">
           <p:pic>
             <p:nvPicPr>
               <p:cNvPr id="11" name="Slide Zoom 10">
-                <a:hlinkClick r:id="rId7" action="ppaction://hlinksldjump"/>
+                <a:hlinkClick r:id="rId9" action="ppaction://hlinksldjump"/>
                 <a:extLst>
                   <a:ext uri="{FF2B5EF4-FFF2-40B4-BE49-F238E27FC236}">
                     <a16:creationId xmlns:a16="http://schemas.microsoft.com/office/drawing/2014/main" id="{D8FD2C6C-3127-8A98-C208-D84B2894E912}"/>
@@ -17309,10 +17303,10 @@
               <p:nvPr/>
             </p:nvPicPr>
             <p:blipFill>
-              <a:blip r:embed="rId4">
+              <a:blip r:embed="rId7">
                 <a:extLst>
                   <a:ext uri="{96DAC541-7B7A-43D3-8B79-37D633B846F1}">
-                    <asvg:svgBlip xmlns:asvg="http://schemas.microsoft.com/office/drawing/2016/SVG/main" r:embed="rId5"/>
+                    <asvg:svgBlip xmlns:asvg="http://schemas.microsoft.com/office/drawing/2016/SVG/main" r:embed="rId8"/>
                   </a:ext>
                 </a:extLst>
               </a:blip>
@@ -18253,18 +18247,17 @@
 <file path=ppt/tags/tag1.xml><?xml version="1.0" encoding="utf-8"?>
 <p:tagLst xmlns:a="http://schemas.openxmlformats.org/drawingml/2006/main" xmlns:r="http://schemas.openxmlformats.org/officeDocument/2006/relationships" xmlns:p="http://schemas.openxmlformats.org/presentationml/2006/main">
   <p:tag name="OUTPUTDPI" val="1200"/>
-  <p:tag name="ORIGINALHEIGHT" val="146.2317"/>
-  <p:tag name="ORIGINALWIDTH" val="3548.556"/>
-  <p:tag name="LATEXADDIN" val="\documentclass{article}&#10;\usepackage{amsmath}&#10;\pagestyle{empty}&#10;\begin{document}&#10;\begin{equation}&#10;c_z\dot T_z=\beta K_{he}+\alpha G(T_{Grid}-T_z)-G_{Loss}(T_z-T_{Amb}) &#10;\end{equation}&#10;&#10;\end{document}"/>
+  <p:tag name="ORIGINALHEIGHT" val="299.2126"/>
+  <p:tag name="ORIGINALWIDTH" val="3784.027"/>
+  <p:tag name="LATEXADDIN" val="\documentclass{article}&#10;\usepackage{amsmath}&#10;\pagestyle{empty}&#10;\begin{document}&#10;&#10;\begin{equation}&#10;\delta \bar{T}_{z}=\left[-\frac{\bar{\alpha} G}{c_{z}}-\frac{G_{\text {Loss }}}{c_{z}}\right] \delta T_{s}+\left[\frac{G}{c_{z}}\left(T_{\mathrm{Grid}}-\bar{T}_{z}\right) \frac{K_{\mathrm{he}}}{c_{z}}\right]\left[\begin{array}{l}&#10;\delta \alpha \\&#10;\delta \beta&#10;\end{array}\right]&#10;\end{equation}&#10;&#10;&#10;\end{document}"/>
   <p:tag name="IGUANATEXSIZE" val="20"/>
-  <p:tag name="IGUANATEXCURSOR" val="182"/>
-  <p:tag name="TRANSPARENCY" val="Vero"/>
-  <p:tag name="FILENAME" val=""/>
+  <p:tag name="IGUANATEXCURSOR" val="391"/>
+  <p:tag name="TRANSPARENCY" val="True"/>
   <p:tag name="LATEXENGINEID" val="0"/>
   <p:tag name="TEMPFOLDER" val=".\"/>
   <p:tag name="LATEXFORMHEIGHT" val="312"/>
   <p:tag name="LATEXFORMWIDTH" val="384"/>
-  <p:tag name="LATEXFORMWRAP" val="Vero"/>
+  <p:tag name="LATEXFORMWRAP" val="True"/>
   <p:tag name="BITMAPVECTOR" val="0"/>
 </p:tagLst>
 </file>
@@ -18330,10 +18323,10 @@
 <p:tagLst xmlns:a="http://schemas.openxmlformats.org/drawingml/2006/main" xmlns:r="http://schemas.openxmlformats.org/officeDocument/2006/relationships" xmlns:p="http://schemas.openxmlformats.org/presentationml/2006/main">
   <p:tag name="OUTPUTDPI" val="1200"/>
   <p:tag name="ORIGINALHEIGHT" val="308.2115"/>
-  <p:tag name="ORIGINALWIDTH" val="1847.769"/>
-  <p:tag name="LATEXADDIN" val="\documentclass{article}&#10;\usepackage{amsmath}&#10;\pagestyle{empty}&#10;\begin{document}&#10;&#10;\begin{equation*}&#10;    \begin{aligned}&#10;        P_{tot}=&amp; P_{pump }+P_{heaters }+P_{ambient} \\&#10;        &amp; P_{average} \rightarrow 3657.26 \mathrm{~W}&#10;        \end{aligned}&#10;\end{equation*}&#10;&#10;&#10;\end{document}"/>
+  <p:tag name="ORIGINALWIDTH" val="1274.091"/>
+  <p:tag name="LATEXADDIN" val="\documentclass{article}&#10;\usepackage{amsmath}&#10;\pagestyle{empty}&#10;\begin{document}&#10;&#10;\begin{equation*}&#10;    \begin{aligned}&#10;        &amp;P_{tot} = P_{pump }+P_{heaters }\\&#10;        &amp;P_{average}  \rightarrow 2043.9 \mathrm{~W}&#10;        \end{aligned}&#10;\end{equation*}&#10;&#10;&#10;\end{document}"/>
   <p:tag name="IGUANATEXSIZE" val="20"/>
-  <p:tag name="IGUANATEXCURSOR" val="283"/>
+  <p:tag name="IGUANATEXCURSOR" val="270"/>
   <p:tag name="TRANSPARENCY" val="True"/>
   <p:tag name="FILENAME" val="D:\PoliMi\Magistrale\Primo anno\Secondo semestre\AUTOMATION OF ENERGY SYSTEMS (LEVA ALBERTO) {055511 - MODELLING AND CONTROL OF ENERGY SYSTEMS\Project theme\AES_project_2021_2022\Images\Assignment 1\Latex\equations.tex"/>
   <p:tag name="LATEXENGINEID" val="0"/>
@@ -18348,13 +18341,13 @@
 <file path=ppt/tags/tag14.xml><?xml version="1.0" encoding="utf-8"?>
 <p:tagLst xmlns:a="http://schemas.openxmlformats.org/drawingml/2006/main" xmlns:r="http://schemas.openxmlformats.org/officeDocument/2006/relationships" xmlns:p="http://schemas.openxmlformats.org/presentationml/2006/main">
   <p:tag name="OUTPUTDPI" val="1200"/>
-  <p:tag name="ORIGINALHEIGHT" val="523.4346"/>
-  <p:tag name="ORIGINALWIDTH" val="3603.3"/>
-  <p:tag name="LATEXADDIN" val="\documentclass{article}&#10;\usepackage{amsmath}&#10;\pagestyle{empty}&#10;\begin{document}&#10;&#10;\begin{equation}&#10; \begin{cases}&#10;    P_{heaters}=Q_{hMain}+Q_{h1}+Q_{h2} \\&#10;    P_{pump}=w \frac{\Delta p}{\rho}\\&#10;    P_{ambient}=G_1(T_1-T_{ambient})+G_2(T_2-T_{ambient})&#10; \end{cases}&#10;\end{equation}&#10;&#10;&#10;\end{document}"/>
+  <p:tag name="ORIGINALHEIGHT" val="676.4154"/>
+  <p:tag name="ORIGINALWIDTH" val="2187.477"/>
+  <p:tag name="LATEXADDIN" val="\documentclass{article}&#10;\usepackage{amsmath}&#10;\pagestyle{empty}&#10;\begin{document}&#10;&#10;\begin{equation*}&#10;        \begin{cases}&#10;        P_{heater}=Q_{h M a i n} \\&#10;        P_{zones}=Q_{h 1}+Q_{h 2}\\&#10;        P_{pump }=w \frac{\Delta p}{\rho} \\&#10;        P_{env}=G_{1}(T_{1}-T_{env})+G_{2}(T_{2}-T_{env})&#10;        \end{cases}     &#10;\end{equation*}&#10;&#10;&#10;\end{document}"/>
   <p:tag name="IGUANATEXSIZE" val="20"/>
-  <p:tag name="IGUANATEXCURSOR" val="297"/>
+  <p:tag name="IGUANATEXCURSOR" val="353"/>
   <p:tag name="TRANSPARENCY" val="True"/>
-  <p:tag name="FILENAME" val="D:\PoliMi\Magistrale\Primo anno\Secondo semestre\AUTOMATION OF ENERGY SYSTEMS (LEVA ALBERTO) {055511 - MODELLING AND CONTROL OF ENERGY SYSTEMS\Project theme\AES_project_2021_2022\Images\Assignment 1\Power\test.tex"/>
+  <p:tag name="FILENAME" val="D:\PoliMi\Magistrale\Primo anno\Secondo semestre\AUTOMATION OF ENERGY SYSTEMS (LEVA ALBERTO) {055511 - MODELLING AND CONTROL OF ENERGY SYSTEMS\Project theme\AES_project_2021_2022\Images\Assignment 1\Latex\equations.tex"/>
   <p:tag name="LATEXENGINEID" val="0"/>
   <p:tag name="TEMPFOLDER" val=".\"/>
   <p:tag name="LATEXFORMHEIGHT" val="312"/>
@@ -18365,24 +18358,6 @@
 </file>
 
 <file path=ppt/tags/tag2.xml><?xml version="1.0" encoding="utf-8"?>
-<p:tagLst xmlns:a="http://schemas.openxmlformats.org/drawingml/2006/main" xmlns:r="http://schemas.openxmlformats.org/officeDocument/2006/relationships" xmlns:p="http://schemas.openxmlformats.org/presentationml/2006/main">
-  <p:tag name="OUTPUTDPI" val="1200"/>
-  <p:tag name="ORIGINALHEIGHT" val="299.2126"/>
-  <p:tag name="ORIGINALWIDTH" val="3784.027"/>
-  <p:tag name="LATEXADDIN" val="\documentclass{article}&#10;\usepackage{amsmath}&#10;\pagestyle{empty}&#10;\begin{document}&#10;&#10;\begin{equation}&#10;\delta \bar{T}_{z}=\left[-\frac{\bar{\alpha} G}{c_{z}}-\frac{G_{\text {Loss }}}{c_{z}}\right] \delta T_{s}+\left[\frac{G}{c_{z}}\left(T_{\mathrm{Grid}}-\bar{T}_{z}\right) \frac{K_{\mathrm{he}}}{c_{z}}\right]\left[\begin{array}{l}&#10;\delta \alpha \\&#10;\delta \beta&#10;\end{array}\right]&#10;\end{equation}&#10;&#10;&#10;\end{document}"/>
-  <p:tag name="IGUANATEXSIZE" val="20"/>
-  <p:tag name="IGUANATEXCURSOR" val="391"/>
-  <p:tag name="TRANSPARENCY" val="True"/>
-  <p:tag name="LATEXENGINEID" val="0"/>
-  <p:tag name="TEMPFOLDER" val=".\"/>
-  <p:tag name="LATEXFORMHEIGHT" val="312"/>
-  <p:tag name="LATEXFORMWIDTH" val="384"/>
-  <p:tag name="LATEXFORMWRAP" val="True"/>
-  <p:tag name="BITMAPVECTOR" val="0"/>
-</p:tagLst>
-</file>
-
-<file path=ppt/tags/tag3.xml><?xml version="1.0" encoding="utf-8"?>
 <p:tagLst xmlns:a="http://schemas.openxmlformats.org/drawingml/2006/main" xmlns:r="http://schemas.openxmlformats.org/officeDocument/2006/relationships" xmlns:p="http://schemas.openxmlformats.org/presentationml/2006/main">
   <p:tag name="OUTPUTDPI" val="1200"/>
   <p:tag name="ORIGINALHEIGHT" val="373.4533"/>
@@ -18401,16 +18376,34 @@
 </p:tagLst>
 </file>
 
+<file path=ppt/tags/tag3.xml><?xml version="1.0" encoding="utf-8"?>
+<p:tagLst xmlns:a="http://schemas.openxmlformats.org/drawingml/2006/main" xmlns:r="http://schemas.openxmlformats.org/officeDocument/2006/relationships" xmlns:p="http://schemas.openxmlformats.org/presentationml/2006/main">
+  <p:tag name="OUTPUTDPI" val="1200"/>
+  <p:tag name="ORIGINALHEIGHT" val="1329.584"/>
+  <p:tag name="ORIGINALWIDTH" val="2187.477"/>
+  <p:tag name="LATEXADDIN" val="\documentclass{article}&#10;\usepackage{amsmath}&#10;\pagestyle{empty}&#10;\begin{document}&#10;&#10;\begin{equation*}&#10;        \begin{cases}&#10;        P_{heater}=Q_{h M a i n} \\&#10;        P_{zones}=Q_{h 1}+Q_{h 2}\\&#10;        P_{pump }=w \frac{\Delta p}{\rho} \\&#10;        P_{env}=G_{1}(T_{1}-T_{env})+G_{2}(T_{2}-T_{env})&#10;        \end{cases}     &#10;\end{equation*}&#10;\begin{equation*}&#10;    \begin{cases}&#10;        \bar \alpha = 0.5 \\&#10;        \bar \beta = 0 \\&#10;        \bar{T}_{z}=\frac{\bar{\beta} K_{h e}+\bar{\alpha} G T_{G r i d}+G_{L o s s} T_{env}}{\bar{\alpha} G+G_{l o s s}}=T_{env}&#10;    \end{cases}&#10;\end{equation*}&#10;&#10;\end{document}"/>
+  <p:tag name="IGUANATEXSIZE" val="20"/>
+  <p:tag name="IGUANATEXCURSOR" val="605"/>
+  <p:tag name="TRANSPARENCY" val="True"/>
+  <p:tag name="FILENAME" val="D:\PoliMi\Magistrale\Primo anno\Secondo semestre\AUTOMATION OF ENERGY SYSTEMS (LEVA ALBERTO) {055511 - MODELLING AND CONTROL OF ENERGY SYSTEMS\Project theme\AES_project_2021_2022\Images\Assignment 1\Latex\equations.tex"/>
+  <p:tag name="LATEXENGINEID" val="0"/>
+  <p:tag name="TEMPFOLDER" val=".\"/>
+  <p:tag name="LATEXFORMHEIGHT" val="312"/>
+  <p:tag name="LATEXFORMWIDTH" val="384"/>
+  <p:tag name="LATEXFORMWRAP" val="True"/>
+  <p:tag name="BITMAPVECTOR" val="0"/>
+</p:tagLst>
+</file>
+
 <file path=ppt/tags/tag4.xml><?xml version="1.0" encoding="utf-8"?>
 <p:tagLst xmlns:a="http://schemas.openxmlformats.org/drawingml/2006/main" xmlns:r="http://schemas.openxmlformats.org/officeDocument/2006/relationships" xmlns:p="http://schemas.openxmlformats.org/presentationml/2006/main">
   <p:tag name="OUTPUTDPI" val="1200"/>
-  <p:tag name="ORIGINALHEIGHT" val="534.6832"/>
-  <p:tag name="ORIGINALWIDTH" val="3283.09"/>
-  <p:tag name="LATEXADDIN" val="\documentclass{article}&#10;\usepackage{amsmath}&#10;\pagestyle{empty}&#10;\begin{document}&#10;&#10;\begin{equation}&#10;\begin{cases}&#10;\bar \alpha = 0.5 \\&#10;\bar \beta = 0 \\&#10;&#10;&#10;    \bar{T}_{z}=\frac{\bar{\beta} K_{h e}+\bar{\alpha} G T_{G r i d}+G_{L o s s} T_{A m b}}{\bar{\alpha} G+G_{l o s s}}=T_{A m b}&#10;&#10;\end{cases}&#10;\end{equation}&#10;&#10;&#10;\end{document}"/>
+  <p:tag name="ORIGINALHEIGHT" val="146.2317"/>
+  <p:tag name="ORIGINALWIDTH" val="2773.903"/>
+  <p:tag name="LATEXADDIN" val="\documentclass{article}&#10;\usepackage{amsmath}&#10;\pagestyle{empty}&#10;\begin{document}&#10;\begin{equation*}&#10;c_z\dot T_z=\beta K_{he}+\alpha G(T_{Grid}-T_z)-G_{Loss}(T_z-T_{env}) &#10;\end{equation*}&#10;\end{document}"/>
   <p:tag name="IGUANATEXSIZE" val="20"/>
-  <p:tag name="IGUANATEXCURSOR" val="327"/>
+  <p:tag name="IGUANATEXCURSOR" val="184"/>
   <p:tag name="TRANSPARENCY" val="True"/>
-  <p:tag name="FILENAME" val="D:\PoliMi\Magistrale\Primo anno\Secondo semestre\AUTOMATION OF ENERGY SYSTEMS (LEVA ALBERTO) {055511 - MODELLING AND CONTROL OF ENERGY SYSTEMS\Project theme\AES_project_2021_2022\Images\Assignment 1\Latex\equations.tex"/>
   <p:tag name="LATEXENGINEID" val="0"/>
   <p:tag name="TEMPFOLDER" val=".\"/>
   <p:tag name="LATEXFORMHEIGHT" val="312"/>
@@ -19376,15 +19369,6 @@
 </file>
 
 <file path=customXml/item2.xml><?xml version="1.0" encoding="utf-8"?>
-<p:properties xmlns:p="http://schemas.microsoft.com/office/2006/metadata/properties" xmlns:xsi="http://www.w3.org/2001/XMLSchema-instance" xmlns:pc="http://schemas.microsoft.com/office/infopath/2007/PartnerControls">
-  <documentManagement>
-    <_ip_UnifiedCompliancePolicyUIAction xmlns="http://schemas.microsoft.com/sharepoint/v3" xsi:nil="true"/>
-    <_ip_UnifiedCompliancePolicyProperties xmlns="http://schemas.microsoft.com/sharepoint/v3" xsi:nil="true"/>
-  </documentManagement>
-</p:properties>
-</file>
-
-<file path=customXml/item3.xml><?xml version="1.0" encoding="utf-8"?>
 <ct:contentTypeSchema xmlns:ct="http://schemas.microsoft.com/office/2006/metadata/contentType" xmlns:ma="http://schemas.microsoft.com/office/2006/metadata/properties/metaAttributes" ct:_="" ma:_="" ma:contentTypeName="Document" ma:contentTypeID="0x010100DEEA25CC0A0AC24199CDC46C25B8B0BC" ma:contentTypeVersion="10" ma:contentTypeDescription="Create a new document." ma:contentTypeScope="" ma:versionID="e3b47856d4cf355c0dacb39e1084d14f">
   <xsd:schema xmlns:xsd="http://www.w3.org/2001/XMLSchema" xmlns:xs="http://www.w3.org/2001/XMLSchema" xmlns:p="http://schemas.microsoft.com/office/2006/metadata/properties" xmlns:ns1="http://schemas.microsoft.com/sharepoint/v3" xmlns:ns2="6dc4bcd6-49db-4c07-9060-8acfc67cef9f" xmlns:ns3="fb0879af-3eba-417a-a55a-ffe6dcd6ca77" targetNamespace="http://schemas.microsoft.com/office/2006/metadata/properties" ma:root="true" ma:fieldsID="a845a615265fdb1f7b12cc65ac20ecbd" ns1:_="" ns2:_="" ns3:_="">
     <xsd:import namespace="http://schemas.microsoft.com/sharepoint/v3"/>
@@ -19592,6 +19576,15 @@
 </ct:contentTypeSchema>
 </file>
 
+<file path=customXml/item3.xml><?xml version="1.0" encoding="utf-8"?>
+<p:properties xmlns:p="http://schemas.microsoft.com/office/2006/metadata/properties" xmlns:xsi="http://www.w3.org/2001/XMLSchema-instance" xmlns:pc="http://schemas.microsoft.com/office/infopath/2007/PartnerControls">
+  <documentManagement>
+    <_ip_UnifiedCompliancePolicyUIAction xmlns="http://schemas.microsoft.com/sharepoint/v3" xsi:nil="true"/>
+    <_ip_UnifiedCompliancePolicyProperties xmlns="http://schemas.microsoft.com/sharepoint/v3" xsi:nil="true"/>
+  </documentManagement>
+</p:properties>
+</file>
+
 <file path=customXml/itemProps1.xml><?xml version="1.0" encoding="utf-8"?>
 <ds:datastoreItem xmlns:ds="http://schemas.openxmlformats.org/officeDocument/2006/customXml" ds:itemID="{F79AA90D-A39D-4F83-B1BD-92099B1CAD0D}">
   <ds:schemaRefs>
@@ -19601,16 +19594,6 @@
 </file>
 
 <file path=customXml/itemProps2.xml><?xml version="1.0" encoding="utf-8"?>
-<ds:datastoreItem xmlns:ds="http://schemas.openxmlformats.org/officeDocument/2006/customXml" ds:itemID="{374D15D6-87BC-477C-8E91-9F90829C2FC8}">
-  <ds:schemaRefs>
-    <ds:schemaRef ds:uri="http://schemas.microsoft.com/office/2006/metadata/properties"/>
-    <ds:schemaRef ds:uri="http://schemas.microsoft.com/office/infopath/2007/PartnerControls"/>
-    <ds:schemaRef ds:uri="http://schemas.microsoft.com/sharepoint/v3"/>
-  </ds:schemaRefs>
-</ds:datastoreItem>
-</file>
-
-<file path=customXml/itemProps3.xml><?xml version="1.0" encoding="utf-8"?>
 <ds:datastoreItem xmlns:ds="http://schemas.openxmlformats.org/officeDocument/2006/customXml" ds:itemID="{D19A80A7-0DD1-4CF4-ABD5-362A6549C557}">
   <ds:schemaRefs>
     <ds:schemaRef ds:uri="http://schemas.microsoft.com/office/2006/metadata/contentType"/>
@@ -19628,4 +19611,14 @@
     <ds:schemaRef ds:uri="http://schemas.microsoft.com/internal/obd"/>
   </ds:schemaRefs>
 </ds:datastoreItem>
+</file>
+
+<file path=customXml/itemProps3.xml><?xml version="1.0" encoding="utf-8"?>
+<ds:datastoreItem xmlns:ds="http://schemas.openxmlformats.org/officeDocument/2006/customXml" ds:itemID="{374D15D6-87BC-477C-8E91-9F90829C2FC8}">
+  <ds:schemaRefs>
+    <ds:schemaRef ds:uri="http://schemas.microsoft.com/office/2006/metadata/properties"/>
+    <ds:schemaRef ds:uri="http://schemas.microsoft.com/office/infopath/2007/PartnerControls"/>
+    <ds:schemaRef ds:uri="http://schemas.microsoft.com/sharepoint/v3"/>
+  </ds:schemaRefs>
+</ds:datastoreItem>
 </file>
</xml_diff>